<commit_message>
WIP describing scheduling algorithm
</commit_message>
<xml_diff>
--- a/midterm.pptx
+++ b/midterm.pptx
@@ -4,11 +4,19 @@
   <p:sldMasterIdLst>
     <p:sldMasterId id="2147483648" r:id="rId1"/>
   </p:sldMasterIdLst>
+  <p:notesMasterIdLst>
+    <p:notesMasterId r:id="rId11"/>
+  </p:notesMasterIdLst>
   <p:sldIdLst>
     <p:sldId id="256" r:id="rId2"/>
-    <p:sldId id="257" r:id="rId3"/>
-    <p:sldId id="258" r:id="rId4"/>
-    <p:sldId id="259" r:id="rId5"/>
+    <p:sldId id="261" r:id="rId3"/>
+    <p:sldId id="280" r:id="rId4"/>
+    <p:sldId id="281" r:id="rId5"/>
+    <p:sldId id="282" r:id="rId6"/>
+    <p:sldId id="283" r:id="rId7"/>
+    <p:sldId id="257" r:id="rId8"/>
+    <p:sldId id="258" r:id="rId9"/>
+    <p:sldId id="260" r:id="rId10"/>
   </p:sldIdLst>
   <p:sldSz cx="12192000" cy="6858000"/>
   <p:notesSz cx="6858000" cy="9144000"/>
@@ -115,6 +123,828 @@
 </p:presentation>
 </file>
 
+<file path=ppt/notesMasters/notesMaster1.xml><?xml version="1.0" encoding="utf-8"?>
+<p:notesMaster xmlns:a="http://schemas.openxmlformats.org/drawingml/2006/main" xmlns:r="http://schemas.openxmlformats.org/officeDocument/2006/relationships" xmlns:p="http://schemas.openxmlformats.org/presentationml/2006/main">
+  <p:cSld>
+    <p:bg>
+      <p:bgRef idx="1001">
+        <a:schemeClr val="bg1"/>
+      </p:bgRef>
+    </p:bg>
+    <p:spTree>
+      <p:nvGrpSpPr>
+        <p:cNvPr id="1" name=""/>
+        <p:cNvGrpSpPr/>
+        <p:nvPr/>
+      </p:nvGrpSpPr>
+      <p:grpSpPr>
+        <a:xfrm>
+          <a:off x="0" y="0"/>
+          <a:ext cx="0" cy="0"/>
+          <a:chOff x="0" y="0"/>
+          <a:chExt cx="0" cy="0"/>
+        </a:xfrm>
+      </p:grpSpPr>
+      <p:sp>
+        <p:nvSpPr>
+          <p:cNvPr id="2" name="Header Placeholder 1"/>
+          <p:cNvSpPr>
+            <a:spLocks noGrp="1"/>
+          </p:cNvSpPr>
+          <p:nvPr>
+            <p:ph type="hdr" sz="quarter"/>
+          </p:nvPr>
+        </p:nvSpPr>
+        <p:spPr>
+          <a:xfrm>
+            <a:off x="0" y="0"/>
+            <a:ext cx="2971800" cy="458788"/>
+          </a:xfrm>
+          <a:prstGeom prst="rect">
+            <a:avLst/>
+          </a:prstGeom>
+        </p:spPr>
+        <p:txBody>
+          <a:bodyPr vert="horz" lIns="91440" tIns="45720" rIns="91440" bIns="45720" rtlCol="0"/>
+          <a:lstStyle>
+            <a:lvl1pPr algn="l">
+              <a:defRPr sz="1200"/>
+            </a:lvl1pPr>
+          </a:lstStyle>
+          <a:p>
+            <a:endParaRPr lang="en-US"/>
+          </a:p>
+        </p:txBody>
+      </p:sp>
+      <p:sp>
+        <p:nvSpPr>
+          <p:cNvPr id="3" name="Date Placeholder 2"/>
+          <p:cNvSpPr>
+            <a:spLocks noGrp="1"/>
+          </p:cNvSpPr>
+          <p:nvPr>
+            <p:ph type="dt" idx="1"/>
+          </p:nvPr>
+        </p:nvSpPr>
+        <p:spPr>
+          <a:xfrm>
+            <a:off x="3884613" y="0"/>
+            <a:ext cx="2971800" cy="458788"/>
+          </a:xfrm>
+          <a:prstGeom prst="rect">
+            <a:avLst/>
+          </a:prstGeom>
+        </p:spPr>
+        <p:txBody>
+          <a:bodyPr vert="horz" lIns="91440" tIns="45720" rIns="91440" bIns="45720" rtlCol="0"/>
+          <a:lstStyle>
+            <a:lvl1pPr algn="r">
+              <a:defRPr sz="1200"/>
+            </a:lvl1pPr>
+          </a:lstStyle>
+          <a:p>
+            <a:fld id="{5BBDA22D-9256-1545-963C-F40A629BF286}" type="datetimeFigureOut">
+              <a:rPr lang="en-US" smtClean="0"/>
+              <a:t>4/3/23</a:t>
+            </a:fld>
+            <a:endParaRPr lang="en-US"/>
+          </a:p>
+        </p:txBody>
+      </p:sp>
+      <p:sp>
+        <p:nvSpPr>
+          <p:cNvPr id="4" name="Slide Image Placeholder 3"/>
+          <p:cNvSpPr>
+            <a:spLocks noGrp="1" noRot="1" noChangeAspect="1"/>
+          </p:cNvSpPr>
+          <p:nvPr>
+            <p:ph type="sldImg" idx="2"/>
+          </p:nvPr>
+        </p:nvSpPr>
+        <p:spPr>
+          <a:xfrm>
+            <a:off x="685800" y="1143000"/>
+            <a:ext cx="5486400" cy="3086100"/>
+          </a:xfrm>
+          <a:prstGeom prst="rect">
+            <a:avLst/>
+          </a:prstGeom>
+          <a:noFill/>
+          <a:ln w="12700">
+            <a:solidFill>
+              <a:prstClr val="black"/>
+            </a:solidFill>
+          </a:ln>
+        </p:spPr>
+        <p:txBody>
+          <a:bodyPr vert="horz" lIns="91440" tIns="45720" rIns="91440" bIns="45720" rtlCol="0" anchor="ctr"/>
+          <a:lstStyle/>
+          <a:p>
+            <a:endParaRPr lang="en-US"/>
+          </a:p>
+        </p:txBody>
+      </p:sp>
+      <p:sp>
+        <p:nvSpPr>
+          <p:cNvPr id="5" name="Notes Placeholder 4"/>
+          <p:cNvSpPr>
+            <a:spLocks noGrp="1"/>
+          </p:cNvSpPr>
+          <p:nvPr>
+            <p:ph type="body" sz="quarter" idx="3"/>
+          </p:nvPr>
+        </p:nvSpPr>
+        <p:spPr>
+          <a:xfrm>
+            <a:off x="685800" y="4400550"/>
+            <a:ext cx="5486400" cy="3600450"/>
+          </a:xfrm>
+          <a:prstGeom prst="rect">
+            <a:avLst/>
+          </a:prstGeom>
+        </p:spPr>
+        <p:txBody>
+          <a:bodyPr vert="horz" lIns="91440" tIns="45720" rIns="91440" bIns="45720" rtlCol="0"/>
+          <a:lstStyle/>
+          <a:p>
+            <a:pPr lvl="0"/>
+            <a:r>
+              <a:rPr lang="en-US"/>
+              <a:t>Click to edit Master text styles</a:t>
+            </a:r>
+          </a:p>
+          <a:p>
+            <a:pPr lvl="1"/>
+            <a:r>
+              <a:rPr lang="en-US"/>
+              <a:t>Second level</a:t>
+            </a:r>
+          </a:p>
+          <a:p>
+            <a:pPr lvl="2"/>
+            <a:r>
+              <a:rPr lang="en-US"/>
+              <a:t>Third level</a:t>
+            </a:r>
+          </a:p>
+          <a:p>
+            <a:pPr lvl="3"/>
+            <a:r>
+              <a:rPr lang="en-US"/>
+              <a:t>Fourth level</a:t>
+            </a:r>
+          </a:p>
+          <a:p>
+            <a:pPr lvl="4"/>
+            <a:r>
+              <a:rPr lang="en-US"/>
+              <a:t>Fifth level</a:t>
+            </a:r>
+          </a:p>
+        </p:txBody>
+      </p:sp>
+      <p:sp>
+        <p:nvSpPr>
+          <p:cNvPr id="6" name="Footer Placeholder 5"/>
+          <p:cNvSpPr>
+            <a:spLocks noGrp="1"/>
+          </p:cNvSpPr>
+          <p:nvPr>
+            <p:ph type="ftr" sz="quarter" idx="4"/>
+          </p:nvPr>
+        </p:nvSpPr>
+        <p:spPr>
+          <a:xfrm>
+            <a:off x="0" y="8685213"/>
+            <a:ext cx="2971800" cy="458787"/>
+          </a:xfrm>
+          <a:prstGeom prst="rect">
+            <a:avLst/>
+          </a:prstGeom>
+        </p:spPr>
+        <p:txBody>
+          <a:bodyPr vert="horz" lIns="91440" tIns="45720" rIns="91440" bIns="45720" rtlCol="0" anchor="b"/>
+          <a:lstStyle>
+            <a:lvl1pPr algn="l">
+              <a:defRPr sz="1200"/>
+            </a:lvl1pPr>
+          </a:lstStyle>
+          <a:p>
+            <a:endParaRPr lang="en-US"/>
+          </a:p>
+        </p:txBody>
+      </p:sp>
+      <p:sp>
+        <p:nvSpPr>
+          <p:cNvPr id="7" name="Slide Number Placeholder 6"/>
+          <p:cNvSpPr>
+            <a:spLocks noGrp="1"/>
+          </p:cNvSpPr>
+          <p:nvPr>
+            <p:ph type="sldNum" sz="quarter" idx="5"/>
+          </p:nvPr>
+        </p:nvSpPr>
+        <p:spPr>
+          <a:xfrm>
+            <a:off x="3884613" y="8685213"/>
+            <a:ext cx="2971800" cy="458787"/>
+          </a:xfrm>
+          <a:prstGeom prst="rect">
+            <a:avLst/>
+          </a:prstGeom>
+        </p:spPr>
+        <p:txBody>
+          <a:bodyPr vert="horz" lIns="91440" tIns="45720" rIns="91440" bIns="45720" rtlCol="0" anchor="b"/>
+          <a:lstStyle>
+            <a:lvl1pPr algn="r">
+              <a:defRPr sz="1200"/>
+            </a:lvl1pPr>
+          </a:lstStyle>
+          <a:p>
+            <a:fld id="{20E657E1-BE6E-F343-8593-856120E10085}" type="slidenum">
+              <a:rPr lang="en-US" smtClean="0"/>
+              <a:t>‹#›</a:t>
+            </a:fld>
+            <a:endParaRPr lang="en-US"/>
+          </a:p>
+        </p:txBody>
+      </p:sp>
+    </p:spTree>
+    <p:extLst>
+      <p:ext uri="{BB962C8B-B14F-4D97-AF65-F5344CB8AC3E}">
+        <p14:creationId xmlns:p14="http://schemas.microsoft.com/office/powerpoint/2010/main" val="3723195320"/>
+      </p:ext>
+    </p:extLst>
+  </p:cSld>
+  <p:clrMap bg1="lt1" tx1="dk1" bg2="lt2" tx2="dk2" accent1="accent1" accent2="accent2" accent3="accent3" accent4="accent4" accent5="accent5" accent6="accent6" hlink="hlink" folHlink="folHlink"/>
+  <p:notesStyle>
+    <a:lvl1pPr marL="0" algn="l" defTabSz="914400" rtl="0" eaLnBrk="1" latinLnBrk="0" hangingPunct="1">
+      <a:defRPr sz="1200" kern="1200">
+        <a:solidFill>
+          <a:schemeClr val="tx1"/>
+        </a:solidFill>
+        <a:latin typeface="+mn-lt"/>
+        <a:ea typeface="+mn-ea"/>
+        <a:cs typeface="+mn-cs"/>
+      </a:defRPr>
+    </a:lvl1pPr>
+    <a:lvl2pPr marL="457200" algn="l" defTabSz="914400" rtl="0" eaLnBrk="1" latinLnBrk="0" hangingPunct="1">
+      <a:defRPr sz="1200" kern="1200">
+        <a:solidFill>
+          <a:schemeClr val="tx1"/>
+        </a:solidFill>
+        <a:latin typeface="+mn-lt"/>
+        <a:ea typeface="+mn-ea"/>
+        <a:cs typeface="+mn-cs"/>
+      </a:defRPr>
+    </a:lvl2pPr>
+    <a:lvl3pPr marL="914400" algn="l" defTabSz="914400" rtl="0" eaLnBrk="1" latinLnBrk="0" hangingPunct="1">
+      <a:defRPr sz="1200" kern="1200">
+        <a:solidFill>
+          <a:schemeClr val="tx1"/>
+        </a:solidFill>
+        <a:latin typeface="+mn-lt"/>
+        <a:ea typeface="+mn-ea"/>
+        <a:cs typeface="+mn-cs"/>
+      </a:defRPr>
+    </a:lvl3pPr>
+    <a:lvl4pPr marL="1371600" algn="l" defTabSz="914400" rtl="0" eaLnBrk="1" latinLnBrk="0" hangingPunct="1">
+      <a:defRPr sz="1200" kern="1200">
+        <a:solidFill>
+          <a:schemeClr val="tx1"/>
+        </a:solidFill>
+        <a:latin typeface="+mn-lt"/>
+        <a:ea typeface="+mn-ea"/>
+        <a:cs typeface="+mn-cs"/>
+      </a:defRPr>
+    </a:lvl4pPr>
+    <a:lvl5pPr marL="1828800" algn="l" defTabSz="914400" rtl="0" eaLnBrk="1" latinLnBrk="0" hangingPunct="1">
+      <a:defRPr sz="1200" kern="1200">
+        <a:solidFill>
+          <a:schemeClr val="tx1"/>
+        </a:solidFill>
+        <a:latin typeface="+mn-lt"/>
+        <a:ea typeface="+mn-ea"/>
+        <a:cs typeface="+mn-cs"/>
+      </a:defRPr>
+    </a:lvl5pPr>
+    <a:lvl6pPr marL="2286000" algn="l" defTabSz="914400" rtl="0" eaLnBrk="1" latinLnBrk="0" hangingPunct="1">
+      <a:defRPr sz="1200" kern="1200">
+        <a:solidFill>
+          <a:schemeClr val="tx1"/>
+        </a:solidFill>
+        <a:latin typeface="+mn-lt"/>
+        <a:ea typeface="+mn-ea"/>
+        <a:cs typeface="+mn-cs"/>
+      </a:defRPr>
+    </a:lvl6pPr>
+    <a:lvl7pPr marL="2743200" algn="l" defTabSz="914400" rtl="0" eaLnBrk="1" latinLnBrk="0" hangingPunct="1">
+      <a:defRPr sz="1200" kern="1200">
+        <a:solidFill>
+          <a:schemeClr val="tx1"/>
+        </a:solidFill>
+        <a:latin typeface="+mn-lt"/>
+        <a:ea typeface="+mn-ea"/>
+        <a:cs typeface="+mn-cs"/>
+      </a:defRPr>
+    </a:lvl7pPr>
+    <a:lvl8pPr marL="3200400" algn="l" defTabSz="914400" rtl="0" eaLnBrk="1" latinLnBrk="0" hangingPunct="1">
+      <a:defRPr sz="1200" kern="1200">
+        <a:solidFill>
+          <a:schemeClr val="tx1"/>
+        </a:solidFill>
+        <a:latin typeface="+mn-lt"/>
+        <a:ea typeface="+mn-ea"/>
+        <a:cs typeface="+mn-cs"/>
+      </a:defRPr>
+    </a:lvl8pPr>
+    <a:lvl9pPr marL="3657600" algn="l" defTabSz="914400" rtl="0" eaLnBrk="1" latinLnBrk="0" hangingPunct="1">
+      <a:defRPr sz="1200" kern="1200">
+        <a:solidFill>
+          <a:schemeClr val="tx1"/>
+        </a:solidFill>
+        <a:latin typeface="+mn-lt"/>
+        <a:ea typeface="+mn-ea"/>
+        <a:cs typeface="+mn-cs"/>
+      </a:defRPr>
+    </a:lvl9pPr>
+  </p:notesStyle>
+</p:notesMaster>
+</file>
+
+<file path=ppt/notesSlides/notesSlide1.xml><?xml version="1.0" encoding="utf-8"?>
+<p:notes xmlns:a="http://schemas.openxmlformats.org/drawingml/2006/main" xmlns:r="http://schemas.openxmlformats.org/officeDocument/2006/relationships" xmlns:p="http://schemas.openxmlformats.org/presentationml/2006/main">
+  <p:cSld>
+    <p:spTree>
+      <p:nvGrpSpPr>
+        <p:cNvPr id="1" name=""/>
+        <p:cNvGrpSpPr/>
+        <p:nvPr/>
+      </p:nvGrpSpPr>
+      <p:grpSpPr>
+        <a:xfrm>
+          <a:off x="0" y="0"/>
+          <a:ext cx="0" cy="0"/>
+          <a:chOff x="0" y="0"/>
+          <a:chExt cx="0" cy="0"/>
+        </a:xfrm>
+      </p:grpSpPr>
+      <p:sp>
+        <p:nvSpPr>
+          <p:cNvPr id="2" name="Slide Image Placeholder 1"/>
+          <p:cNvSpPr>
+            <a:spLocks noGrp="1" noRot="1" noChangeAspect="1"/>
+          </p:cNvSpPr>
+          <p:nvPr>
+            <p:ph type="sldImg"/>
+          </p:nvPr>
+        </p:nvSpPr>
+        <p:spPr/>
+      </p:sp>
+      <p:sp>
+        <p:nvSpPr>
+          <p:cNvPr id="3" name="Notes Placeholder 2"/>
+          <p:cNvSpPr>
+            <a:spLocks noGrp="1"/>
+          </p:cNvSpPr>
+          <p:nvPr>
+            <p:ph type="body" idx="1"/>
+          </p:nvPr>
+        </p:nvSpPr>
+        <p:spPr/>
+        <p:txBody>
+          <a:bodyPr/>
+          <a:lstStyle/>
+          <a:p>
+            <a:endParaRPr lang="en-US" dirty="0"/>
+          </a:p>
+        </p:txBody>
+      </p:sp>
+      <p:sp>
+        <p:nvSpPr>
+          <p:cNvPr id="4" name="Slide Number Placeholder 3"/>
+          <p:cNvSpPr>
+            <a:spLocks noGrp="1"/>
+          </p:cNvSpPr>
+          <p:nvPr>
+            <p:ph type="sldNum" sz="quarter" idx="5"/>
+          </p:nvPr>
+        </p:nvSpPr>
+        <p:spPr/>
+        <p:txBody>
+          <a:bodyPr/>
+          <a:lstStyle/>
+          <a:p>
+            <a:fld id="{20E657E1-BE6E-F343-8593-856120E10085}" type="slidenum">
+              <a:rPr lang="en-US" smtClean="0"/>
+              <a:t>3</a:t>
+            </a:fld>
+            <a:endParaRPr lang="en-US"/>
+          </a:p>
+        </p:txBody>
+      </p:sp>
+    </p:spTree>
+    <p:extLst>
+      <p:ext uri="{BB962C8B-B14F-4D97-AF65-F5344CB8AC3E}">
+        <p14:creationId xmlns:p14="http://schemas.microsoft.com/office/powerpoint/2010/main" val="2539276460"/>
+      </p:ext>
+    </p:extLst>
+  </p:cSld>
+  <p:clrMapOvr>
+    <a:masterClrMapping/>
+  </p:clrMapOvr>
+</p:notes>
+</file>
+
+<file path=ppt/notesSlides/notesSlide2.xml><?xml version="1.0" encoding="utf-8"?>
+<p:notes xmlns:a="http://schemas.openxmlformats.org/drawingml/2006/main" xmlns:r="http://schemas.openxmlformats.org/officeDocument/2006/relationships" xmlns:p="http://schemas.openxmlformats.org/presentationml/2006/main">
+  <p:cSld>
+    <p:spTree>
+      <p:nvGrpSpPr>
+        <p:cNvPr id="1" name=""/>
+        <p:cNvGrpSpPr/>
+        <p:nvPr/>
+      </p:nvGrpSpPr>
+      <p:grpSpPr>
+        <a:xfrm>
+          <a:off x="0" y="0"/>
+          <a:ext cx="0" cy="0"/>
+          <a:chOff x="0" y="0"/>
+          <a:chExt cx="0" cy="0"/>
+        </a:xfrm>
+      </p:grpSpPr>
+      <p:sp>
+        <p:nvSpPr>
+          <p:cNvPr id="2" name="Slide Image Placeholder 1"/>
+          <p:cNvSpPr>
+            <a:spLocks noGrp="1" noRot="1" noChangeAspect="1"/>
+          </p:cNvSpPr>
+          <p:nvPr>
+            <p:ph type="sldImg"/>
+          </p:nvPr>
+        </p:nvSpPr>
+        <p:spPr/>
+      </p:sp>
+      <p:sp>
+        <p:nvSpPr>
+          <p:cNvPr id="3" name="Notes Placeholder 2"/>
+          <p:cNvSpPr>
+            <a:spLocks noGrp="1"/>
+          </p:cNvSpPr>
+          <p:nvPr>
+            <p:ph type="body" idx="1"/>
+          </p:nvPr>
+        </p:nvSpPr>
+        <p:spPr/>
+        <p:txBody>
+          <a:bodyPr/>
+          <a:lstStyle/>
+          <a:p>
+            <a:r>
+              <a:rPr lang="en-US" dirty="0"/>
+              <a:t>Still, the subsystem is riddled with error</a:t>
+            </a:r>
+          </a:p>
+        </p:txBody>
+      </p:sp>
+      <p:sp>
+        <p:nvSpPr>
+          <p:cNvPr id="4" name="Slide Number Placeholder 3"/>
+          <p:cNvSpPr>
+            <a:spLocks noGrp="1"/>
+          </p:cNvSpPr>
+          <p:nvPr>
+            <p:ph type="sldNum" sz="quarter" idx="5"/>
+          </p:nvPr>
+        </p:nvSpPr>
+        <p:spPr/>
+        <p:txBody>
+          <a:bodyPr/>
+          <a:lstStyle/>
+          <a:p>
+            <a:fld id="{20E657E1-BE6E-F343-8593-856120E10085}" type="slidenum">
+              <a:rPr lang="en-US" smtClean="0"/>
+              <a:t>5</a:t>
+            </a:fld>
+            <a:endParaRPr lang="en-US"/>
+          </a:p>
+        </p:txBody>
+      </p:sp>
+    </p:spTree>
+    <p:extLst>
+      <p:ext uri="{BB962C8B-B14F-4D97-AF65-F5344CB8AC3E}">
+        <p14:creationId xmlns:p14="http://schemas.microsoft.com/office/powerpoint/2010/main" val="3001585224"/>
+      </p:ext>
+    </p:extLst>
+  </p:cSld>
+  <p:clrMapOvr>
+    <a:masterClrMapping/>
+  </p:clrMapOvr>
+</p:notes>
+</file>
+
+<file path=ppt/notesSlides/notesSlide3.xml><?xml version="1.0" encoding="utf-8"?>
+<p:notes xmlns:a="http://schemas.openxmlformats.org/drawingml/2006/main" xmlns:r="http://schemas.openxmlformats.org/officeDocument/2006/relationships" xmlns:p="http://schemas.openxmlformats.org/presentationml/2006/main">
+  <p:cSld>
+    <p:spTree>
+      <p:nvGrpSpPr>
+        <p:cNvPr id="1" name=""/>
+        <p:cNvGrpSpPr/>
+        <p:nvPr/>
+      </p:nvGrpSpPr>
+      <p:grpSpPr>
+        <a:xfrm>
+          <a:off x="0" y="0"/>
+          <a:ext cx="0" cy="0"/>
+          <a:chOff x="0" y="0"/>
+          <a:chExt cx="0" cy="0"/>
+        </a:xfrm>
+      </p:grpSpPr>
+      <p:sp>
+        <p:nvSpPr>
+          <p:cNvPr id="2" name="Slide Image Placeholder 1"/>
+          <p:cNvSpPr>
+            <a:spLocks noGrp="1" noRot="1" noChangeAspect="1"/>
+          </p:cNvSpPr>
+          <p:nvPr>
+            <p:ph type="sldImg"/>
+          </p:nvPr>
+        </p:nvSpPr>
+        <p:spPr/>
+      </p:sp>
+      <p:sp>
+        <p:nvSpPr>
+          <p:cNvPr id="3" name="Notes Placeholder 2"/>
+          <p:cNvSpPr>
+            <a:spLocks noGrp="1"/>
+          </p:cNvSpPr>
+          <p:nvPr>
+            <p:ph type="body" idx="1"/>
+          </p:nvPr>
+        </p:nvSpPr>
+        <p:spPr/>
+        <p:txBody>
+          <a:bodyPr/>
+          <a:lstStyle/>
+          <a:p>
+            <a:r>
+              <a:rPr lang="en-US" dirty="0"/>
+              <a:t>Draw attention to LLC-load-misses</a:t>
+            </a:r>
+          </a:p>
+        </p:txBody>
+      </p:sp>
+      <p:sp>
+        <p:nvSpPr>
+          <p:cNvPr id="4" name="Slide Number Placeholder 3"/>
+          <p:cNvSpPr>
+            <a:spLocks noGrp="1"/>
+          </p:cNvSpPr>
+          <p:nvPr>
+            <p:ph type="sldNum" sz="quarter" idx="5"/>
+          </p:nvPr>
+        </p:nvSpPr>
+        <p:spPr/>
+        <p:txBody>
+          <a:bodyPr/>
+          <a:lstStyle/>
+          <a:p>
+            <a:fld id="{20E657E1-BE6E-F343-8593-856120E10085}" type="slidenum">
+              <a:rPr lang="en-US" smtClean="0"/>
+              <a:t>6</a:t>
+            </a:fld>
+            <a:endParaRPr lang="en-US"/>
+          </a:p>
+        </p:txBody>
+      </p:sp>
+    </p:spTree>
+    <p:extLst>
+      <p:ext uri="{BB962C8B-B14F-4D97-AF65-F5344CB8AC3E}">
+        <p14:creationId xmlns:p14="http://schemas.microsoft.com/office/powerpoint/2010/main" val="55506833"/>
+      </p:ext>
+    </p:extLst>
+  </p:cSld>
+  <p:clrMapOvr>
+    <a:masterClrMapping/>
+  </p:clrMapOvr>
+</p:notes>
+</file>
+
+<file path=ppt/notesSlides/notesSlide4.xml><?xml version="1.0" encoding="utf-8"?>
+<p:notes xmlns:a="http://schemas.openxmlformats.org/drawingml/2006/main" xmlns:r="http://schemas.openxmlformats.org/officeDocument/2006/relationships" xmlns:p="http://schemas.openxmlformats.org/presentationml/2006/main">
+  <p:cSld>
+    <p:spTree>
+      <p:nvGrpSpPr>
+        <p:cNvPr id="1" name=""/>
+        <p:cNvGrpSpPr/>
+        <p:nvPr/>
+      </p:nvGrpSpPr>
+      <p:grpSpPr>
+        <a:xfrm>
+          <a:off x="0" y="0"/>
+          <a:ext cx="0" cy="0"/>
+          <a:chOff x="0" y="0"/>
+          <a:chExt cx="0" cy="0"/>
+        </a:xfrm>
+      </p:grpSpPr>
+      <p:sp>
+        <p:nvSpPr>
+          <p:cNvPr id="2" name="Slide Image Placeholder 1"/>
+          <p:cNvSpPr>
+            <a:spLocks noGrp="1" noRot="1" noChangeAspect="1"/>
+          </p:cNvSpPr>
+          <p:nvPr>
+            <p:ph type="sldImg"/>
+          </p:nvPr>
+        </p:nvSpPr>
+        <p:spPr/>
+      </p:sp>
+      <p:sp>
+        <p:nvSpPr>
+          <p:cNvPr id="3" name="Notes Placeholder 2"/>
+          <p:cNvSpPr>
+            <a:spLocks noGrp="1"/>
+          </p:cNvSpPr>
+          <p:nvPr>
+            <p:ph type="body" idx="1"/>
+          </p:nvPr>
+        </p:nvSpPr>
+        <p:spPr/>
+        <p:txBody>
+          <a:bodyPr/>
+          <a:lstStyle/>
+          <a:p>
+            <a:r>
+              <a:rPr lang="en-US" dirty="0"/>
+              <a:t>A significant source of error is due to multiplexing</a:t>
+            </a:r>
+          </a:p>
+          <a:p>
+            <a:endParaRPr lang="en-US" dirty="0"/>
+          </a:p>
+          <a:p>
+            <a:r>
+              <a:rPr lang="en-US" dirty="0"/>
+              <a:t>Raspberry Pi has 6 general purpose counters [1]</a:t>
+            </a:r>
+          </a:p>
+          <a:p>
+            <a:endParaRPr lang="en-US" dirty="0"/>
+          </a:p>
+          <a:p>
+            <a:pPr marL="171450" indent="-171450">
+              <a:buFontTx/>
+              <a:buChar char="-"/>
+            </a:pPr>
+            <a:r>
+              <a:rPr lang="en-US" dirty="0"/>
+              <a:t>Ran 1-6, 12, and 24 events in perf stat –e &lt;events&gt; on stress-ng</a:t>
+            </a:r>
+          </a:p>
+          <a:p>
+            <a:pPr marL="171450" indent="-171450">
+              <a:buFontTx/>
+              <a:buChar char="-"/>
+            </a:pPr>
+            <a:r>
+              <a:rPr lang="en-US" dirty="0"/>
+              <a:t>LLC-load-misses was the pre-selected event</a:t>
+            </a:r>
+          </a:p>
+        </p:txBody>
+      </p:sp>
+      <p:sp>
+        <p:nvSpPr>
+          <p:cNvPr id="4" name="Slide Number Placeholder 3"/>
+          <p:cNvSpPr>
+            <a:spLocks noGrp="1"/>
+          </p:cNvSpPr>
+          <p:nvPr>
+            <p:ph type="sldNum" sz="quarter" idx="5"/>
+          </p:nvPr>
+        </p:nvSpPr>
+        <p:spPr/>
+        <p:txBody>
+          <a:bodyPr/>
+          <a:lstStyle/>
+          <a:p>
+            <a:fld id="{20E657E1-BE6E-F343-8593-856120E10085}" type="slidenum">
+              <a:rPr lang="en-US" smtClean="0"/>
+              <a:t>7</a:t>
+            </a:fld>
+            <a:endParaRPr lang="en-US"/>
+          </a:p>
+        </p:txBody>
+      </p:sp>
+    </p:spTree>
+    <p:extLst>
+      <p:ext uri="{BB962C8B-B14F-4D97-AF65-F5344CB8AC3E}">
+        <p14:creationId xmlns:p14="http://schemas.microsoft.com/office/powerpoint/2010/main" val="4032821406"/>
+      </p:ext>
+    </p:extLst>
+  </p:cSld>
+  <p:clrMapOvr>
+    <a:masterClrMapping/>
+  </p:clrMapOvr>
+</p:notes>
+</file>
+
+<file path=ppt/notesSlides/notesSlide5.xml><?xml version="1.0" encoding="utf-8"?>
+<p:notes xmlns:a="http://schemas.openxmlformats.org/drawingml/2006/main" xmlns:r="http://schemas.openxmlformats.org/officeDocument/2006/relationships" xmlns:p="http://schemas.openxmlformats.org/presentationml/2006/main">
+  <p:cSld>
+    <p:spTree>
+      <p:nvGrpSpPr>
+        <p:cNvPr id="1" name=""/>
+        <p:cNvGrpSpPr/>
+        <p:nvPr/>
+      </p:nvGrpSpPr>
+      <p:grpSpPr>
+        <a:xfrm>
+          <a:off x="0" y="0"/>
+          <a:ext cx="0" cy="0"/>
+          <a:chOff x="0" y="0"/>
+          <a:chExt cx="0" cy="0"/>
+        </a:xfrm>
+      </p:grpSpPr>
+      <p:sp>
+        <p:nvSpPr>
+          <p:cNvPr id="2" name="Slide Image Placeholder 1"/>
+          <p:cNvSpPr>
+            <a:spLocks noGrp="1" noRot="1" noChangeAspect="1"/>
+          </p:cNvSpPr>
+          <p:nvPr>
+            <p:ph type="sldImg"/>
+          </p:nvPr>
+        </p:nvSpPr>
+        <p:spPr/>
+      </p:sp>
+      <p:sp>
+        <p:nvSpPr>
+          <p:cNvPr id="3" name="Notes Placeholder 2"/>
+          <p:cNvSpPr>
+            <a:spLocks noGrp="1"/>
+          </p:cNvSpPr>
+          <p:nvPr>
+            <p:ph type="body" idx="1"/>
+          </p:nvPr>
+        </p:nvSpPr>
+        <p:spPr/>
+        <p:txBody>
+          <a:bodyPr/>
+          <a:lstStyle/>
+          <a:p>
+            <a:r>
+              <a:rPr lang="en-US" sz="1200" dirty="0"/>
+              <a:t>Once a hardware event group fails to be scheduled, software events are scheduled onto the remaining counters.</a:t>
+            </a:r>
+          </a:p>
+          <a:p>
+            <a:endParaRPr lang="en-US" dirty="0"/>
+          </a:p>
+          <a:p>
+            <a:r>
+              <a:rPr lang="en-US" sz="1200" dirty="0"/>
+              <a:t>This reduces time on PMU for hardware events which exacerbates error from extrapolation</a:t>
+            </a:r>
+          </a:p>
+        </p:txBody>
+      </p:sp>
+      <p:sp>
+        <p:nvSpPr>
+          <p:cNvPr id="4" name="Slide Number Placeholder 3"/>
+          <p:cNvSpPr>
+            <a:spLocks noGrp="1"/>
+          </p:cNvSpPr>
+          <p:nvPr>
+            <p:ph type="sldNum" sz="quarter" idx="5"/>
+          </p:nvPr>
+        </p:nvSpPr>
+        <p:spPr/>
+        <p:txBody>
+          <a:bodyPr/>
+          <a:lstStyle/>
+          <a:p>
+            <a:fld id="{20E657E1-BE6E-F343-8593-856120E10085}" type="slidenum">
+              <a:rPr lang="en-US" smtClean="0"/>
+              <a:t>9</a:t>
+            </a:fld>
+            <a:endParaRPr lang="en-US"/>
+          </a:p>
+        </p:txBody>
+      </p:sp>
+    </p:spTree>
+    <p:extLst>
+      <p:ext uri="{BB962C8B-B14F-4D97-AF65-F5344CB8AC3E}">
+        <p14:creationId xmlns:p14="http://schemas.microsoft.com/office/powerpoint/2010/main" val="1375549576"/>
+      </p:ext>
+    </p:extLst>
+  </p:cSld>
+  <p:clrMapOvr>
+    <a:masterClrMapping/>
+  </p:clrMapOvr>
+</p:notes>
+</file>
+
 <file path=ppt/slideLayouts/slideLayout1.xml><?xml version="1.0" encoding="utf-8"?>
 <p:sldLayout xmlns:a="http://schemas.openxmlformats.org/drawingml/2006/main" xmlns:r="http://schemas.openxmlformats.org/officeDocument/2006/relationships" xmlns:p="http://schemas.openxmlformats.org/presentationml/2006/main" type="title" preserve="1">
   <p:cSld name="Title Slide">
@@ -262,7 +1092,7 @@
           <a:p>
             <a:fld id="{73D3FF47-2591-1F46-9009-B1A03C8BD516}" type="datetimeFigureOut">
               <a:rPr lang="en-US" smtClean="0"/>
-              <a:t>4/2/23</a:t>
+              <a:t>4/3/23</a:t>
             </a:fld>
             <a:endParaRPr lang="en-US"/>
           </a:p>
@@ -460,7 +1290,7 @@
           <a:p>
             <a:fld id="{73D3FF47-2591-1F46-9009-B1A03C8BD516}" type="datetimeFigureOut">
               <a:rPr lang="en-US" smtClean="0"/>
-              <a:t>4/2/23</a:t>
+              <a:t>4/3/23</a:t>
             </a:fld>
             <a:endParaRPr lang="en-US"/>
           </a:p>
@@ -668,7 +1498,7 @@
           <a:p>
             <a:fld id="{73D3FF47-2591-1F46-9009-B1A03C8BD516}" type="datetimeFigureOut">
               <a:rPr lang="en-US" smtClean="0"/>
-              <a:t>4/2/23</a:t>
+              <a:t>4/3/23</a:t>
             </a:fld>
             <a:endParaRPr lang="en-US"/>
           </a:p>
@@ -866,7 +1696,7 @@
           <a:p>
             <a:fld id="{73D3FF47-2591-1F46-9009-B1A03C8BD516}" type="datetimeFigureOut">
               <a:rPr lang="en-US" smtClean="0"/>
-              <a:t>4/2/23</a:t>
+              <a:t>4/3/23</a:t>
             </a:fld>
             <a:endParaRPr lang="en-US"/>
           </a:p>
@@ -1141,7 +1971,7 @@
           <a:p>
             <a:fld id="{73D3FF47-2591-1F46-9009-B1A03C8BD516}" type="datetimeFigureOut">
               <a:rPr lang="en-US" smtClean="0"/>
-              <a:t>4/2/23</a:t>
+              <a:t>4/3/23</a:t>
             </a:fld>
             <a:endParaRPr lang="en-US"/>
           </a:p>
@@ -1406,7 +2236,7 @@
           <a:p>
             <a:fld id="{73D3FF47-2591-1F46-9009-B1A03C8BD516}" type="datetimeFigureOut">
               <a:rPr lang="en-US" smtClean="0"/>
-              <a:t>4/2/23</a:t>
+              <a:t>4/3/23</a:t>
             </a:fld>
             <a:endParaRPr lang="en-US"/>
           </a:p>
@@ -1818,7 +2648,7 @@
           <a:p>
             <a:fld id="{73D3FF47-2591-1F46-9009-B1A03C8BD516}" type="datetimeFigureOut">
               <a:rPr lang="en-US" smtClean="0"/>
-              <a:t>4/2/23</a:t>
+              <a:t>4/3/23</a:t>
             </a:fld>
             <a:endParaRPr lang="en-US"/>
           </a:p>
@@ -1959,7 +2789,7 @@
           <a:p>
             <a:fld id="{73D3FF47-2591-1F46-9009-B1A03C8BD516}" type="datetimeFigureOut">
               <a:rPr lang="en-US" smtClean="0"/>
-              <a:t>4/2/23</a:t>
+              <a:t>4/3/23</a:t>
             </a:fld>
             <a:endParaRPr lang="en-US"/>
           </a:p>
@@ -2072,7 +2902,7 @@
           <a:p>
             <a:fld id="{73D3FF47-2591-1F46-9009-B1A03C8BD516}" type="datetimeFigureOut">
               <a:rPr lang="en-US" smtClean="0"/>
-              <a:t>4/2/23</a:t>
+              <a:t>4/3/23</a:t>
             </a:fld>
             <a:endParaRPr lang="en-US"/>
           </a:p>
@@ -2383,7 +3213,7 @@
           <a:p>
             <a:fld id="{73D3FF47-2591-1F46-9009-B1A03C8BD516}" type="datetimeFigureOut">
               <a:rPr lang="en-US" smtClean="0"/>
-              <a:t>4/2/23</a:t>
+              <a:t>4/3/23</a:t>
             </a:fld>
             <a:endParaRPr lang="en-US"/>
           </a:p>
@@ -2671,7 +3501,7 @@
           <a:p>
             <a:fld id="{73D3FF47-2591-1F46-9009-B1A03C8BD516}" type="datetimeFigureOut">
               <a:rPr lang="en-US" smtClean="0"/>
-              <a:t>4/2/23</a:t>
+              <a:t>4/3/23</a:t>
             </a:fld>
             <a:endParaRPr lang="en-US"/>
           </a:p>
@@ -2912,7 +3742,7 @@
           <a:p>
             <a:fld id="{73D3FF47-2591-1F46-9009-B1A03C8BD516}" type="datetimeFigureOut">
               <a:rPr lang="en-US" smtClean="0"/>
-              <a:t>4/2/23</a:t>
+              <a:t>4/3/23</a:t>
             </a:fld>
             <a:endParaRPr lang="en-US"/>
           </a:p>
@@ -3420,7 +4250,7 @@
           <p:cNvPr id="2" name="Title 1">
             <a:extLst>
               <a:ext uri="{FF2B5EF4-FFF2-40B4-BE49-F238E27FC236}">
-                <a16:creationId xmlns:a16="http://schemas.microsoft.com/office/drawing/2014/main" id="{5D8E885C-FAA1-37CA-9CC7-F3F42D34CFCE}"/>
+                <a16:creationId xmlns:a16="http://schemas.microsoft.com/office/drawing/2014/main" id="{E36BEA65-A799-43EA-B9F3-4EDD2E369B33}"/>
               </a:ext>
             </a:extLst>
           </p:cNvPr>
@@ -3438,7 +4268,7 @@
           <a:p>
             <a:r>
               <a:rPr lang="en-US" dirty="0"/>
-              <a:t>Multiplexing</a:t>
+              <a:t>Revisiting HPCs</a:t>
             </a:r>
           </a:p>
         </p:txBody>
@@ -3448,7 +4278,7 @@
           <p:cNvPr id="3" name="Content Placeholder 2">
             <a:extLst>
               <a:ext uri="{FF2B5EF4-FFF2-40B4-BE49-F238E27FC236}">
-                <a16:creationId xmlns:a16="http://schemas.microsoft.com/office/drawing/2014/main" id="{B6714A6E-E22D-4D51-1041-835523FD247E}"/>
+                <a16:creationId xmlns:a16="http://schemas.microsoft.com/office/drawing/2014/main" id="{FF8D27E3-29D3-41AB-5BD2-5EBC9B693384}"/>
               </a:ext>
             </a:extLst>
           </p:cNvPr>
@@ -3466,51 +4296,662 @@
           <a:p>
             <a:r>
               <a:rPr lang="en-US" dirty="0"/>
-              <a:t>Events must be time-shared on to counters</a:t>
+              <a:t>Hardware Performance Counters measure micro-architectural events</a:t>
             </a:r>
           </a:p>
           <a:p>
             <a:r>
               <a:rPr lang="en-US" dirty="0"/>
-              <a:t>Motivates event scheduling</a:t>
-            </a:r>
-          </a:p>
-        </p:txBody>
-      </p:sp>
-      <p:pic>
-        <p:nvPicPr>
-          <p:cNvPr id="5" name="Picture 4">
-            <a:extLst>
-              <a:ext uri="{FF2B5EF4-FFF2-40B4-BE49-F238E27FC236}">
-                <a16:creationId xmlns:a16="http://schemas.microsoft.com/office/drawing/2014/main" id="{41D21213-54A9-4DE8-BAF4-16714DE5F2F0}"/>
-              </a:ext>
-            </a:extLst>
-          </p:cNvPr>
-          <p:cNvPicPr>
-            <a:picLocks noChangeAspect="1"/>
-          </p:cNvPicPr>
+              <a:t>Special purpose registers used for performance analysis</a:t>
+            </a:r>
+          </a:p>
+        </p:txBody>
+      </p:sp>
+      <p:sp>
+        <p:nvSpPr>
+          <p:cNvPr id="39" name="Footer Placeholder 4">
+            <a:extLst>
+              <a:ext uri="{FF2B5EF4-FFF2-40B4-BE49-F238E27FC236}">
+                <a16:creationId xmlns:a16="http://schemas.microsoft.com/office/drawing/2014/main" id="{44EE8F04-96AA-E5CB-8BFB-C74E30282A4E}"/>
+              </a:ext>
+            </a:extLst>
+          </p:cNvPr>
+          <p:cNvSpPr txBox="1">
+            <a:spLocks/>
+          </p:cNvSpPr>
           <p:nvPr/>
-        </p:nvPicPr>
-        <p:blipFill>
-          <a:blip r:embed="rId2"/>
-          <a:stretch>
-            <a:fillRect/>
-          </a:stretch>
-        </p:blipFill>
+        </p:nvSpPr>
         <p:spPr>
           <a:xfrm>
-            <a:off x="2971800" y="3089275"/>
-            <a:ext cx="6248400" cy="3403600"/>
+            <a:off x="838199" y="6356350"/>
+            <a:ext cx="6928945" cy="365125"/>
           </a:xfrm>
           <a:prstGeom prst="rect">
             <a:avLst/>
           </a:prstGeom>
         </p:spPr>
-      </p:pic>
+        <p:txBody>
+          <a:bodyPr vert="horz" lIns="91440" tIns="45720" rIns="91440" bIns="45720" rtlCol="0" anchor="ctr"/>
+          <a:lstStyle>
+            <a:defPPr>
+              <a:defRPr lang="en-US"/>
+            </a:defPPr>
+            <a:lvl1pPr marL="0" algn="ctr" defTabSz="914400" rtl="0" eaLnBrk="1" latinLnBrk="0" hangingPunct="1">
+              <a:defRPr sz="1200" kern="1200">
+                <a:solidFill>
+                  <a:schemeClr val="bg1">
+                    <a:lumMod val="75000"/>
+                  </a:schemeClr>
+                </a:solidFill>
+                <a:latin typeface="+mn-lt"/>
+                <a:ea typeface="+mn-ea"/>
+                <a:cs typeface="+mn-cs"/>
+              </a:defRPr>
+            </a:lvl1pPr>
+            <a:lvl2pPr marL="457200" algn="l" defTabSz="914400" rtl="0" eaLnBrk="1" latinLnBrk="0" hangingPunct="1">
+              <a:defRPr sz="1800" kern="1200">
+                <a:solidFill>
+                  <a:schemeClr val="tx1"/>
+                </a:solidFill>
+                <a:latin typeface="+mn-lt"/>
+                <a:ea typeface="+mn-ea"/>
+                <a:cs typeface="+mn-cs"/>
+              </a:defRPr>
+            </a:lvl2pPr>
+            <a:lvl3pPr marL="914400" algn="l" defTabSz="914400" rtl="0" eaLnBrk="1" latinLnBrk="0" hangingPunct="1">
+              <a:defRPr sz="1800" kern="1200">
+                <a:solidFill>
+                  <a:schemeClr val="tx1"/>
+                </a:solidFill>
+                <a:latin typeface="+mn-lt"/>
+                <a:ea typeface="+mn-ea"/>
+                <a:cs typeface="+mn-cs"/>
+              </a:defRPr>
+            </a:lvl3pPr>
+            <a:lvl4pPr marL="1371600" algn="l" defTabSz="914400" rtl="0" eaLnBrk="1" latinLnBrk="0" hangingPunct="1">
+              <a:defRPr sz="1800" kern="1200">
+                <a:solidFill>
+                  <a:schemeClr val="tx1"/>
+                </a:solidFill>
+                <a:latin typeface="+mn-lt"/>
+                <a:ea typeface="+mn-ea"/>
+                <a:cs typeface="+mn-cs"/>
+              </a:defRPr>
+            </a:lvl4pPr>
+            <a:lvl5pPr marL="1828800" algn="l" defTabSz="914400" rtl="0" eaLnBrk="1" latinLnBrk="0" hangingPunct="1">
+              <a:defRPr sz="1800" kern="1200">
+                <a:solidFill>
+                  <a:schemeClr val="tx1"/>
+                </a:solidFill>
+                <a:latin typeface="+mn-lt"/>
+                <a:ea typeface="+mn-ea"/>
+                <a:cs typeface="+mn-cs"/>
+              </a:defRPr>
+            </a:lvl5pPr>
+            <a:lvl6pPr marL="2286000" algn="l" defTabSz="914400" rtl="0" eaLnBrk="1" latinLnBrk="0" hangingPunct="1">
+              <a:defRPr sz="1800" kern="1200">
+                <a:solidFill>
+                  <a:schemeClr val="tx1"/>
+                </a:solidFill>
+                <a:latin typeface="+mn-lt"/>
+                <a:ea typeface="+mn-ea"/>
+                <a:cs typeface="+mn-cs"/>
+              </a:defRPr>
+            </a:lvl6pPr>
+            <a:lvl7pPr marL="2743200" algn="l" defTabSz="914400" rtl="0" eaLnBrk="1" latinLnBrk="0" hangingPunct="1">
+              <a:defRPr sz="1800" kern="1200">
+                <a:solidFill>
+                  <a:schemeClr val="tx1"/>
+                </a:solidFill>
+                <a:latin typeface="+mn-lt"/>
+                <a:ea typeface="+mn-ea"/>
+                <a:cs typeface="+mn-cs"/>
+              </a:defRPr>
+            </a:lvl7pPr>
+            <a:lvl8pPr marL="3200400" algn="l" defTabSz="914400" rtl="0" eaLnBrk="1" latinLnBrk="0" hangingPunct="1">
+              <a:defRPr sz="1800" kern="1200">
+                <a:solidFill>
+                  <a:schemeClr val="tx1"/>
+                </a:solidFill>
+                <a:latin typeface="+mn-lt"/>
+                <a:ea typeface="+mn-ea"/>
+                <a:cs typeface="+mn-cs"/>
+              </a:defRPr>
+            </a:lvl8pPr>
+            <a:lvl9pPr marL="3657600" algn="l" defTabSz="914400" rtl="0" eaLnBrk="1" latinLnBrk="0" hangingPunct="1">
+              <a:defRPr sz="1800" kern="1200">
+                <a:solidFill>
+                  <a:schemeClr val="tx1"/>
+                </a:solidFill>
+                <a:latin typeface="+mn-lt"/>
+                <a:ea typeface="+mn-ea"/>
+                <a:cs typeface="+mn-cs"/>
+              </a:defRPr>
+            </a:lvl9pPr>
+          </a:lstStyle>
+          <a:p>
+            <a:r>
+              <a:rPr lang="en-US" dirty="0"/>
+              <a:t>CSE 522S – Operating Systems Organization. Marion Sudvarg, David Ferry, Chris Gill, Brian Kocoloski </a:t>
+            </a:r>
+          </a:p>
+        </p:txBody>
+      </p:sp>
+      <p:grpSp>
+        <p:nvGrpSpPr>
+          <p:cNvPr id="40" name="Group 39">
+            <a:extLst>
+              <a:ext uri="{FF2B5EF4-FFF2-40B4-BE49-F238E27FC236}">
+                <a16:creationId xmlns:a16="http://schemas.microsoft.com/office/drawing/2014/main" id="{0F9426AE-A71C-405D-1D6E-E04F7B544464}"/>
+              </a:ext>
+            </a:extLst>
+          </p:cNvPr>
+          <p:cNvGrpSpPr/>
+          <p:nvPr/>
+        </p:nvGrpSpPr>
+        <p:grpSpPr>
+          <a:xfrm>
+            <a:off x="4343400" y="3429000"/>
+            <a:ext cx="3505200" cy="2623515"/>
+            <a:chOff x="298704" y="1034085"/>
+            <a:chExt cx="3505200" cy="2623515"/>
+          </a:xfrm>
+        </p:grpSpPr>
+        <p:sp>
+          <p:nvSpPr>
+            <p:cNvPr id="41" name="Rectangle 40">
+              <a:extLst>
+                <a:ext uri="{FF2B5EF4-FFF2-40B4-BE49-F238E27FC236}">
+                  <a16:creationId xmlns:a16="http://schemas.microsoft.com/office/drawing/2014/main" id="{A9514E7F-C40B-E889-EC29-EFB11971B421}"/>
+                </a:ext>
+              </a:extLst>
+            </p:cNvPr>
+            <p:cNvSpPr/>
+            <p:nvPr/>
+          </p:nvSpPr>
+          <p:spPr>
+            <a:xfrm>
+              <a:off x="298704" y="1034085"/>
+              <a:ext cx="3505200" cy="2623515"/>
+            </a:xfrm>
+            <a:prstGeom prst="rect">
+              <a:avLst/>
+            </a:prstGeom>
+          </p:spPr>
+          <p:style>
+            <a:lnRef idx="2">
+              <a:schemeClr val="accent3">
+                <a:shade val="50000"/>
+              </a:schemeClr>
+            </a:lnRef>
+            <a:fillRef idx="1">
+              <a:schemeClr val="accent3"/>
+            </a:fillRef>
+            <a:effectRef idx="0">
+              <a:schemeClr val="accent3"/>
+            </a:effectRef>
+            <a:fontRef idx="minor">
+              <a:schemeClr val="lt1"/>
+            </a:fontRef>
+          </p:style>
+          <p:txBody>
+            <a:bodyPr rtlCol="0" anchor="t" anchorCtr="0"/>
+            <a:lstStyle/>
+            <a:p>
+              <a:pPr algn="ctr"/>
+              <a:r>
+                <a:rPr lang="en-US" dirty="0"/>
+                <a:t>ARM Cortex-A53</a:t>
+              </a:r>
+            </a:p>
+          </p:txBody>
+        </p:sp>
+        <p:sp>
+          <p:nvSpPr>
+            <p:cNvPr id="42" name="Rectangle 41">
+              <a:extLst>
+                <a:ext uri="{FF2B5EF4-FFF2-40B4-BE49-F238E27FC236}">
+                  <a16:creationId xmlns:a16="http://schemas.microsoft.com/office/drawing/2014/main" id="{06DEC5D4-A6E7-30C0-D99D-7EC31D4154AB}"/>
+                </a:ext>
+              </a:extLst>
+            </p:cNvPr>
+            <p:cNvSpPr/>
+            <p:nvPr/>
+          </p:nvSpPr>
+          <p:spPr>
+            <a:xfrm>
+              <a:off x="457200" y="1417638"/>
+              <a:ext cx="811424" cy="793267"/>
+            </a:xfrm>
+            <a:prstGeom prst="rect">
+              <a:avLst/>
+            </a:prstGeom>
+          </p:spPr>
+          <p:style>
+            <a:lnRef idx="2">
+              <a:schemeClr val="accent1">
+                <a:shade val="50000"/>
+              </a:schemeClr>
+            </a:lnRef>
+            <a:fillRef idx="1">
+              <a:schemeClr val="accent1"/>
+            </a:fillRef>
+            <a:effectRef idx="0">
+              <a:schemeClr val="accent1"/>
+            </a:effectRef>
+            <a:fontRef idx="minor">
+              <a:schemeClr val="lt1"/>
+            </a:fontRef>
+          </p:style>
+          <p:txBody>
+            <a:bodyPr rtlCol="0" anchor="ctr"/>
+            <a:lstStyle/>
+            <a:p>
+              <a:pPr algn="ctr"/>
+              <a:r>
+                <a:rPr lang="en-US" dirty="0"/>
+                <a:t>CPU Core</a:t>
+              </a:r>
+            </a:p>
+          </p:txBody>
+        </p:sp>
+        <p:sp>
+          <p:nvSpPr>
+            <p:cNvPr id="43" name="Rectangle 42">
+              <a:extLst>
+                <a:ext uri="{FF2B5EF4-FFF2-40B4-BE49-F238E27FC236}">
+                  <a16:creationId xmlns:a16="http://schemas.microsoft.com/office/drawing/2014/main" id="{0624B255-245E-B7CD-63CC-C8DD4FD2EE5E}"/>
+                </a:ext>
+              </a:extLst>
+            </p:cNvPr>
+            <p:cNvSpPr/>
+            <p:nvPr/>
+          </p:nvSpPr>
+          <p:spPr>
+            <a:xfrm>
+              <a:off x="1268624" y="1417638"/>
+              <a:ext cx="712576" cy="628743"/>
+            </a:xfrm>
+            <a:prstGeom prst="rect">
+              <a:avLst/>
+            </a:prstGeom>
+          </p:spPr>
+          <p:style>
+            <a:lnRef idx="2">
+              <a:schemeClr val="accent6">
+                <a:shade val="50000"/>
+              </a:schemeClr>
+            </a:lnRef>
+            <a:fillRef idx="1">
+              <a:schemeClr val="accent6"/>
+            </a:fillRef>
+            <a:effectRef idx="0">
+              <a:schemeClr val="accent6"/>
+            </a:effectRef>
+            <a:fontRef idx="minor">
+              <a:schemeClr val="lt1"/>
+            </a:fontRef>
+          </p:style>
+          <p:txBody>
+            <a:bodyPr rtlCol="0" anchor="ctr"/>
+            <a:lstStyle/>
+            <a:p>
+              <a:pPr algn="ctr"/>
+              <a:r>
+                <a:rPr lang="en-US" dirty="0"/>
+                <a:t>PMU</a:t>
+              </a:r>
+            </a:p>
+          </p:txBody>
+        </p:sp>
+        <p:sp>
+          <p:nvSpPr>
+            <p:cNvPr id="44" name="Rectangle 43">
+              <a:extLst>
+                <a:ext uri="{FF2B5EF4-FFF2-40B4-BE49-F238E27FC236}">
+                  <a16:creationId xmlns:a16="http://schemas.microsoft.com/office/drawing/2014/main" id="{CBC7AC4E-75EA-1A94-B3B3-14735F76D6A9}"/>
+                </a:ext>
+              </a:extLst>
+            </p:cNvPr>
+            <p:cNvSpPr/>
+            <p:nvPr/>
+          </p:nvSpPr>
+          <p:spPr>
+            <a:xfrm>
+              <a:off x="2080048" y="1417638"/>
+              <a:ext cx="811424" cy="793267"/>
+            </a:xfrm>
+            <a:prstGeom prst="rect">
+              <a:avLst/>
+            </a:prstGeom>
+          </p:spPr>
+          <p:style>
+            <a:lnRef idx="2">
+              <a:schemeClr val="accent1">
+                <a:shade val="50000"/>
+              </a:schemeClr>
+            </a:lnRef>
+            <a:fillRef idx="1">
+              <a:schemeClr val="accent1"/>
+            </a:fillRef>
+            <a:effectRef idx="0">
+              <a:schemeClr val="accent1"/>
+            </a:effectRef>
+            <a:fontRef idx="minor">
+              <a:schemeClr val="lt1"/>
+            </a:fontRef>
+          </p:style>
+          <p:txBody>
+            <a:bodyPr rtlCol="0" anchor="ctr"/>
+            <a:lstStyle/>
+            <a:p>
+              <a:pPr algn="ctr"/>
+              <a:r>
+                <a:rPr lang="en-US" dirty="0"/>
+                <a:t>CPU Core</a:t>
+              </a:r>
+            </a:p>
+          </p:txBody>
+        </p:sp>
+        <p:sp>
+          <p:nvSpPr>
+            <p:cNvPr id="45" name="Rectangle 44">
+              <a:extLst>
+                <a:ext uri="{FF2B5EF4-FFF2-40B4-BE49-F238E27FC236}">
+                  <a16:creationId xmlns:a16="http://schemas.microsoft.com/office/drawing/2014/main" id="{69A73126-C473-A22E-7F08-8649C903788B}"/>
+                </a:ext>
+              </a:extLst>
+            </p:cNvPr>
+            <p:cNvSpPr/>
+            <p:nvPr/>
+          </p:nvSpPr>
+          <p:spPr>
+            <a:xfrm>
+              <a:off x="2891472" y="1417638"/>
+              <a:ext cx="712576" cy="628743"/>
+            </a:xfrm>
+            <a:prstGeom prst="rect">
+              <a:avLst/>
+            </a:prstGeom>
+          </p:spPr>
+          <p:style>
+            <a:lnRef idx="2">
+              <a:schemeClr val="accent6">
+                <a:shade val="50000"/>
+              </a:schemeClr>
+            </a:lnRef>
+            <a:fillRef idx="1">
+              <a:schemeClr val="accent6"/>
+            </a:fillRef>
+            <a:effectRef idx="0">
+              <a:schemeClr val="accent6"/>
+            </a:effectRef>
+            <a:fontRef idx="minor">
+              <a:schemeClr val="lt1"/>
+            </a:fontRef>
+          </p:style>
+          <p:txBody>
+            <a:bodyPr rtlCol="0" anchor="ctr"/>
+            <a:lstStyle/>
+            <a:p>
+              <a:pPr algn="ctr"/>
+              <a:r>
+                <a:rPr lang="en-US" dirty="0"/>
+                <a:t>PMU</a:t>
+              </a:r>
+            </a:p>
+          </p:txBody>
+        </p:sp>
+        <p:sp>
+          <p:nvSpPr>
+            <p:cNvPr id="46" name="Rectangle 45">
+              <a:extLst>
+                <a:ext uri="{FF2B5EF4-FFF2-40B4-BE49-F238E27FC236}">
+                  <a16:creationId xmlns:a16="http://schemas.microsoft.com/office/drawing/2014/main" id="{D691AC5A-DCD0-FC13-295A-203367AC585B}"/>
+                </a:ext>
+              </a:extLst>
+            </p:cNvPr>
+            <p:cNvSpPr/>
+            <p:nvPr/>
+          </p:nvSpPr>
+          <p:spPr>
+            <a:xfrm>
+              <a:off x="457200" y="2396114"/>
+              <a:ext cx="811424" cy="793267"/>
+            </a:xfrm>
+            <a:prstGeom prst="rect">
+              <a:avLst/>
+            </a:prstGeom>
+          </p:spPr>
+          <p:style>
+            <a:lnRef idx="2">
+              <a:schemeClr val="accent1">
+                <a:shade val="50000"/>
+              </a:schemeClr>
+            </a:lnRef>
+            <a:fillRef idx="1">
+              <a:schemeClr val="accent1"/>
+            </a:fillRef>
+            <a:effectRef idx="0">
+              <a:schemeClr val="accent1"/>
+            </a:effectRef>
+            <a:fontRef idx="minor">
+              <a:schemeClr val="lt1"/>
+            </a:fontRef>
+          </p:style>
+          <p:txBody>
+            <a:bodyPr rtlCol="0" anchor="ctr"/>
+            <a:lstStyle/>
+            <a:p>
+              <a:pPr algn="ctr"/>
+              <a:r>
+                <a:rPr lang="en-US" dirty="0"/>
+                <a:t>CPU Core</a:t>
+              </a:r>
+            </a:p>
+          </p:txBody>
+        </p:sp>
+        <p:sp>
+          <p:nvSpPr>
+            <p:cNvPr id="47" name="Rectangle 46">
+              <a:extLst>
+                <a:ext uri="{FF2B5EF4-FFF2-40B4-BE49-F238E27FC236}">
+                  <a16:creationId xmlns:a16="http://schemas.microsoft.com/office/drawing/2014/main" id="{BE7AB23D-1916-56FB-0649-6851A9B70CA6}"/>
+                </a:ext>
+              </a:extLst>
+            </p:cNvPr>
+            <p:cNvSpPr/>
+            <p:nvPr/>
+          </p:nvSpPr>
+          <p:spPr>
+            <a:xfrm>
+              <a:off x="1268624" y="2396114"/>
+              <a:ext cx="712576" cy="628743"/>
+            </a:xfrm>
+            <a:prstGeom prst="rect">
+              <a:avLst/>
+            </a:prstGeom>
+          </p:spPr>
+          <p:style>
+            <a:lnRef idx="2">
+              <a:schemeClr val="accent6">
+                <a:shade val="50000"/>
+              </a:schemeClr>
+            </a:lnRef>
+            <a:fillRef idx="1">
+              <a:schemeClr val="accent6"/>
+            </a:fillRef>
+            <a:effectRef idx="0">
+              <a:schemeClr val="accent6"/>
+            </a:effectRef>
+            <a:fontRef idx="minor">
+              <a:schemeClr val="lt1"/>
+            </a:fontRef>
+          </p:style>
+          <p:txBody>
+            <a:bodyPr rtlCol="0" anchor="ctr"/>
+            <a:lstStyle/>
+            <a:p>
+              <a:pPr algn="ctr"/>
+              <a:r>
+                <a:rPr lang="en-US" dirty="0"/>
+                <a:t>PMU</a:t>
+              </a:r>
+            </a:p>
+          </p:txBody>
+        </p:sp>
+        <p:sp>
+          <p:nvSpPr>
+            <p:cNvPr id="48" name="Rectangle 47">
+              <a:extLst>
+                <a:ext uri="{FF2B5EF4-FFF2-40B4-BE49-F238E27FC236}">
+                  <a16:creationId xmlns:a16="http://schemas.microsoft.com/office/drawing/2014/main" id="{8106DDF9-C571-2126-A06F-3D441ABA5B51}"/>
+                </a:ext>
+              </a:extLst>
+            </p:cNvPr>
+            <p:cNvSpPr/>
+            <p:nvPr/>
+          </p:nvSpPr>
+          <p:spPr>
+            <a:xfrm>
+              <a:off x="2080048" y="2396114"/>
+              <a:ext cx="811424" cy="793267"/>
+            </a:xfrm>
+            <a:prstGeom prst="rect">
+              <a:avLst/>
+            </a:prstGeom>
+          </p:spPr>
+          <p:style>
+            <a:lnRef idx="2">
+              <a:schemeClr val="accent1">
+                <a:shade val="50000"/>
+              </a:schemeClr>
+            </a:lnRef>
+            <a:fillRef idx="1">
+              <a:schemeClr val="accent1"/>
+            </a:fillRef>
+            <a:effectRef idx="0">
+              <a:schemeClr val="accent1"/>
+            </a:effectRef>
+            <a:fontRef idx="minor">
+              <a:schemeClr val="lt1"/>
+            </a:fontRef>
+          </p:style>
+          <p:txBody>
+            <a:bodyPr rtlCol="0" anchor="ctr"/>
+            <a:lstStyle/>
+            <a:p>
+              <a:pPr algn="ctr"/>
+              <a:r>
+                <a:rPr lang="en-US" dirty="0"/>
+                <a:t>CPU Core</a:t>
+              </a:r>
+            </a:p>
+          </p:txBody>
+        </p:sp>
+        <p:sp>
+          <p:nvSpPr>
+            <p:cNvPr id="49" name="Rectangle 48">
+              <a:extLst>
+                <a:ext uri="{FF2B5EF4-FFF2-40B4-BE49-F238E27FC236}">
+                  <a16:creationId xmlns:a16="http://schemas.microsoft.com/office/drawing/2014/main" id="{E4365132-600F-BBCC-86A0-85B66AC87796}"/>
+                </a:ext>
+              </a:extLst>
+            </p:cNvPr>
+            <p:cNvSpPr/>
+            <p:nvPr/>
+          </p:nvSpPr>
+          <p:spPr>
+            <a:xfrm>
+              <a:off x="2891472" y="2396114"/>
+              <a:ext cx="712576" cy="628743"/>
+            </a:xfrm>
+            <a:prstGeom prst="rect">
+              <a:avLst/>
+            </a:prstGeom>
+          </p:spPr>
+          <p:style>
+            <a:lnRef idx="2">
+              <a:schemeClr val="accent6">
+                <a:shade val="50000"/>
+              </a:schemeClr>
+            </a:lnRef>
+            <a:fillRef idx="1">
+              <a:schemeClr val="accent6"/>
+            </a:fillRef>
+            <a:effectRef idx="0">
+              <a:schemeClr val="accent6"/>
+            </a:effectRef>
+            <a:fontRef idx="minor">
+              <a:schemeClr val="lt1"/>
+            </a:fontRef>
+          </p:style>
+          <p:txBody>
+            <a:bodyPr rtlCol="0" anchor="ctr"/>
+            <a:lstStyle/>
+            <a:p>
+              <a:pPr algn="ctr"/>
+              <a:r>
+                <a:rPr lang="en-US" dirty="0"/>
+                <a:t>PMU</a:t>
+              </a:r>
+            </a:p>
+          </p:txBody>
+        </p:sp>
+        <p:sp>
+          <p:nvSpPr>
+            <p:cNvPr id="50" name="Rectangle 49">
+              <a:extLst>
+                <a:ext uri="{FF2B5EF4-FFF2-40B4-BE49-F238E27FC236}">
+                  <a16:creationId xmlns:a16="http://schemas.microsoft.com/office/drawing/2014/main" id="{22E74C1E-EA76-9114-9CE6-2B333ECCB15B}"/>
+                </a:ext>
+              </a:extLst>
+            </p:cNvPr>
+            <p:cNvSpPr/>
+            <p:nvPr/>
+          </p:nvSpPr>
+          <p:spPr>
+            <a:xfrm>
+              <a:off x="457200" y="3289589"/>
+              <a:ext cx="3146848" cy="249525"/>
+            </a:xfrm>
+            <a:prstGeom prst="rect">
+              <a:avLst/>
+            </a:prstGeom>
+          </p:spPr>
+          <p:style>
+            <a:lnRef idx="2">
+              <a:schemeClr val="accent2">
+                <a:shade val="50000"/>
+              </a:schemeClr>
+            </a:lnRef>
+            <a:fillRef idx="1">
+              <a:schemeClr val="accent2"/>
+            </a:fillRef>
+            <a:effectRef idx="0">
+              <a:schemeClr val="accent2"/>
+            </a:effectRef>
+            <a:fontRef idx="minor">
+              <a:schemeClr val="lt1"/>
+            </a:fontRef>
+          </p:style>
+          <p:txBody>
+            <a:bodyPr rtlCol="0" anchor="ctr"/>
+            <a:lstStyle/>
+            <a:p>
+              <a:pPr algn="ctr"/>
+              <a:r>
+                <a:rPr lang="en-US" dirty="0"/>
+                <a:t>L2 Cache</a:t>
+              </a:r>
+            </a:p>
+          </p:txBody>
+        </p:sp>
+      </p:grpSp>
     </p:spTree>
     <p:extLst>
       <p:ext uri="{BB962C8B-B14F-4D97-AF65-F5344CB8AC3E}">
-        <p14:creationId xmlns:p14="http://schemas.microsoft.com/office/powerpoint/2010/main" val="2339680507"/>
+        <p14:creationId xmlns:p14="http://schemas.microsoft.com/office/powerpoint/2010/main" val="2173332"/>
       </p:ext>
     </p:extLst>
   </p:cSld>
@@ -3537,12 +4978,1216 @@
           <a:chExt cx="0" cy="0"/>
         </a:xfrm>
       </p:grpSpPr>
-      <p:sp>
-        <p:nvSpPr>
-          <p:cNvPr id="2" name="Title 1">
-            <a:extLst>
-              <a:ext uri="{FF2B5EF4-FFF2-40B4-BE49-F238E27FC236}">
-                <a16:creationId xmlns:a16="http://schemas.microsoft.com/office/drawing/2014/main" id="{D0C68011-41C2-2645-E240-30FA9548DD5A}"/>
+      <p:grpSp>
+        <p:nvGrpSpPr>
+          <p:cNvPr id="6" name="Group 5">
+            <a:extLst>
+              <a:ext uri="{FF2B5EF4-FFF2-40B4-BE49-F238E27FC236}">
+                <a16:creationId xmlns:a16="http://schemas.microsoft.com/office/drawing/2014/main" id="{9954D2DB-667F-B2B3-773D-F064463F53A1}"/>
+              </a:ext>
+            </a:extLst>
+          </p:cNvPr>
+          <p:cNvGrpSpPr/>
+          <p:nvPr/>
+        </p:nvGrpSpPr>
+        <p:grpSpPr>
+          <a:xfrm>
+            <a:off x="3358376" y="1510862"/>
+            <a:ext cx="5475247" cy="4591523"/>
+            <a:chOff x="5184072" y="1199677"/>
+            <a:chExt cx="5475247" cy="4591523"/>
+          </a:xfrm>
+        </p:grpSpPr>
+        <p:sp>
+          <p:nvSpPr>
+            <p:cNvPr id="7" name="Rectangle 6">
+              <a:extLst>
+                <a:ext uri="{FF2B5EF4-FFF2-40B4-BE49-F238E27FC236}">
+                  <a16:creationId xmlns:a16="http://schemas.microsoft.com/office/drawing/2014/main" id="{87E2F916-8327-3A0A-BB44-BD582E2201E0}"/>
+                </a:ext>
+              </a:extLst>
+            </p:cNvPr>
+            <p:cNvSpPr/>
+            <p:nvPr/>
+          </p:nvSpPr>
+          <p:spPr>
+            <a:xfrm>
+              <a:off x="5184072" y="1199677"/>
+              <a:ext cx="5475247" cy="4591523"/>
+            </a:xfrm>
+            <a:prstGeom prst="rect">
+              <a:avLst/>
+            </a:prstGeom>
+          </p:spPr>
+          <p:style>
+            <a:lnRef idx="2">
+              <a:schemeClr val="accent6">
+                <a:shade val="50000"/>
+              </a:schemeClr>
+            </a:lnRef>
+            <a:fillRef idx="1">
+              <a:schemeClr val="accent6"/>
+            </a:fillRef>
+            <a:effectRef idx="0">
+              <a:schemeClr val="accent6"/>
+            </a:effectRef>
+            <a:fontRef idx="minor">
+              <a:schemeClr val="lt1"/>
+            </a:fontRef>
+          </p:style>
+          <p:txBody>
+            <a:bodyPr rtlCol="0" anchor="t" anchorCtr="0"/>
+            <a:lstStyle/>
+            <a:p>
+              <a:pPr algn="ctr"/>
+              <a:r>
+                <a:rPr lang="en-US" dirty="0"/>
+                <a:t>PMU</a:t>
+              </a:r>
+            </a:p>
+          </p:txBody>
+        </p:sp>
+        <p:sp>
+          <p:nvSpPr>
+            <p:cNvPr id="22" name="TextBox 21">
+              <a:extLst>
+                <a:ext uri="{FF2B5EF4-FFF2-40B4-BE49-F238E27FC236}">
+                  <a16:creationId xmlns:a16="http://schemas.microsoft.com/office/drawing/2014/main" id="{D8EB5499-2FF0-3CBA-4C76-CDD34D2A7AEC}"/>
+                </a:ext>
+              </a:extLst>
+            </p:cNvPr>
+            <p:cNvSpPr txBox="1"/>
+            <p:nvPr/>
+          </p:nvSpPr>
+          <p:spPr>
+            <a:xfrm>
+              <a:off x="5909940" y="1494472"/>
+              <a:ext cx="4605660" cy="1477328"/>
+            </a:xfrm>
+            <a:prstGeom prst="rect">
+              <a:avLst/>
+            </a:prstGeom>
+            <a:noFill/>
+          </p:spPr>
+          <p:txBody>
+            <a:bodyPr wrap="square" rtlCol="0">
+              <a:spAutoFit/>
+            </a:bodyPr>
+            <a:lstStyle/>
+            <a:p>
+              <a:r>
+                <a:rPr lang="en-US" dirty="0"/>
+                <a:t>Performance Monitors Control Register</a:t>
+              </a:r>
+            </a:p>
+            <a:p>
+              <a:pPr marL="285750" indent="-285750">
+                <a:buFont typeface="Arial" panose="020B0604020202020204" pitchFamily="34" charset="0"/>
+                <a:buChar char="•"/>
+              </a:pPr>
+              <a:r>
+                <a:rPr lang="en-US" dirty="0"/>
+                <a:t>32-bits</a:t>
+              </a:r>
+            </a:p>
+            <a:p>
+              <a:pPr marL="285750" indent="-285750">
+                <a:buFont typeface="Arial" panose="020B0604020202020204" pitchFamily="34" charset="0"/>
+                <a:buChar char="•"/>
+              </a:pPr>
+              <a:r>
+                <a:rPr lang="en-US" dirty="0"/>
+                <a:t>Each bit is an individual control</a:t>
+              </a:r>
+            </a:p>
+            <a:p>
+              <a:pPr marL="285750" indent="-285750">
+                <a:buFont typeface="Arial" panose="020B0604020202020204" pitchFamily="34" charset="0"/>
+                <a:buChar char="•"/>
+              </a:pPr>
+              <a:r>
+                <a:rPr lang="en-US" dirty="0"/>
+                <a:t>Enable, reset, 32/64-bit mode, report number of counters, etc.</a:t>
+              </a:r>
+            </a:p>
+          </p:txBody>
+        </p:sp>
+        <p:sp>
+          <p:nvSpPr>
+            <p:cNvPr id="24" name="TextBox 23">
+              <a:extLst>
+                <a:ext uri="{FF2B5EF4-FFF2-40B4-BE49-F238E27FC236}">
+                  <a16:creationId xmlns:a16="http://schemas.microsoft.com/office/drawing/2014/main" id="{6882C246-EA89-B878-4F52-EE587678E136}"/>
+                </a:ext>
+              </a:extLst>
+            </p:cNvPr>
+            <p:cNvSpPr txBox="1"/>
+            <p:nvPr/>
+          </p:nvSpPr>
+          <p:spPr>
+            <a:xfrm>
+              <a:off x="6351908" y="3088427"/>
+              <a:ext cx="4260069" cy="369332"/>
+            </a:xfrm>
+            <a:prstGeom prst="rect">
+              <a:avLst/>
+            </a:prstGeom>
+            <a:noFill/>
+          </p:spPr>
+          <p:txBody>
+            <a:bodyPr wrap="square" rtlCol="0">
+              <a:spAutoFit/>
+            </a:bodyPr>
+            <a:lstStyle/>
+            <a:p>
+              <a:pPr algn="ctr"/>
+              <a:r>
+                <a:rPr lang="en-US" dirty="0"/>
+                <a:t>Performance Monitors Cycle Count Register</a:t>
+              </a:r>
+            </a:p>
+          </p:txBody>
+        </p:sp>
+        <p:sp>
+          <p:nvSpPr>
+            <p:cNvPr id="25" name="TextBox 24">
+              <a:extLst>
+                <a:ext uri="{FF2B5EF4-FFF2-40B4-BE49-F238E27FC236}">
+                  <a16:creationId xmlns:a16="http://schemas.microsoft.com/office/drawing/2014/main" id="{75C0C510-4E8C-5341-FDEC-9E58B3D545DB}"/>
+                </a:ext>
+              </a:extLst>
+            </p:cNvPr>
+            <p:cNvSpPr txBox="1"/>
+            <p:nvPr/>
+          </p:nvSpPr>
+          <p:spPr>
+            <a:xfrm>
+              <a:off x="5193120" y="3808274"/>
+              <a:ext cx="5418856" cy="1754326"/>
+            </a:xfrm>
+            <a:prstGeom prst="rect">
+              <a:avLst/>
+            </a:prstGeom>
+            <a:noFill/>
+          </p:spPr>
+          <p:txBody>
+            <a:bodyPr wrap="square" rtlCol="0">
+              <a:spAutoFit/>
+            </a:bodyPr>
+            <a:lstStyle/>
+            <a:p>
+              <a:r>
+                <a:rPr lang="en-US" dirty="0"/>
+                <a:t>Performance Monitor Event Counters</a:t>
+              </a:r>
+            </a:p>
+            <a:p>
+              <a:r>
+                <a:rPr lang="en-US" dirty="0"/>
+                <a:t>and Performance Monitor Event Types</a:t>
+              </a:r>
+            </a:p>
+            <a:p>
+              <a:pPr marL="285750" indent="-285750">
+                <a:buFont typeface="Arial" panose="020B0604020202020204" pitchFamily="34" charset="0"/>
+                <a:buChar char="•"/>
+              </a:pPr>
+              <a:r>
+                <a:rPr lang="en-US" dirty="0"/>
+                <a:t>Event type register controls corresponding counter</a:t>
+              </a:r>
+            </a:p>
+            <a:p>
+              <a:pPr marL="285750" indent="-285750">
+                <a:buFont typeface="Arial" panose="020B0604020202020204" pitchFamily="34" charset="0"/>
+                <a:buChar char="•"/>
+              </a:pPr>
+              <a:r>
+                <a:rPr lang="en-US" dirty="0"/>
+                <a:t>Reset by setting counter to 0</a:t>
+              </a:r>
+            </a:p>
+            <a:p>
+              <a:pPr marL="285750" indent="-285750">
+                <a:buFont typeface="Arial" panose="020B0604020202020204" pitchFamily="34" charset="0"/>
+                <a:buChar char="•"/>
+              </a:pPr>
+              <a:r>
+                <a:rPr lang="en-US" dirty="0"/>
+                <a:t>Enable 64-bit mode by chaining subsequent counters</a:t>
+              </a:r>
+            </a:p>
+            <a:p>
+              <a:r>
+                <a:rPr lang="en-US" dirty="0"/>
+                <a:t> </a:t>
+              </a:r>
+            </a:p>
+          </p:txBody>
+        </p:sp>
+        <p:sp>
+          <p:nvSpPr>
+            <p:cNvPr id="32" name="Rectangle 31">
+              <a:extLst>
+                <a:ext uri="{FF2B5EF4-FFF2-40B4-BE49-F238E27FC236}">
+                  <a16:creationId xmlns:a16="http://schemas.microsoft.com/office/drawing/2014/main" id="{64F39ED2-B3C9-B2C2-531D-0B36084AC7DF}"/>
+                </a:ext>
+              </a:extLst>
+            </p:cNvPr>
+            <p:cNvSpPr/>
+            <p:nvPr/>
+          </p:nvSpPr>
+          <p:spPr>
+            <a:xfrm>
+              <a:off x="5224140" y="1609362"/>
+              <a:ext cx="685800" cy="310321"/>
+            </a:xfrm>
+            <a:prstGeom prst="rect">
+              <a:avLst/>
+            </a:prstGeom>
+          </p:spPr>
+          <p:style>
+            <a:lnRef idx="2">
+              <a:schemeClr val="accent2">
+                <a:shade val="50000"/>
+              </a:schemeClr>
+            </a:lnRef>
+            <a:fillRef idx="1">
+              <a:schemeClr val="accent2"/>
+            </a:fillRef>
+            <a:effectRef idx="0">
+              <a:schemeClr val="accent2"/>
+            </a:effectRef>
+            <a:fontRef idx="minor">
+              <a:schemeClr val="lt1"/>
+            </a:fontRef>
+          </p:style>
+          <p:txBody>
+            <a:bodyPr rtlCol="0" anchor="t" anchorCtr="0"/>
+            <a:lstStyle/>
+            <a:p>
+              <a:pPr algn="ctr"/>
+              <a:r>
+                <a:rPr lang="en-US" sz="1400" dirty="0"/>
+                <a:t>PMCR</a:t>
+              </a:r>
+            </a:p>
+          </p:txBody>
+        </p:sp>
+        <p:grpSp>
+          <p:nvGrpSpPr>
+            <p:cNvPr id="33" name="Group 32">
+              <a:extLst>
+                <a:ext uri="{FF2B5EF4-FFF2-40B4-BE49-F238E27FC236}">
+                  <a16:creationId xmlns:a16="http://schemas.microsoft.com/office/drawing/2014/main" id="{A702681D-7645-4FAB-1EA1-B6886DD179E5}"/>
+                </a:ext>
+              </a:extLst>
+            </p:cNvPr>
+            <p:cNvGrpSpPr/>
+            <p:nvPr/>
+          </p:nvGrpSpPr>
+          <p:grpSpPr>
+            <a:xfrm>
+              <a:off x="5224140" y="3069852"/>
+              <a:ext cx="1179132" cy="663948"/>
+              <a:chOff x="3700140" y="2993652"/>
+              <a:chExt cx="1179132" cy="663948"/>
+            </a:xfrm>
+          </p:grpSpPr>
+          <p:sp>
+            <p:nvSpPr>
+              <p:cNvPr id="60" name="Rectangle 59">
+                <a:extLst>
+                  <a:ext uri="{FF2B5EF4-FFF2-40B4-BE49-F238E27FC236}">
+                    <a16:creationId xmlns:a16="http://schemas.microsoft.com/office/drawing/2014/main" id="{244036D2-753E-ED78-FCDD-ED613341D6DA}"/>
+                  </a:ext>
+                </a:extLst>
+              </p:cNvPr>
+              <p:cNvSpPr/>
+              <p:nvPr/>
+            </p:nvSpPr>
+            <p:spPr>
+              <a:xfrm>
+                <a:off x="3700140" y="2993652"/>
+                <a:ext cx="1179132" cy="663948"/>
+              </a:xfrm>
+              <a:prstGeom prst="rect">
+                <a:avLst/>
+              </a:prstGeom>
+            </p:spPr>
+            <p:style>
+              <a:lnRef idx="2">
+                <a:schemeClr val="accent2">
+                  <a:shade val="50000"/>
+                </a:schemeClr>
+              </a:lnRef>
+              <a:fillRef idx="1">
+                <a:schemeClr val="accent2"/>
+              </a:fillRef>
+              <a:effectRef idx="0">
+                <a:schemeClr val="accent2"/>
+              </a:effectRef>
+              <a:fontRef idx="minor">
+                <a:schemeClr val="lt1"/>
+              </a:fontRef>
+            </p:style>
+            <p:txBody>
+              <a:bodyPr rtlCol="0" anchor="t" anchorCtr="0"/>
+              <a:lstStyle/>
+              <a:p>
+                <a:pPr algn="ctr"/>
+                <a:r>
+                  <a:rPr lang="en-US" sz="1400" dirty="0"/>
+                  <a:t>PMCNTR</a:t>
+                </a:r>
+              </a:p>
+            </p:txBody>
+          </p:sp>
+          <p:sp>
+            <p:nvSpPr>
+              <p:cNvPr id="61" name="Rectangle 60">
+                <a:extLst>
+                  <a:ext uri="{FF2B5EF4-FFF2-40B4-BE49-F238E27FC236}">
+                    <a16:creationId xmlns:a16="http://schemas.microsoft.com/office/drawing/2014/main" id="{9AA35EBB-51F8-EC3C-40E8-8C8A88711861}"/>
+                  </a:ext>
+                </a:extLst>
+              </p:cNvPr>
+              <p:cNvSpPr/>
+              <p:nvPr/>
+            </p:nvSpPr>
+            <p:spPr>
+              <a:xfrm>
+                <a:off x="4295677" y="3276600"/>
+                <a:ext cx="563419" cy="355165"/>
+              </a:xfrm>
+              <a:prstGeom prst="rect">
+                <a:avLst/>
+              </a:prstGeom>
+            </p:spPr>
+            <p:style>
+              <a:lnRef idx="2">
+                <a:schemeClr val="accent1">
+                  <a:shade val="50000"/>
+                </a:schemeClr>
+              </a:lnRef>
+              <a:fillRef idx="1">
+                <a:schemeClr val="accent1"/>
+              </a:fillRef>
+              <a:effectRef idx="0">
+                <a:schemeClr val="accent1"/>
+              </a:effectRef>
+              <a:fontRef idx="minor">
+                <a:schemeClr val="lt1"/>
+              </a:fontRef>
+            </p:style>
+            <p:txBody>
+              <a:bodyPr rtlCol="0" anchor="ctr"/>
+              <a:lstStyle/>
+              <a:p>
+                <a:pPr algn="ctr"/>
+                <a:r>
+                  <a:rPr lang="en-US" sz="1200" dirty="0"/>
+                  <a:t>0-31</a:t>
+                </a:r>
+              </a:p>
+            </p:txBody>
+          </p:sp>
+          <p:sp>
+            <p:nvSpPr>
+              <p:cNvPr id="62" name="Rectangle 61">
+                <a:extLst>
+                  <a:ext uri="{FF2B5EF4-FFF2-40B4-BE49-F238E27FC236}">
+                    <a16:creationId xmlns:a16="http://schemas.microsoft.com/office/drawing/2014/main" id="{C4F52DE3-50CA-B02E-36DF-CF79FD220B27}"/>
+                  </a:ext>
+                </a:extLst>
+              </p:cNvPr>
+              <p:cNvSpPr/>
+              <p:nvPr/>
+            </p:nvSpPr>
+            <p:spPr>
+              <a:xfrm>
+                <a:off x="3706252" y="3276601"/>
+                <a:ext cx="563420" cy="355165"/>
+              </a:xfrm>
+              <a:prstGeom prst="rect">
+                <a:avLst/>
+              </a:prstGeom>
+            </p:spPr>
+            <p:style>
+              <a:lnRef idx="2">
+                <a:schemeClr val="accent1">
+                  <a:shade val="50000"/>
+                </a:schemeClr>
+              </a:lnRef>
+              <a:fillRef idx="1">
+                <a:schemeClr val="accent1"/>
+              </a:fillRef>
+              <a:effectRef idx="0">
+                <a:schemeClr val="accent1"/>
+              </a:effectRef>
+              <a:fontRef idx="minor">
+                <a:schemeClr val="lt1"/>
+              </a:fontRef>
+            </p:style>
+            <p:txBody>
+              <a:bodyPr rtlCol="0" anchor="ctr"/>
+              <a:lstStyle/>
+              <a:p>
+                <a:pPr algn="ctr"/>
+                <a:r>
+                  <a:rPr lang="en-US" sz="1200" dirty="0"/>
+                  <a:t>32-63</a:t>
+                </a:r>
+              </a:p>
+            </p:txBody>
+          </p:sp>
+        </p:grpSp>
+        <p:grpSp>
+          <p:nvGrpSpPr>
+            <p:cNvPr id="47" name="Group 46">
+              <a:extLst>
+                <a:ext uri="{FF2B5EF4-FFF2-40B4-BE49-F238E27FC236}">
+                  <a16:creationId xmlns:a16="http://schemas.microsoft.com/office/drawing/2014/main" id="{55991D26-5602-18E1-3F53-6709235206A9}"/>
+                </a:ext>
+              </a:extLst>
+            </p:cNvPr>
+            <p:cNvGrpSpPr/>
+            <p:nvPr/>
+          </p:nvGrpSpPr>
+          <p:grpSpPr>
+            <a:xfrm>
+              <a:off x="5245493" y="5239176"/>
+              <a:ext cx="5376741" cy="475824"/>
+              <a:chOff x="3721492" y="5120719"/>
+              <a:chExt cx="5376741" cy="475824"/>
+            </a:xfrm>
+          </p:grpSpPr>
+          <p:sp>
+            <p:nvSpPr>
+              <p:cNvPr id="48" name="Rectangle 47">
+                <a:extLst>
+                  <a:ext uri="{FF2B5EF4-FFF2-40B4-BE49-F238E27FC236}">
+                    <a16:creationId xmlns:a16="http://schemas.microsoft.com/office/drawing/2014/main" id="{97AE9EF3-760F-C421-9B46-99F4FFAD3C32}"/>
+                  </a:ext>
+                </a:extLst>
+              </p:cNvPr>
+              <p:cNvSpPr/>
+              <p:nvPr/>
+            </p:nvSpPr>
+            <p:spPr>
+              <a:xfrm>
+                <a:off x="3721493" y="5120719"/>
+                <a:ext cx="892093" cy="227781"/>
+              </a:xfrm>
+              <a:prstGeom prst="rect">
+                <a:avLst/>
+              </a:prstGeom>
+            </p:spPr>
+            <p:style>
+              <a:lnRef idx="2">
+                <a:schemeClr val="accent2">
+                  <a:shade val="50000"/>
+                </a:schemeClr>
+              </a:lnRef>
+              <a:fillRef idx="1">
+                <a:schemeClr val="accent2"/>
+              </a:fillRef>
+              <a:effectRef idx="0">
+                <a:schemeClr val="accent2"/>
+              </a:effectRef>
+              <a:fontRef idx="minor">
+                <a:schemeClr val="lt1"/>
+              </a:fontRef>
+            </p:style>
+            <p:txBody>
+              <a:bodyPr lIns="0" tIns="0" rIns="0" bIns="0" rtlCol="0" anchor="t" anchorCtr="0"/>
+              <a:lstStyle/>
+              <a:p>
+                <a:pPr algn="ctr"/>
+                <a:r>
+                  <a:rPr lang="en-US" sz="1200" dirty="0"/>
+                  <a:t>PMEVCNTR0</a:t>
+                </a:r>
+              </a:p>
+            </p:txBody>
+          </p:sp>
+          <p:sp>
+            <p:nvSpPr>
+              <p:cNvPr id="49" name="Rectangle 48">
+                <a:extLst>
+                  <a:ext uri="{FF2B5EF4-FFF2-40B4-BE49-F238E27FC236}">
+                    <a16:creationId xmlns:a16="http://schemas.microsoft.com/office/drawing/2014/main" id="{07444459-2C94-1565-3637-39BDCF05D19D}"/>
+                  </a:ext>
+                </a:extLst>
+              </p:cNvPr>
+              <p:cNvSpPr/>
+              <p:nvPr/>
+            </p:nvSpPr>
+            <p:spPr>
+              <a:xfrm>
+                <a:off x="3721492" y="5368762"/>
+                <a:ext cx="892094" cy="227781"/>
+              </a:xfrm>
+              <a:prstGeom prst="rect">
+                <a:avLst/>
+              </a:prstGeom>
+            </p:spPr>
+            <p:style>
+              <a:lnRef idx="2">
+                <a:schemeClr val="accent2">
+                  <a:shade val="50000"/>
+                </a:schemeClr>
+              </a:lnRef>
+              <a:fillRef idx="1">
+                <a:schemeClr val="accent2"/>
+              </a:fillRef>
+              <a:effectRef idx="0">
+                <a:schemeClr val="accent2"/>
+              </a:effectRef>
+              <a:fontRef idx="minor">
+                <a:schemeClr val="lt1"/>
+              </a:fontRef>
+            </p:style>
+            <p:txBody>
+              <a:bodyPr lIns="0" tIns="0" rIns="0" bIns="0" rtlCol="0" anchor="t" anchorCtr="0"/>
+              <a:lstStyle/>
+              <a:p>
+                <a:pPr algn="ctr"/>
+                <a:r>
+                  <a:rPr lang="en-US" sz="1200" dirty="0"/>
+                  <a:t>PMEVTYPER0</a:t>
+                </a:r>
+              </a:p>
+            </p:txBody>
+          </p:sp>
+          <p:sp>
+            <p:nvSpPr>
+              <p:cNvPr id="50" name="Rectangle 49">
+                <a:extLst>
+                  <a:ext uri="{FF2B5EF4-FFF2-40B4-BE49-F238E27FC236}">
+                    <a16:creationId xmlns:a16="http://schemas.microsoft.com/office/drawing/2014/main" id="{B171E072-E10E-3B4B-4568-6295D15729DB}"/>
+                  </a:ext>
+                </a:extLst>
+              </p:cNvPr>
+              <p:cNvSpPr/>
+              <p:nvPr/>
+            </p:nvSpPr>
+            <p:spPr>
+              <a:xfrm>
+                <a:off x="4621207" y="5120719"/>
+                <a:ext cx="892093" cy="227781"/>
+              </a:xfrm>
+              <a:prstGeom prst="rect">
+                <a:avLst/>
+              </a:prstGeom>
+            </p:spPr>
+            <p:style>
+              <a:lnRef idx="2">
+                <a:schemeClr val="accent2">
+                  <a:shade val="50000"/>
+                </a:schemeClr>
+              </a:lnRef>
+              <a:fillRef idx="1">
+                <a:schemeClr val="accent2"/>
+              </a:fillRef>
+              <a:effectRef idx="0">
+                <a:schemeClr val="accent2"/>
+              </a:effectRef>
+              <a:fontRef idx="minor">
+                <a:schemeClr val="lt1"/>
+              </a:fontRef>
+            </p:style>
+            <p:txBody>
+              <a:bodyPr lIns="0" tIns="0" rIns="0" bIns="0" rtlCol="0" anchor="t" anchorCtr="0"/>
+              <a:lstStyle/>
+              <a:p>
+                <a:pPr algn="ctr"/>
+                <a:r>
+                  <a:rPr lang="en-US" sz="1200" dirty="0"/>
+                  <a:t>PMEVCNTR1</a:t>
+                </a:r>
+              </a:p>
+            </p:txBody>
+          </p:sp>
+          <p:sp>
+            <p:nvSpPr>
+              <p:cNvPr id="51" name="Rectangle 50">
+                <a:extLst>
+                  <a:ext uri="{FF2B5EF4-FFF2-40B4-BE49-F238E27FC236}">
+                    <a16:creationId xmlns:a16="http://schemas.microsoft.com/office/drawing/2014/main" id="{0D0FF0D1-72C6-BE32-1C3D-910573025D83}"/>
+                  </a:ext>
+                </a:extLst>
+              </p:cNvPr>
+              <p:cNvSpPr/>
+              <p:nvPr/>
+            </p:nvSpPr>
+            <p:spPr>
+              <a:xfrm>
+                <a:off x="4621206" y="5368762"/>
+                <a:ext cx="892094" cy="227781"/>
+              </a:xfrm>
+              <a:prstGeom prst="rect">
+                <a:avLst/>
+              </a:prstGeom>
+            </p:spPr>
+            <p:style>
+              <a:lnRef idx="2">
+                <a:schemeClr val="accent2">
+                  <a:shade val="50000"/>
+                </a:schemeClr>
+              </a:lnRef>
+              <a:fillRef idx="1">
+                <a:schemeClr val="accent2"/>
+              </a:fillRef>
+              <a:effectRef idx="0">
+                <a:schemeClr val="accent2"/>
+              </a:effectRef>
+              <a:fontRef idx="minor">
+                <a:schemeClr val="lt1"/>
+              </a:fontRef>
+            </p:style>
+            <p:txBody>
+              <a:bodyPr lIns="0" tIns="0" rIns="0" bIns="0" rtlCol="0" anchor="t" anchorCtr="0"/>
+              <a:lstStyle/>
+              <a:p>
+                <a:pPr algn="ctr"/>
+                <a:r>
+                  <a:rPr lang="en-US" sz="1200" dirty="0"/>
+                  <a:t>PMEVTYPER1</a:t>
+                </a:r>
+              </a:p>
+            </p:txBody>
+          </p:sp>
+          <p:sp>
+            <p:nvSpPr>
+              <p:cNvPr id="52" name="Rectangle 51">
+                <a:extLst>
+                  <a:ext uri="{FF2B5EF4-FFF2-40B4-BE49-F238E27FC236}">
+                    <a16:creationId xmlns:a16="http://schemas.microsoft.com/office/drawing/2014/main" id="{7F38698B-0BAD-F484-F94C-4C9977341C02}"/>
+                  </a:ext>
+                </a:extLst>
+              </p:cNvPr>
+              <p:cNvSpPr/>
+              <p:nvPr/>
+            </p:nvSpPr>
+            <p:spPr>
+              <a:xfrm>
+                <a:off x="5521475" y="5120719"/>
+                <a:ext cx="892093" cy="227781"/>
+              </a:xfrm>
+              <a:prstGeom prst="rect">
+                <a:avLst/>
+              </a:prstGeom>
+            </p:spPr>
+            <p:style>
+              <a:lnRef idx="2">
+                <a:schemeClr val="accent2">
+                  <a:shade val="50000"/>
+                </a:schemeClr>
+              </a:lnRef>
+              <a:fillRef idx="1">
+                <a:schemeClr val="accent2"/>
+              </a:fillRef>
+              <a:effectRef idx="0">
+                <a:schemeClr val="accent2"/>
+              </a:effectRef>
+              <a:fontRef idx="minor">
+                <a:schemeClr val="lt1"/>
+              </a:fontRef>
+            </p:style>
+            <p:txBody>
+              <a:bodyPr lIns="0" tIns="0" rIns="0" bIns="0" rtlCol="0" anchor="t" anchorCtr="0"/>
+              <a:lstStyle/>
+              <a:p>
+                <a:pPr algn="ctr"/>
+                <a:r>
+                  <a:rPr lang="en-US" sz="1200" dirty="0"/>
+                  <a:t>PMEVCNTR2</a:t>
+                </a:r>
+              </a:p>
+            </p:txBody>
+          </p:sp>
+          <p:sp>
+            <p:nvSpPr>
+              <p:cNvPr id="53" name="Rectangle 52">
+                <a:extLst>
+                  <a:ext uri="{FF2B5EF4-FFF2-40B4-BE49-F238E27FC236}">
+                    <a16:creationId xmlns:a16="http://schemas.microsoft.com/office/drawing/2014/main" id="{EDF3D6BD-3E0E-6AA7-FB17-BD0DD662D44F}"/>
+                  </a:ext>
+                </a:extLst>
+              </p:cNvPr>
+              <p:cNvSpPr/>
+              <p:nvPr/>
+            </p:nvSpPr>
+            <p:spPr>
+              <a:xfrm>
+                <a:off x="5521474" y="5368762"/>
+                <a:ext cx="892094" cy="227781"/>
+              </a:xfrm>
+              <a:prstGeom prst="rect">
+                <a:avLst/>
+              </a:prstGeom>
+            </p:spPr>
+            <p:style>
+              <a:lnRef idx="2">
+                <a:schemeClr val="accent2">
+                  <a:shade val="50000"/>
+                </a:schemeClr>
+              </a:lnRef>
+              <a:fillRef idx="1">
+                <a:schemeClr val="accent2"/>
+              </a:fillRef>
+              <a:effectRef idx="0">
+                <a:schemeClr val="accent2"/>
+              </a:effectRef>
+              <a:fontRef idx="minor">
+                <a:schemeClr val="lt1"/>
+              </a:fontRef>
+            </p:style>
+            <p:txBody>
+              <a:bodyPr lIns="0" tIns="0" rIns="0" bIns="0" rtlCol="0" anchor="t" anchorCtr="0"/>
+              <a:lstStyle/>
+              <a:p>
+                <a:pPr algn="ctr"/>
+                <a:r>
+                  <a:rPr lang="en-US" sz="1200" dirty="0"/>
+                  <a:t>PMEVTYPER2</a:t>
+                </a:r>
+              </a:p>
+            </p:txBody>
+          </p:sp>
+          <p:sp>
+            <p:nvSpPr>
+              <p:cNvPr id="54" name="Rectangle 53">
+                <a:extLst>
+                  <a:ext uri="{FF2B5EF4-FFF2-40B4-BE49-F238E27FC236}">
+                    <a16:creationId xmlns:a16="http://schemas.microsoft.com/office/drawing/2014/main" id="{30685425-61D1-F577-1E9F-42254E08F926}"/>
+                  </a:ext>
+                </a:extLst>
+              </p:cNvPr>
+              <p:cNvSpPr/>
+              <p:nvPr/>
+            </p:nvSpPr>
+            <p:spPr>
+              <a:xfrm>
+                <a:off x="6406158" y="5120719"/>
+                <a:ext cx="892093" cy="227781"/>
+              </a:xfrm>
+              <a:prstGeom prst="rect">
+                <a:avLst/>
+              </a:prstGeom>
+            </p:spPr>
+            <p:style>
+              <a:lnRef idx="2">
+                <a:schemeClr val="accent2">
+                  <a:shade val="50000"/>
+                </a:schemeClr>
+              </a:lnRef>
+              <a:fillRef idx="1">
+                <a:schemeClr val="accent2"/>
+              </a:fillRef>
+              <a:effectRef idx="0">
+                <a:schemeClr val="accent2"/>
+              </a:effectRef>
+              <a:fontRef idx="minor">
+                <a:schemeClr val="lt1"/>
+              </a:fontRef>
+            </p:style>
+            <p:txBody>
+              <a:bodyPr lIns="0" tIns="0" rIns="0" bIns="0" rtlCol="0" anchor="t" anchorCtr="0"/>
+              <a:lstStyle/>
+              <a:p>
+                <a:pPr algn="ctr"/>
+                <a:r>
+                  <a:rPr lang="en-US" sz="1200" dirty="0"/>
+                  <a:t>PMEVCNTR3</a:t>
+                </a:r>
+              </a:p>
+            </p:txBody>
+          </p:sp>
+          <p:sp>
+            <p:nvSpPr>
+              <p:cNvPr id="55" name="Rectangle 54">
+                <a:extLst>
+                  <a:ext uri="{FF2B5EF4-FFF2-40B4-BE49-F238E27FC236}">
+                    <a16:creationId xmlns:a16="http://schemas.microsoft.com/office/drawing/2014/main" id="{455BE427-40BB-A6A9-2A1B-F834C928D4CC}"/>
+                  </a:ext>
+                </a:extLst>
+              </p:cNvPr>
+              <p:cNvSpPr/>
+              <p:nvPr/>
+            </p:nvSpPr>
+            <p:spPr>
+              <a:xfrm>
+                <a:off x="6406157" y="5368762"/>
+                <a:ext cx="892094" cy="227781"/>
+              </a:xfrm>
+              <a:prstGeom prst="rect">
+                <a:avLst/>
+              </a:prstGeom>
+            </p:spPr>
+            <p:style>
+              <a:lnRef idx="2">
+                <a:schemeClr val="accent2">
+                  <a:shade val="50000"/>
+                </a:schemeClr>
+              </a:lnRef>
+              <a:fillRef idx="1">
+                <a:schemeClr val="accent2"/>
+              </a:fillRef>
+              <a:effectRef idx="0">
+                <a:schemeClr val="accent2"/>
+              </a:effectRef>
+              <a:fontRef idx="minor">
+                <a:schemeClr val="lt1"/>
+              </a:fontRef>
+            </p:style>
+            <p:txBody>
+              <a:bodyPr lIns="0" tIns="0" rIns="0" bIns="0" rtlCol="0" anchor="t" anchorCtr="0"/>
+              <a:lstStyle/>
+              <a:p>
+                <a:pPr algn="ctr"/>
+                <a:r>
+                  <a:rPr lang="en-US" sz="1200" dirty="0"/>
+                  <a:t>PMEVTYPER3</a:t>
+                </a:r>
+              </a:p>
+            </p:txBody>
+          </p:sp>
+          <p:sp>
+            <p:nvSpPr>
+              <p:cNvPr id="56" name="Rectangle 55">
+                <a:extLst>
+                  <a:ext uri="{FF2B5EF4-FFF2-40B4-BE49-F238E27FC236}">
+                    <a16:creationId xmlns:a16="http://schemas.microsoft.com/office/drawing/2014/main" id="{3CDD8CFF-F692-76AC-7C03-1F5563EF321E}"/>
+                  </a:ext>
+                </a:extLst>
+              </p:cNvPr>
+              <p:cNvSpPr/>
+              <p:nvPr/>
+            </p:nvSpPr>
+            <p:spPr>
+              <a:xfrm>
+                <a:off x="7305872" y="5120719"/>
+                <a:ext cx="892093" cy="227781"/>
+              </a:xfrm>
+              <a:prstGeom prst="rect">
+                <a:avLst/>
+              </a:prstGeom>
+            </p:spPr>
+            <p:style>
+              <a:lnRef idx="2">
+                <a:schemeClr val="accent2">
+                  <a:shade val="50000"/>
+                </a:schemeClr>
+              </a:lnRef>
+              <a:fillRef idx="1">
+                <a:schemeClr val="accent2"/>
+              </a:fillRef>
+              <a:effectRef idx="0">
+                <a:schemeClr val="accent2"/>
+              </a:effectRef>
+              <a:fontRef idx="minor">
+                <a:schemeClr val="lt1"/>
+              </a:fontRef>
+            </p:style>
+            <p:txBody>
+              <a:bodyPr lIns="0" tIns="0" rIns="0" bIns="0" rtlCol="0" anchor="t" anchorCtr="0"/>
+              <a:lstStyle/>
+              <a:p>
+                <a:pPr algn="ctr"/>
+                <a:r>
+                  <a:rPr lang="en-US" sz="1200" dirty="0"/>
+                  <a:t>PMEVCNTR4</a:t>
+                </a:r>
+              </a:p>
+            </p:txBody>
+          </p:sp>
+          <p:sp>
+            <p:nvSpPr>
+              <p:cNvPr id="57" name="Rectangle 56">
+                <a:extLst>
+                  <a:ext uri="{FF2B5EF4-FFF2-40B4-BE49-F238E27FC236}">
+                    <a16:creationId xmlns:a16="http://schemas.microsoft.com/office/drawing/2014/main" id="{C4A43019-A0AD-0842-42C4-C748C3AB5744}"/>
+                  </a:ext>
+                </a:extLst>
+              </p:cNvPr>
+              <p:cNvSpPr/>
+              <p:nvPr/>
+            </p:nvSpPr>
+            <p:spPr>
+              <a:xfrm>
+                <a:off x="7305871" y="5368762"/>
+                <a:ext cx="892094" cy="227781"/>
+              </a:xfrm>
+              <a:prstGeom prst="rect">
+                <a:avLst/>
+              </a:prstGeom>
+            </p:spPr>
+            <p:style>
+              <a:lnRef idx="2">
+                <a:schemeClr val="accent2">
+                  <a:shade val="50000"/>
+                </a:schemeClr>
+              </a:lnRef>
+              <a:fillRef idx="1">
+                <a:schemeClr val="accent2"/>
+              </a:fillRef>
+              <a:effectRef idx="0">
+                <a:schemeClr val="accent2"/>
+              </a:effectRef>
+              <a:fontRef idx="minor">
+                <a:schemeClr val="lt1"/>
+              </a:fontRef>
+            </p:style>
+            <p:txBody>
+              <a:bodyPr lIns="0" tIns="0" rIns="0" bIns="0" rtlCol="0" anchor="t" anchorCtr="0"/>
+              <a:lstStyle/>
+              <a:p>
+                <a:pPr algn="ctr"/>
+                <a:r>
+                  <a:rPr lang="en-US" sz="1200" dirty="0"/>
+                  <a:t>PMEVTYPER4</a:t>
+                </a:r>
+              </a:p>
+            </p:txBody>
+          </p:sp>
+          <p:sp>
+            <p:nvSpPr>
+              <p:cNvPr id="58" name="Rectangle 57">
+                <a:extLst>
+                  <a:ext uri="{FF2B5EF4-FFF2-40B4-BE49-F238E27FC236}">
+                    <a16:creationId xmlns:a16="http://schemas.microsoft.com/office/drawing/2014/main" id="{8B21B70D-FFEC-5FD5-7C8B-861D008242B5}"/>
+                  </a:ext>
+                </a:extLst>
+              </p:cNvPr>
+              <p:cNvSpPr/>
+              <p:nvPr/>
+            </p:nvSpPr>
+            <p:spPr>
+              <a:xfrm>
+                <a:off x="8206140" y="5120719"/>
+                <a:ext cx="892093" cy="227781"/>
+              </a:xfrm>
+              <a:prstGeom prst="rect">
+                <a:avLst/>
+              </a:prstGeom>
+            </p:spPr>
+            <p:style>
+              <a:lnRef idx="2">
+                <a:schemeClr val="accent2">
+                  <a:shade val="50000"/>
+                </a:schemeClr>
+              </a:lnRef>
+              <a:fillRef idx="1">
+                <a:schemeClr val="accent2"/>
+              </a:fillRef>
+              <a:effectRef idx="0">
+                <a:schemeClr val="accent2"/>
+              </a:effectRef>
+              <a:fontRef idx="minor">
+                <a:schemeClr val="lt1"/>
+              </a:fontRef>
+            </p:style>
+            <p:txBody>
+              <a:bodyPr lIns="0" tIns="0" rIns="0" bIns="0" rtlCol="0" anchor="t" anchorCtr="0"/>
+              <a:lstStyle/>
+              <a:p>
+                <a:pPr algn="ctr"/>
+                <a:r>
+                  <a:rPr lang="en-US" sz="1200" dirty="0"/>
+                  <a:t>PMEVCNTR5</a:t>
+                </a:r>
+              </a:p>
+            </p:txBody>
+          </p:sp>
+          <p:sp>
+            <p:nvSpPr>
+              <p:cNvPr id="59" name="Rectangle 58">
+                <a:extLst>
+                  <a:ext uri="{FF2B5EF4-FFF2-40B4-BE49-F238E27FC236}">
+                    <a16:creationId xmlns:a16="http://schemas.microsoft.com/office/drawing/2014/main" id="{EF72DBA6-4163-1603-2E7F-7C22AD274FF8}"/>
+                  </a:ext>
+                </a:extLst>
+              </p:cNvPr>
+              <p:cNvSpPr/>
+              <p:nvPr/>
+            </p:nvSpPr>
+            <p:spPr>
+              <a:xfrm>
+                <a:off x="8206139" y="5368762"/>
+                <a:ext cx="892094" cy="227781"/>
+              </a:xfrm>
+              <a:prstGeom prst="rect">
+                <a:avLst/>
+              </a:prstGeom>
+            </p:spPr>
+            <p:style>
+              <a:lnRef idx="2">
+                <a:schemeClr val="accent2">
+                  <a:shade val="50000"/>
+                </a:schemeClr>
+              </a:lnRef>
+              <a:fillRef idx="1">
+                <a:schemeClr val="accent2"/>
+              </a:fillRef>
+              <a:effectRef idx="0">
+                <a:schemeClr val="accent2"/>
+              </a:effectRef>
+              <a:fontRef idx="minor">
+                <a:schemeClr val="lt1"/>
+              </a:fontRef>
+            </p:style>
+            <p:txBody>
+              <a:bodyPr lIns="0" tIns="0" rIns="0" bIns="0" rtlCol="0" anchor="t" anchorCtr="0"/>
+              <a:lstStyle/>
+              <a:p>
+                <a:pPr algn="ctr"/>
+                <a:r>
+                  <a:rPr lang="en-US" sz="1200" dirty="0"/>
+                  <a:t>PMEVTYPER5</a:t>
+                </a:r>
+              </a:p>
+            </p:txBody>
+          </p:sp>
+        </p:grpSp>
+      </p:grpSp>
+      <p:sp>
+        <p:nvSpPr>
+          <p:cNvPr id="63" name="Footer Placeholder 4">
+            <a:extLst>
+              <a:ext uri="{FF2B5EF4-FFF2-40B4-BE49-F238E27FC236}">
+                <a16:creationId xmlns:a16="http://schemas.microsoft.com/office/drawing/2014/main" id="{55A81D04-E485-AC4A-866E-25D944C1094A}"/>
+              </a:ext>
+            </a:extLst>
+          </p:cNvPr>
+          <p:cNvSpPr txBox="1">
+            <a:spLocks/>
+          </p:cNvSpPr>
+          <p:nvPr/>
+        </p:nvSpPr>
+        <p:spPr>
+          <a:xfrm>
+            <a:off x="838199" y="6356350"/>
+            <a:ext cx="6928945" cy="365125"/>
+          </a:xfrm>
+          <a:prstGeom prst="rect">
+            <a:avLst/>
+          </a:prstGeom>
+        </p:spPr>
+        <p:txBody>
+          <a:bodyPr vert="horz" lIns="91440" tIns="45720" rIns="91440" bIns="45720" rtlCol="0" anchor="ctr"/>
+          <a:lstStyle>
+            <a:defPPr>
+              <a:defRPr lang="en-US"/>
+            </a:defPPr>
+            <a:lvl1pPr marL="0" algn="ctr" defTabSz="914400" rtl="0" eaLnBrk="1" latinLnBrk="0" hangingPunct="1">
+              <a:defRPr sz="1200" kern="1200">
+                <a:solidFill>
+                  <a:schemeClr val="bg1">
+                    <a:lumMod val="75000"/>
+                  </a:schemeClr>
+                </a:solidFill>
+                <a:latin typeface="+mn-lt"/>
+                <a:ea typeface="+mn-ea"/>
+                <a:cs typeface="+mn-cs"/>
+              </a:defRPr>
+            </a:lvl1pPr>
+            <a:lvl2pPr marL="457200" algn="l" defTabSz="914400" rtl="0" eaLnBrk="1" latinLnBrk="0" hangingPunct="1">
+              <a:defRPr sz="1800" kern="1200">
+                <a:solidFill>
+                  <a:schemeClr val="tx1"/>
+                </a:solidFill>
+                <a:latin typeface="+mn-lt"/>
+                <a:ea typeface="+mn-ea"/>
+                <a:cs typeface="+mn-cs"/>
+              </a:defRPr>
+            </a:lvl2pPr>
+            <a:lvl3pPr marL="914400" algn="l" defTabSz="914400" rtl="0" eaLnBrk="1" latinLnBrk="0" hangingPunct="1">
+              <a:defRPr sz="1800" kern="1200">
+                <a:solidFill>
+                  <a:schemeClr val="tx1"/>
+                </a:solidFill>
+                <a:latin typeface="+mn-lt"/>
+                <a:ea typeface="+mn-ea"/>
+                <a:cs typeface="+mn-cs"/>
+              </a:defRPr>
+            </a:lvl3pPr>
+            <a:lvl4pPr marL="1371600" algn="l" defTabSz="914400" rtl="0" eaLnBrk="1" latinLnBrk="0" hangingPunct="1">
+              <a:defRPr sz="1800" kern="1200">
+                <a:solidFill>
+                  <a:schemeClr val="tx1"/>
+                </a:solidFill>
+                <a:latin typeface="+mn-lt"/>
+                <a:ea typeface="+mn-ea"/>
+                <a:cs typeface="+mn-cs"/>
+              </a:defRPr>
+            </a:lvl4pPr>
+            <a:lvl5pPr marL="1828800" algn="l" defTabSz="914400" rtl="0" eaLnBrk="1" latinLnBrk="0" hangingPunct="1">
+              <a:defRPr sz="1800" kern="1200">
+                <a:solidFill>
+                  <a:schemeClr val="tx1"/>
+                </a:solidFill>
+                <a:latin typeface="+mn-lt"/>
+                <a:ea typeface="+mn-ea"/>
+                <a:cs typeface="+mn-cs"/>
+              </a:defRPr>
+            </a:lvl5pPr>
+            <a:lvl6pPr marL="2286000" algn="l" defTabSz="914400" rtl="0" eaLnBrk="1" latinLnBrk="0" hangingPunct="1">
+              <a:defRPr sz="1800" kern="1200">
+                <a:solidFill>
+                  <a:schemeClr val="tx1"/>
+                </a:solidFill>
+                <a:latin typeface="+mn-lt"/>
+                <a:ea typeface="+mn-ea"/>
+                <a:cs typeface="+mn-cs"/>
+              </a:defRPr>
+            </a:lvl6pPr>
+            <a:lvl7pPr marL="2743200" algn="l" defTabSz="914400" rtl="0" eaLnBrk="1" latinLnBrk="0" hangingPunct="1">
+              <a:defRPr sz="1800" kern="1200">
+                <a:solidFill>
+                  <a:schemeClr val="tx1"/>
+                </a:solidFill>
+                <a:latin typeface="+mn-lt"/>
+                <a:ea typeface="+mn-ea"/>
+                <a:cs typeface="+mn-cs"/>
+              </a:defRPr>
+            </a:lvl7pPr>
+            <a:lvl8pPr marL="3200400" algn="l" defTabSz="914400" rtl="0" eaLnBrk="1" latinLnBrk="0" hangingPunct="1">
+              <a:defRPr sz="1800" kern="1200">
+                <a:solidFill>
+                  <a:schemeClr val="tx1"/>
+                </a:solidFill>
+                <a:latin typeface="+mn-lt"/>
+                <a:ea typeface="+mn-ea"/>
+                <a:cs typeface="+mn-cs"/>
+              </a:defRPr>
+            </a:lvl8pPr>
+            <a:lvl9pPr marL="3657600" algn="l" defTabSz="914400" rtl="0" eaLnBrk="1" latinLnBrk="0" hangingPunct="1">
+              <a:defRPr sz="1800" kern="1200">
+                <a:solidFill>
+                  <a:schemeClr val="tx1"/>
+                </a:solidFill>
+                <a:latin typeface="+mn-lt"/>
+                <a:ea typeface="+mn-ea"/>
+                <a:cs typeface="+mn-cs"/>
+              </a:defRPr>
+            </a:lvl9pPr>
+          </a:lstStyle>
+          <a:p>
+            <a:r>
+              <a:rPr lang="en-US" dirty="0"/>
+              <a:t>CSE 522S – Operating Systems Organization. Marion Sudvarg, David Ferry, Chris Gill, Brian Kocoloski </a:t>
+            </a:r>
+          </a:p>
+        </p:txBody>
+      </p:sp>
+      <p:sp>
+        <p:nvSpPr>
+          <p:cNvPr id="65" name="Title 64">
+            <a:extLst>
+              <a:ext uri="{FF2B5EF4-FFF2-40B4-BE49-F238E27FC236}">
+                <a16:creationId xmlns:a16="http://schemas.microsoft.com/office/drawing/2014/main" id="{40E2053A-5D2B-34E9-1F1C-EDD1BFB51797}"/>
               </a:ext>
             </a:extLst>
           </p:cNvPr>
@@ -3560,91 +6205,15 @@
           <a:p>
             <a:r>
               <a:rPr lang="en-US" dirty="0"/>
-              <a:t>The Vanilla Event Scheduler</a:t>
-            </a:r>
-          </a:p>
-        </p:txBody>
-      </p:sp>
-      <p:sp>
-        <p:nvSpPr>
-          <p:cNvPr id="3" name="Content Placeholder 2">
-            <a:extLst>
-              <a:ext uri="{FF2B5EF4-FFF2-40B4-BE49-F238E27FC236}">
-                <a16:creationId xmlns:a16="http://schemas.microsoft.com/office/drawing/2014/main" id="{B55AC7CD-4EC3-677D-8E87-AF29D2D3886A}"/>
-              </a:ext>
-            </a:extLst>
-          </p:cNvPr>
-          <p:cNvSpPr>
-            <a:spLocks noGrp="1"/>
-          </p:cNvSpPr>
-          <p:nvPr>
-            <p:ph idx="1"/>
-          </p:nvPr>
-        </p:nvSpPr>
-        <p:spPr/>
-        <p:txBody>
-          <a:bodyPr/>
-          <a:lstStyle/>
-          <a:p>
-            <a:r>
-              <a:rPr lang="en-US" dirty="0"/>
-              <a:t>Linked list of event groups is traversed</a:t>
-            </a:r>
-          </a:p>
-          <a:p>
-            <a:r>
-              <a:rPr lang="en-US" dirty="0"/>
-              <a:t>TODO: explain group attributes, event constraints</a:t>
-            </a:r>
-          </a:p>
-          <a:p>
-            <a:r>
-              <a:rPr lang="en-US" dirty="0"/>
-              <a:t>Failed group results in activation of counters, rest of groups wait for next iteration</a:t>
-            </a:r>
-          </a:p>
-          <a:p>
-            <a:r>
-              <a:rPr lang="en-US" dirty="0"/>
-              <a:t>Linux </a:t>
-            </a:r>
-            <a:r>
-              <a:rPr lang="en-US" dirty="0">
-                <a:latin typeface="Consolas" panose="020B0609020204030204" pitchFamily="49" charset="0"/>
-                <a:cs typeface="Consolas" panose="020B0609020204030204" pitchFamily="49" charset="0"/>
-              </a:rPr>
-              <a:t>hrtimer</a:t>
-            </a:r>
-            <a:r>
-              <a:rPr lang="en-US" dirty="0"/>
-              <a:t> sends multiplexing interrupt for interval</a:t>
-            </a:r>
-          </a:p>
-          <a:p>
-            <a:r>
-              <a:rPr lang="en-US" dirty="0"/>
-              <a:t>Can lead to </a:t>
-            </a:r>
-            <a:r>
-              <a:rPr lang="en-US" i="1" dirty="0"/>
-              <a:t>event starvation</a:t>
-            </a:r>
-          </a:p>
-          <a:p>
-            <a:pPr marL="0" indent="0">
-              <a:buNone/>
-            </a:pPr>
-            <a:endParaRPr lang="en-US" dirty="0"/>
-          </a:p>
-          <a:p>
-            <a:endParaRPr lang="en-US" dirty="0"/>
+              <a:t>ARM PMU</a:t>
+            </a:r>
           </a:p>
         </p:txBody>
       </p:sp>
     </p:spTree>
     <p:extLst>
       <p:ext uri="{BB962C8B-B14F-4D97-AF65-F5344CB8AC3E}">
-        <p14:creationId xmlns:p14="http://schemas.microsoft.com/office/powerpoint/2010/main" val="1991528252"/>
+        <p14:creationId xmlns:p14="http://schemas.microsoft.com/office/powerpoint/2010/main" val="4039501433"/>
       </p:ext>
     </p:extLst>
   </p:cSld>
@@ -3676,7 +6245,7 @@
           <p:cNvPr id="2" name="Title 1">
             <a:extLst>
               <a:ext uri="{FF2B5EF4-FFF2-40B4-BE49-F238E27FC236}">
-                <a16:creationId xmlns:a16="http://schemas.microsoft.com/office/drawing/2014/main" id="{EC5DFEEC-68B3-6B83-4C3B-88B1EDAD8152}"/>
+                <a16:creationId xmlns:a16="http://schemas.microsoft.com/office/drawing/2014/main" id="{67243B8D-6AA0-CA79-F4AE-B14F5B27B893}"/>
               </a:ext>
             </a:extLst>
           </p:cNvPr>
@@ -3692,6 +6261,784 @@
           <a:bodyPr/>
           <a:lstStyle/>
           <a:p>
+            <a:r>
+              <a:rPr lang="en-US" dirty="0"/>
+              <a:t>Linux </a:t>
+            </a:r>
+            <a:r>
+              <a:rPr lang="en-US" dirty="0">
+                <a:latin typeface="Consolas" panose="020B0609020204030204" pitchFamily="49" charset="0"/>
+                <a:cs typeface="Consolas" panose="020B0609020204030204" pitchFamily="49" charset="0"/>
+              </a:rPr>
+              <a:t>perf_event</a:t>
+            </a:r>
+            <a:r>
+              <a:rPr lang="en-US" dirty="0">
+                <a:latin typeface="Calibri" panose="020F0502020204030204" pitchFamily="34" charset="0"/>
+                <a:cs typeface="Calibri" panose="020F0502020204030204" pitchFamily="34" charset="0"/>
+              </a:rPr>
+              <a:t> </a:t>
+            </a:r>
+            <a:r>
+              <a:rPr lang="en-US" dirty="0"/>
+              <a:t>subsystem abstracts </a:t>
+            </a:r>
+            <a:br>
+              <a:rPr lang="en-US" dirty="0"/>
+            </a:br>
+            <a:r>
+              <a:rPr lang="en-US" dirty="0"/>
+              <a:t>the PMU</a:t>
+            </a:r>
+          </a:p>
+        </p:txBody>
+      </p:sp>
+      <p:sp>
+        <p:nvSpPr>
+          <p:cNvPr id="3" name="Content Placeholder 2">
+            <a:extLst>
+              <a:ext uri="{FF2B5EF4-FFF2-40B4-BE49-F238E27FC236}">
+                <a16:creationId xmlns:a16="http://schemas.microsoft.com/office/drawing/2014/main" id="{75052211-908C-A11C-10F6-D6D0978C6C8C}"/>
+              </a:ext>
+            </a:extLst>
+          </p:cNvPr>
+          <p:cNvSpPr>
+            <a:spLocks noGrp="1"/>
+          </p:cNvSpPr>
+          <p:nvPr>
+            <p:ph idx="1"/>
+          </p:nvPr>
+        </p:nvSpPr>
+        <p:spPr/>
+        <p:txBody>
+          <a:bodyPr/>
+          <a:lstStyle/>
+          <a:p>
+            <a:r>
+              <a:rPr lang="en-US" dirty="0">
+                <a:cs typeface="Consolas" panose="020B0609020204030204" pitchFamily="49" charset="0"/>
+              </a:rPr>
+              <a:t>The </a:t>
+            </a:r>
+            <a:r>
+              <a:rPr lang="en-US" dirty="0" err="1">
+                <a:latin typeface="Consolas" panose="020B0609020204030204" pitchFamily="49" charset="0"/>
+                <a:cs typeface="Consolas" panose="020B0609020204030204" pitchFamily="49" charset="0"/>
+              </a:rPr>
+              <a:t>perf_event_open</a:t>
+            </a:r>
+            <a:r>
+              <a:rPr lang="en-US" dirty="0">
+                <a:latin typeface="Consolas" panose="020B0609020204030204" pitchFamily="49" charset="0"/>
+                <a:cs typeface="Consolas" panose="020B0609020204030204" pitchFamily="49" charset="0"/>
+              </a:rPr>
+              <a:t>()</a:t>
+            </a:r>
+            <a:r>
+              <a:rPr lang="en-US" dirty="0">
+                <a:cs typeface="Consolas" panose="020B0609020204030204" pitchFamily="49" charset="0"/>
+              </a:rPr>
+              <a:t> </a:t>
+            </a:r>
+            <a:r>
+              <a:rPr lang="en-US" dirty="0" err="1"/>
+              <a:t>syscall</a:t>
+            </a:r>
+            <a:endParaRPr lang="en-US" dirty="0"/>
+          </a:p>
+          <a:p>
+            <a:r>
+              <a:rPr lang="en-US" dirty="0">
+                <a:latin typeface="Calibri" panose="020F0502020204030204" pitchFamily="34" charset="0"/>
+                <a:cs typeface="Calibri" panose="020F0502020204030204" pitchFamily="34" charset="0"/>
+              </a:rPr>
+              <a:t>The </a:t>
+            </a:r>
+            <a:r>
+              <a:rPr lang="en-US" dirty="0">
+                <a:latin typeface="Consolas" panose="020B0609020204030204" pitchFamily="49" charset="0"/>
+                <a:cs typeface="Consolas" panose="020B0609020204030204" pitchFamily="49" charset="0"/>
+              </a:rPr>
+              <a:t>perf</a:t>
+            </a:r>
+            <a:r>
+              <a:rPr lang="en-US" dirty="0"/>
+              <a:t> user space tool</a:t>
+            </a:r>
+          </a:p>
+        </p:txBody>
+      </p:sp>
+    </p:spTree>
+    <p:extLst>
+      <p:ext uri="{BB962C8B-B14F-4D97-AF65-F5344CB8AC3E}">
+        <p14:creationId xmlns:p14="http://schemas.microsoft.com/office/powerpoint/2010/main" val="878895029"/>
+      </p:ext>
+    </p:extLst>
+  </p:cSld>
+  <p:clrMapOvr>
+    <a:masterClrMapping/>
+  </p:clrMapOvr>
+</p:sld>
+</file>
+
+<file path=ppt/slides/slide5.xml><?xml version="1.0" encoding="utf-8"?>
+<p:sld xmlns:a="http://schemas.openxmlformats.org/drawingml/2006/main" xmlns:r="http://schemas.openxmlformats.org/officeDocument/2006/relationships" xmlns:p="http://schemas.openxmlformats.org/presentationml/2006/main">
+  <p:cSld>
+    <p:spTree>
+      <p:nvGrpSpPr>
+        <p:cNvPr id="1" name=""/>
+        <p:cNvGrpSpPr/>
+        <p:nvPr/>
+      </p:nvGrpSpPr>
+      <p:grpSpPr>
+        <a:xfrm>
+          <a:off x="0" y="0"/>
+          <a:ext cx="0" cy="0"/>
+          <a:chOff x="0" y="0"/>
+          <a:chExt cx="0" cy="0"/>
+        </a:xfrm>
+      </p:grpSpPr>
+      <p:sp>
+        <p:nvSpPr>
+          <p:cNvPr id="2" name="Title 1">
+            <a:extLst>
+              <a:ext uri="{FF2B5EF4-FFF2-40B4-BE49-F238E27FC236}">
+                <a16:creationId xmlns:a16="http://schemas.microsoft.com/office/drawing/2014/main" id="{D6C973FF-7EA2-677C-4666-9A765C6A2528}"/>
+              </a:ext>
+            </a:extLst>
+          </p:cNvPr>
+          <p:cNvSpPr>
+            <a:spLocks noGrp="1"/>
+          </p:cNvSpPr>
+          <p:nvPr>
+            <p:ph type="title"/>
+          </p:nvPr>
+        </p:nvSpPr>
+        <p:spPr/>
+        <p:txBody>
+          <a:bodyPr>
+            <a:normAutofit fontScale="90000"/>
+          </a:bodyPr>
+          <a:lstStyle/>
+          <a:p>
+            <a:r>
+              <a:rPr lang="en-US" dirty="0"/>
+              <a:t>The </a:t>
+            </a:r>
+            <a:r>
+              <a:rPr lang="en-US" dirty="0">
+                <a:latin typeface="Consolas" panose="020B0609020204030204" pitchFamily="49" charset="0"/>
+                <a:cs typeface="Consolas" panose="020B0609020204030204" pitchFamily="49" charset="0"/>
+              </a:rPr>
+              <a:t>perf</a:t>
+            </a:r>
+            <a:r>
+              <a:rPr lang="en-US" dirty="0"/>
+              <a:t> user space tool provides a command line interface for interacting with the kernel</a:t>
+            </a:r>
+          </a:p>
+        </p:txBody>
+      </p:sp>
+      <p:pic>
+        <p:nvPicPr>
+          <p:cNvPr id="4" name="Picture 3" descr="Text&#10;&#10;Description automatically generated">
+            <a:extLst>
+              <a:ext uri="{FF2B5EF4-FFF2-40B4-BE49-F238E27FC236}">
+                <a16:creationId xmlns:a16="http://schemas.microsoft.com/office/drawing/2014/main" id="{951EF5A9-AB54-7CCA-9DFB-B93F27F0F363}"/>
+              </a:ext>
+            </a:extLst>
+          </p:cNvPr>
+          <p:cNvPicPr>
+            <a:picLocks noChangeAspect="1"/>
+          </p:cNvPicPr>
+          <p:nvPr/>
+        </p:nvPicPr>
+        <p:blipFill>
+          <a:blip r:embed="rId3"/>
+          <a:stretch>
+            <a:fillRect/>
+          </a:stretch>
+        </p:blipFill>
+        <p:spPr>
+          <a:xfrm>
+            <a:off x="2209800" y="2019996"/>
+            <a:ext cx="7772400" cy="4472879"/>
+          </a:xfrm>
+          <a:prstGeom prst="rect">
+            <a:avLst/>
+          </a:prstGeom>
+        </p:spPr>
+      </p:pic>
+    </p:spTree>
+    <p:extLst>
+      <p:ext uri="{BB962C8B-B14F-4D97-AF65-F5344CB8AC3E}">
+        <p14:creationId xmlns:p14="http://schemas.microsoft.com/office/powerpoint/2010/main" val="1913920636"/>
+      </p:ext>
+    </p:extLst>
+  </p:cSld>
+  <p:clrMapOvr>
+    <a:masterClrMapping/>
+  </p:clrMapOvr>
+</p:sld>
+</file>
+
+<file path=ppt/slides/slide6.xml><?xml version="1.0" encoding="utf-8"?>
+<p:sld xmlns:a="http://schemas.openxmlformats.org/drawingml/2006/main" xmlns:r="http://schemas.openxmlformats.org/officeDocument/2006/relationships" xmlns:p="http://schemas.openxmlformats.org/presentationml/2006/main">
+  <p:cSld>
+    <p:spTree>
+      <p:nvGrpSpPr>
+        <p:cNvPr id="1" name=""/>
+        <p:cNvGrpSpPr/>
+        <p:nvPr/>
+      </p:nvGrpSpPr>
+      <p:grpSpPr>
+        <a:xfrm>
+          <a:off x="0" y="0"/>
+          <a:ext cx="0" cy="0"/>
+          <a:chOff x="0" y="0"/>
+          <a:chExt cx="0" cy="0"/>
+        </a:xfrm>
+      </p:grpSpPr>
+      <p:sp>
+        <p:nvSpPr>
+          <p:cNvPr id="2" name="Title 1">
+            <a:extLst>
+              <a:ext uri="{FF2B5EF4-FFF2-40B4-BE49-F238E27FC236}">
+                <a16:creationId xmlns:a16="http://schemas.microsoft.com/office/drawing/2014/main" id="{6A980990-AF08-1AFA-226B-E7C1AFB29047}"/>
+              </a:ext>
+            </a:extLst>
+          </p:cNvPr>
+          <p:cNvSpPr>
+            <a:spLocks noGrp="1"/>
+          </p:cNvSpPr>
+          <p:nvPr>
+            <p:ph type="title"/>
+          </p:nvPr>
+        </p:nvSpPr>
+        <p:spPr/>
+        <p:txBody>
+          <a:bodyPr/>
+          <a:lstStyle/>
+          <a:p>
+            <a:r>
+              <a:rPr lang="en-US" dirty="0"/>
+              <a:t>Supported events are architecture dependent</a:t>
+            </a:r>
+          </a:p>
+        </p:txBody>
+      </p:sp>
+      <p:pic>
+        <p:nvPicPr>
+          <p:cNvPr id="3" name="Picture 2" descr="Text&#10;&#10;Description automatically generated">
+            <a:extLst>
+              <a:ext uri="{FF2B5EF4-FFF2-40B4-BE49-F238E27FC236}">
+                <a16:creationId xmlns:a16="http://schemas.microsoft.com/office/drawing/2014/main" id="{4F81006A-E619-813A-5968-0A76DDCE0EEF}"/>
+              </a:ext>
+            </a:extLst>
+          </p:cNvPr>
+          <p:cNvPicPr>
+            <a:picLocks noChangeAspect="1"/>
+          </p:cNvPicPr>
+          <p:nvPr/>
+        </p:nvPicPr>
+        <p:blipFill>
+          <a:blip r:embed="rId3"/>
+          <a:stretch>
+            <a:fillRect/>
+          </a:stretch>
+        </p:blipFill>
+        <p:spPr>
+          <a:xfrm>
+            <a:off x="2209800" y="2019996"/>
+            <a:ext cx="7772400" cy="4472879"/>
+          </a:xfrm>
+          <a:prstGeom prst="rect">
+            <a:avLst/>
+          </a:prstGeom>
+        </p:spPr>
+      </p:pic>
+    </p:spTree>
+    <p:extLst>
+      <p:ext uri="{BB962C8B-B14F-4D97-AF65-F5344CB8AC3E}">
+        <p14:creationId xmlns:p14="http://schemas.microsoft.com/office/powerpoint/2010/main" val="2482293467"/>
+      </p:ext>
+    </p:extLst>
+  </p:cSld>
+  <p:clrMapOvr>
+    <a:masterClrMapping/>
+  </p:clrMapOvr>
+</p:sld>
+</file>
+
+<file path=ppt/slides/slide7.xml><?xml version="1.0" encoding="utf-8"?>
+<p:sld xmlns:a="http://schemas.openxmlformats.org/drawingml/2006/main" xmlns:r="http://schemas.openxmlformats.org/officeDocument/2006/relationships" xmlns:p="http://schemas.openxmlformats.org/presentationml/2006/main">
+  <p:cSld>
+    <p:spTree>
+      <p:nvGrpSpPr>
+        <p:cNvPr id="1" name=""/>
+        <p:cNvGrpSpPr/>
+        <p:nvPr/>
+      </p:nvGrpSpPr>
+      <p:grpSpPr>
+        <a:xfrm>
+          <a:off x="0" y="0"/>
+          <a:ext cx="0" cy="0"/>
+          <a:chOff x="0" y="0"/>
+          <a:chExt cx="0" cy="0"/>
+        </a:xfrm>
+      </p:grpSpPr>
+      <p:sp>
+        <p:nvSpPr>
+          <p:cNvPr id="2" name="Title 1">
+            <a:extLst>
+              <a:ext uri="{FF2B5EF4-FFF2-40B4-BE49-F238E27FC236}">
+                <a16:creationId xmlns:a16="http://schemas.microsoft.com/office/drawing/2014/main" id="{5D8E885C-FAA1-37CA-9CC7-F3F42D34CFCE}"/>
+              </a:ext>
+            </a:extLst>
+          </p:cNvPr>
+          <p:cNvSpPr>
+            <a:spLocks noGrp="1"/>
+          </p:cNvSpPr>
+          <p:nvPr>
+            <p:ph type="title"/>
+          </p:nvPr>
+        </p:nvSpPr>
+        <p:spPr/>
+        <p:txBody>
+          <a:bodyPr/>
+          <a:lstStyle/>
+          <a:p>
+            <a:r>
+              <a:rPr lang="en-US" dirty="0"/>
+              <a:t>Multiplexing introduces extrapolation error into the subsystem</a:t>
+            </a:r>
+          </a:p>
+        </p:txBody>
+      </p:sp>
+      <p:sp>
+        <p:nvSpPr>
+          <p:cNvPr id="3" name="Content Placeholder 2">
+            <a:extLst>
+              <a:ext uri="{FF2B5EF4-FFF2-40B4-BE49-F238E27FC236}">
+                <a16:creationId xmlns:a16="http://schemas.microsoft.com/office/drawing/2014/main" id="{B6714A6E-E22D-4D51-1041-835523FD247E}"/>
+              </a:ext>
+            </a:extLst>
+          </p:cNvPr>
+          <p:cNvSpPr>
+            <a:spLocks noGrp="1"/>
+          </p:cNvSpPr>
+          <p:nvPr>
+            <p:ph idx="1"/>
+          </p:nvPr>
+        </p:nvSpPr>
+        <p:spPr>
+          <a:xfrm>
+            <a:off x="838200" y="1758156"/>
+            <a:ext cx="10515600" cy="4667251"/>
+          </a:xfrm>
+        </p:spPr>
+        <p:txBody>
+          <a:bodyPr>
+            <a:normAutofit/>
+          </a:bodyPr>
+          <a:lstStyle/>
+          <a:p>
+            <a:r>
+              <a:rPr lang="en-US" dirty="0"/>
+              <a:t>Events must be time-shared on to counters then extrapolated</a:t>
+            </a:r>
+          </a:p>
+          <a:p>
+            <a:endParaRPr lang="en-US" dirty="0"/>
+          </a:p>
+          <a:p>
+            <a:endParaRPr lang="en-US" dirty="0"/>
+          </a:p>
+          <a:p>
+            <a:endParaRPr lang="en-US" dirty="0"/>
+          </a:p>
+          <a:p>
+            <a:endParaRPr lang="en-US" dirty="0"/>
+          </a:p>
+          <a:p>
+            <a:endParaRPr lang="en-US" dirty="0"/>
+          </a:p>
+          <a:p>
+            <a:pPr marL="0" indent="0">
+              <a:buNone/>
+            </a:pPr>
+            <a:endParaRPr lang="en-US" dirty="0"/>
+          </a:p>
+          <a:p>
+            <a:pPr marL="0" indent="0">
+              <a:buNone/>
+            </a:pPr>
+            <a:endParaRPr lang="en-US" dirty="0"/>
+          </a:p>
+          <a:p>
+            <a:r>
+              <a:rPr lang="en-US" dirty="0"/>
+              <a:t>Motivates event scheduling</a:t>
+            </a:r>
+          </a:p>
+        </p:txBody>
+      </p:sp>
+      <p:pic>
+        <p:nvPicPr>
+          <p:cNvPr id="5" name="Picture 4">
+            <a:extLst>
+              <a:ext uri="{FF2B5EF4-FFF2-40B4-BE49-F238E27FC236}">
+                <a16:creationId xmlns:a16="http://schemas.microsoft.com/office/drawing/2014/main" id="{41D21213-54A9-4DE8-BAF4-16714DE5F2F0}"/>
+              </a:ext>
+            </a:extLst>
+          </p:cNvPr>
+          <p:cNvPicPr>
+            <a:picLocks noChangeAspect="1"/>
+          </p:cNvPicPr>
+          <p:nvPr/>
+        </p:nvPicPr>
+        <p:blipFill>
+          <a:blip r:embed="rId3"/>
+          <a:stretch>
+            <a:fillRect/>
+          </a:stretch>
+        </p:blipFill>
+        <p:spPr>
+          <a:xfrm>
+            <a:off x="2971800" y="2332531"/>
+            <a:ext cx="6248400" cy="3403600"/>
+          </a:xfrm>
+          <a:prstGeom prst="rect">
+            <a:avLst/>
+          </a:prstGeom>
+        </p:spPr>
+      </p:pic>
+      <p:sp>
+        <p:nvSpPr>
+          <p:cNvPr id="7" name="Footer Placeholder 4">
+            <a:extLst>
+              <a:ext uri="{FF2B5EF4-FFF2-40B4-BE49-F238E27FC236}">
+                <a16:creationId xmlns:a16="http://schemas.microsoft.com/office/drawing/2014/main" id="{0F28CC0A-C478-40DD-1596-DBC9F8ED6B33}"/>
+              </a:ext>
+            </a:extLst>
+          </p:cNvPr>
+          <p:cNvSpPr txBox="1">
+            <a:spLocks/>
+          </p:cNvSpPr>
+          <p:nvPr/>
+        </p:nvSpPr>
+        <p:spPr>
+          <a:xfrm>
+            <a:off x="838200" y="6492875"/>
+            <a:ext cx="8799786" cy="365125"/>
+          </a:xfrm>
+          <a:prstGeom prst="rect">
+            <a:avLst/>
+          </a:prstGeom>
+        </p:spPr>
+        <p:txBody>
+          <a:bodyPr vert="horz" lIns="91440" tIns="45720" rIns="91440" bIns="45720" rtlCol="0" anchor="ctr"/>
+          <a:lstStyle>
+            <a:defPPr>
+              <a:defRPr lang="en-US"/>
+            </a:defPPr>
+            <a:lvl1pPr marL="0" algn="ctr" defTabSz="914400" rtl="0" eaLnBrk="1" latinLnBrk="0" hangingPunct="1">
+              <a:defRPr sz="1200" kern="1200">
+                <a:solidFill>
+                  <a:schemeClr val="bg1">
+                    <a:lumMod val="75000"/>
+                  </a:schemeClr>
+                </a:solidFill>
+                <a:latin typeface="+mn-lt"/>
+                <a:ea typeface="+mn-ea"/>
+                <a:cs typeface="+mn-cs"/>
+              </a:defRPr>
+            </a:lvl1pPr>
+            <a:lvl2pPr marL="457200" algn="l" defTabSz="914400" rtl="0" eaLnBrk="1" latinLnBrk="0" hangingPunct="1">
+              <a:defRPr sz="1800" kern="1200">
+                <a:solidFill>
+                  <a:schemeClr val="tx1"/>
+                </a:solidFill>
+                <a:latin typeface="+mn-lt"/>
+                <a:ea typeface="+mn-ea"/>
+                <a:cs typeface="+mn-cs"/>
+              </a:defRPr>
+            </a:lvl2pPr>
+            <a:lvl3pPr marL="914400" algn="l" defTabSz="914400" rtl="0" eaLnBrk="1" latinLnBrk="0" hangingPunct="1">
+              <a:defRPr sz="1800" kern="1200">
+                <a:solidFill>
+                  <a:schemeClr val="tx1"/>
+                </a:solidFill>
+                <a:latin typeface="+mn-lt"/>
+                <a:ea typeface="+mn-ea"/>
+                <a:cs typeface="+mn-cs"/>
+              </a:defRPr>
+            </a:lvl3pPr>
+            <a:lvl4pPr marL="1371600" algn="l" defTabSz="914400" rtl="0" eaLnBrk="1" latinLnBrk="0" hangingPunct="1">
+              <a:defRPr sz="1800" kern="1200">
+                <a:solidFill>
+                  <a:schemeClr val="tx1"/>
+                </a:solidFill>
+                <a:latin typeface="+mn-lt"/>
+                <a:ea typeface="+mn-ea"/>
+                <a:cs typeface="+mn-cs"/>
+              </a:defRPr>
+            </a:lvl4pPr>
+            <a:lvl5pPr marL="1828800" algn="l" defTabSz="914400" rtl="0" eaLnBrk="1" latinLnBrk="0" hangingPunct="1">
+              <a:defRPr sz="1800" kern="1200">
+                <a:solidFill>
+                  <a:schemeClr val="tx1"/>
+                </a:solidFill>
+                <a:latin typeface="+mn-lt"/>
+                <a:ea typeface="+mn-ea"/>
+                <a:cs typeface="+mn-cs"/>
+              </a:defRPr>
+            </a:lvl5pPr>
+            <a:lvl6pPr marL="2286000" algn="l" defTabSz="914400" rtl="0" eaLnBrk="1" latinLnBrk="0" hangingPunct="1">
+              <a:defRPr sz="1800" kern="1200">
+                <a:solidFill>
+                  <a:schemeClr val="tx1"/>
+                </a:solidFill>
+                <a:latin typeface="+mn-lt"/>
+                <a:ea typeface="+mn-ea"/>
+                <a:cs typeface="+mn-cs"/>
+              </a:defRPr>
+            </a:lvl6pPr>
+            <a:lvl7pPr marL="2743200" algn="l" defTabSz="914400" rtl="0" eaLnBrk="1" latinLnBrk="0" hangingPunct="1">
+              <a:defRPr sz="1800" kern="1200">
+                <a:solidFill>
+                  <a:schemeClr val="tx1"/>
+                </a:solidFill>
+                <a:latin typeface="+mn-lt"/>
+                <a:ea typeface="+mn-ea"/>
+                <a:cs typeface="+mn-cs"/>
+              </a:defRPr>
+            </a:lvl7pPr>
+            <a:lvl8pPr marL="3200400" algn="l" defTabSz="914400" rtl="0" eaLnBrk="1" latinLnBrk="0" hangingPunct="1">
+              <a:defRPr sz="1800" kern="1200">
+                <a:solidFill>
+                  <a:schemeClr val="tx1"/>
+                </a:solidFill>
+                <a:latin typeface="+mn-lt"/>
+                <a:ea typeface="+mn-ea"/>
+                <a:cs typeface="+mn-cs"/>
+              </a:defRPr>
+            </a:lvl8pPr>
+            <a:lvl9pPr marL="3657600" algn="l" defTabSz="914400" rtl="0" eaLnBrk="1" latinLnBrk="0" hangingPunct="1">
+              <a:defRPr sz="1800" kern="1200">
+                <a:solidFill>
+                  <a:schemeClr val="tx1"/>
+                </a:solidFill>
+                <a:latin typeface="+mn-lt"/>
+                <a:ea typeface="+mn-ea"/>
+                <a:cs typeface="+mn-cs"/>
+              </a:defRPr>
+            </a:lvl9pPr>
+          </a:lstStyle>
+          <a:p>
+            <a:pPr algn="l"/>
+            <a:r>
+              <a:rPr lang="en-US" dirty="0"/>
+              <a:t>[1] https://developer.arm.com/documentation/ddi0500/j/Performance-Monitor-Unit/About-the-PMU?lang=</a:t>
+            </a:r>
+            <a:r>
+              <a:rPr lang="en-US" dirty="0" err="1"/>
+              <a:t>en</a:t>
+            </a:r>
+            <a:endParaRPr lang="en-US" dirty="0"/>
+          </a:p>
+        </p:txBody>
+      </p:sp>
+    </p:spTree>
+    <p:extLst>
+      <p:ext uri="{BB962C8B-B14F-4D97-AF65-F5344CB8AC3E}">
+        <p14:creationId xmlns:p14="http://schemas.microsoft.com/office/powerpoint/2010/main" val="2339680507"/>
+      </p:ext>
+    </p:extLst>
+  </p:cSld>
+  <p:clrMapOvr>
+    <a:masterClrMapping/>
+  </p:clrMapOvr>
+</p:sld>
+</file>
+
+<file path=ppt/slides/slide8.xml><?xml version="1.0" encoding="utf-8"?>
+<p:sld xmlns:a="http://schemas.openxmlformats.org/drawingml/2006/main" xmlns:r="http://schemas.openxmlformats.org/officeDocument/2006/relationships" xmlns:p="http://schemas.openxmlformats.org/presentationml/2006/main">
+  <p:cSld>
+    <p:spTree>
+      <p:nvGrpSpPr>
+        <p:cNvPr id="1" name=""/>
+        <p:cNvGrpSpPr/>
+        <p:nvPr/>
+      </p:nvGrpSpPr>
+      <p:grpSpPr>
+        <a:xfrm>
+          <a:off x="0" y="0"/>
+          <a:ext cx="0" cy="0"/>
+          <a:chOff x="0" y="0"/>
+          <a:chExt cx="0" cy="0"/>
+        </a:xfrm>
+      </p:grpSpPr>
+      <p:sp>
+        <p:nvSpPr>
+          <p:cNvPr id="2" name="Title 1">
+            <a:extLst>
+              <a:ext uri="{FF2B5EF4-FFF2-40B4-BE49-F238E27FC236}">
+                <a16:creationId xmlns:a16="http://schemas.microsoft.com/office/drawing/2014/main" id="{D0C68011-41C2-2645-E240-30FA9548DD5A}"/>
+              </a:ext>
+            </a:extLst>
+          </p:cNvPr>
+          <p:cNvSpPr>
+            <a:spLocks noGrp="1"/>
+          </p:cNvSpPr>
+          <p:nvPr>
+            <p:ph type="title"/>
+          </p:nvPr>
+        </p:nvSpPr>
+        <p:spPr/>
+        <p:txBody>
+          <a:bodyPr/>
+          <a:lstStyle/>
+          <a:p>
+            <a:r>
+              <a:rPr lang="en-US" dirty="0"/>
+              <a:t>The Event Scheduler Algorithm</a:t>
+            </a:r>
+          </a:p>
+        </p:txBody>
+      </p:sp>
+      <p:sp>
+        <p:nvSpPr>
+          <p:cNvPr id="3" name="Content Placeholder 2">
+            <a:extLst>
+              <a:ext uri="{FF2B5EF4-FFF2-40B4-BE49-F238E27FC236}">
+                <a16:creationId xmlns:a16="http://schemas.microsoft.com/office/drawing/2014/main" id="{B55AC7CD-4EC3-677D-8E87-AF29D2D3886A}"/>
+              </a:ext>
+            </a:extLst>
+          </p:cNvPr>
+          <p:cNvSpPr>
+            <a:spLocks noGrp="1"/>
+          </p:cNvSpPr>
+          <p:nvPr>
+            <p:ph idx="1"/>
+          </p:nvPr>
+        </p:nvSpPr>
+        <p:spPr/>
+        <p:txBody>
+          <a:bodyPr/>
+          <a:lstStyle/>
+          <a:p>
+            <a:r>
+              <a:rPr lang="en-US" dirty="0"/>
+              <a:t>Linked list of event groups is traversed</a:t>
+            </a:r>
+          </a:p>
+          <a:p>
+            <a:r>
+              <a:rPr lang="en-US" dirty="0"/>
+              <a:t>TODO: explain group attributes, event constraints</a:t>
+            </a:r>
+          </a:p>
+          <a:p>
+            <a:r>
+              <a:rPr lang="en-US" dirty="0"/>
+              <a:t>Failed group results in activation of counters, rest of groups wait for next iteration</a:t>
+            </a:r>
+          </a:p>
+          <a:p>
+            <a:pPr marL="0" indent="0">
+              <a:buNone/>
+            </a:pPr>
+            <a:endParaRPr lang="en-US" dirty="0"/>
+          </a:p>
+          <a:p>
+            <a:endParaRPr lang="en-US" dirty="0"/>
+          </a:p>
+        </p:txBody>
+      </p:sp>
+    </p:spTree>
+    <p:extLst>
+      <p:ext uri="{BB962C8B-B14F-4D97-AF65-F5344CB8AC3E}">
+        <p14:creationId xmlns:p14="http://schemas.microsoft.com/office/powerpoint/2010/main" val="1991528252"/>
+      </p:ext>
+    </p:extLst>
+  </p:cSld>
+  <p:clrMapOvr>
+    <a:masterClrMapping/>
+  </p:clrMapOvr>
+</p:sld>
+</file>
+
+<file path=ppt/slides/slide9.xml><?xml version="1.0" encoding="utf-8"?>
+<p:sld xmlns:a="http://schemas.openxmlformats.org/drawingml/2006/main" xmlns:r="http://schemas.openxmlformats.org/officeDocument/2006/relationships" xmlns:p="http://schemas.openxmlformats.org/presentationml/2006/main">
+  <p:cSld>
+    <p:spTree>
+      <p:nvGrpSpPr>
+        <p:cNvPr id="1" name=""/>
+        <p:cNvGrpSpPr/>
+        <p:nvPr/>
+      </p:nvGrpSpPr>
+      <p:grpSpPr>
+        <a:xfrm>
+          <a:off x="0" y="0"/>
+          <a:ext cx="0" cy="0"/>
+          <a:chOff x="0" y="0"/>
+          <a:chExt cx="0" cy="0"/>
+        </a:xfrm>
+      </p:grpSpPr>
+      <p:sp>
+        <p:nvSpPr>
+          <p:cNvPr id="2" name="Title 1">
+            <a:extLst>
+              <a:ext uri="{FF2B5EF4-FFF2-40B4-BE49-F238E27FC236}">
+                <a16:creationId xmlns:a16="http://schemas.microsoft.com/office/drawing/2014/main" id="{61DB3BD7-1A15-6B75-3BC7-4813867BC3B5}"/>
+              </a:ext>
+            </a:extLst>
+          </p:cNvPr>
+          <p:cNvSpPr>
+            <a:spLocks noGrp="1"/>
+          </p:cNvSpPr>
+          <p:nvPr>
+            <p:ph type="title"/>
+          </p:nvPr>
+        </p:nvSpPr>
+        <p:spPr/>
+        <p:txBody>
+          <a:bodyPr/>
+          <a:lstStyle/>
+          <a:p>
+            <a:r>
+              <a:rPr lang="en-US" dirty="0"/>
+              <a:t>Observations</a:t>
+            </a:r>
+          </a:p>
+        </p:txBody>
+      </p:sp>
+      <p:sp>
+        <p:nvSpPr>
+          <p:cNvPr id="3" name="Content Placeholder 2">
+            <a:extLst>
+              <a:ext uri="{FF2B5EF4-FFF2-40B4-BE49-F238E27FC236}">
+                <a16:creationId xmlns:a16="http://schemas.microsoft.com/office/drawing/2014/main" id="{3C0983C5-19F5-29C5-39CA-995EC49D4BBC}"/>
+              </a:ext>
+            </a:extLst>
+          </p:cNvPr>
+          <p:cNvSpPr>
+            <a:spLocks noGrp="1"/>
+          </p:cNvSpPr>
+          <p:nvPr>
+            <p:ph idx="1"/>
+          </p:nvPr>
+        </p:nvSpPr>
+        <p:spPr/>
+        <p:txBody>
+          <a:bodyPr/>
+          <a:lstStyle/>
+          <a:p>
+            <a:r>
+              <a:rPr lang="en-US" dirty="0"/>
+              <a:t>Linux </a:t>
+            </a:r>
             <a:r>
               <a:rPr lang="en-US" dirty="0">
                 <a:latin typeface="Consolas" panose="020B0609020204030204" pitchFamily="49" charset="0"/>
@@ -3699,63 +7046,62 @@
               </a:rPr>
               <a:t>hrtimer</a:t>
             </a:r>
-          </a:p>
-        </p:txBody>
-      </p:sp>
-      <p:sp>
-        <p:nvSpPr>
-          <p:cNvPr id="3" name="Content Placeholder 2">
-            <a:extLst>
-              <a:ext uri="{FF2B5EF4-FFF2-40B4-BE49-F238E27FC236}">
-                <a16:creationId xmlns:a16="http://schemas.microsoft.com/office/drawing/2014/main" id="{AEE407A4-0075-C96E-01A9-C1564B83AB97}"/>
-              </a:ext>
-            </a:extLst>
-          </p:cNvPr>
-          <p:cNvSpPr>
-            <a:spLocks noGrp="1"/>
-          </p:cNvSpPr>
-          <p:nvPr>
-            <p:ph idx="1"/>
-          </p:nvPr>
-        </p:nvSpPr>
-        <p:spPr/>
-        <p:txBody>
-          <a:bodyPr/>
-          <a:lstStyle/>
-          <a:p>
             <a:r>
               <a:rPr lang="en-US" dirty="0"/>
-              <a:t>Kernel module to print a lot of </a:t>
-            </a:r>
-            <a:r>
-              <a:rPr lang="en-US" dirty="0">
-                <a:latin typeface="Consolas" panose="020B0609020204030204" pitchFamily="49" charset="0"/>
-                <a:cs typeface="Consolas" panose="020B0609020204030204" pitchFamily="49" charset="0"/>
-              </a:rPr>
-              <a:t>hrtimer</a:t>
-            </a:r>
-            <a:r>
-              <a:rPr lang="en-US" dirty="0">
-                <a:cs typeface="Consolas" panose="020B0609020204030204" pitchFamily="49" charset="0"/>
-              </a:rPr>
-              <a:t> time recordings</a:t>
-            </a:r>
-          </a:p>
-          <a:p>
-            <a:r>
-              <a:rPr lang="en-US" dirty="0">
-                <a:latin typeface="Calibri" panose="020F0502020204030204" pitchFamily="34" charset="0"/>
-                <a:cs typeface="Calibri" panose="020F0502020204030204" pitchFamily="34" charset="0"/>
-              </a:rPr>
-              <a:t>Can see some variance at the timer level</a:t>
-            </a:r>
+              <a:t> sends multiplexing interrupt for interval</a:t>
+            </a:r>
+          </a:p>
+          <a:p>
+            <a:pPr marL="0" indent="0">
+              <a:buNone/>
+            </a:pPr>
+            <a:endParaRPr lang="en-US" dirty="0"/>
+          </a:p>
+          <a:p>
+            <a:r>
+              <a:rPr lang="en-US" dirty="0"/>
+              <a:t>Inefficient!!</a:t>
+            </a:r>
+          </a:p>
+          <a:p>
+            <a:pPr lvl="1"/>
+            <a:r>
+              <a:rPr lang="en-US" dirty="0"/>
+              <a:t>Counters are activated as soon as a group fails, which does not consider schedulability of later event groups</a:t>
+            </a:r>
+          </a:p>
+          <a:p>
+            <a:pPr marL="457200" lvl="1" indent="0">
+              <a:buNone/>
+            </a:pPr>
+            <a:endParaRPr lang="en-US" dirty="0"/>
+          </a:p>
+          <a:p>
+            <a:r>
+              <a:rPr lang="en-US" dirty="0"/>
+              <a:t>Reducing need for </a:t>
+            </a:r>
+            <a:r>
+              <a:rPr lang="en-US" i="1" dirty="0"/>
+              <a:t>multiplexing</a:t>
+            </a:r>
+            <a:r>
+              <a:rPr lang="en-US" dirty="0"/>
+              <a:t> would improve accuracy of event counts</a:t>
+            </a:r>
+          </a:p>
+          <a:p>
+            <a:pPr marL="457200" lvl="1" indent="0">
+              <a:buNone/>
+            </a:pPr>
+            <a:endParaRPr lang="en-US" dirty="0"/>
           </a:p>
         </p:txBody>
       </p:sp>
     </p:spTree>
     <p:extLst>
       <p:ext uri="{BB962C8B-B14F-4D97-AF65-F5344CB8AC3E}">
-        <p14:creationId xmlns:p14="http://schemas.microsoft.com/office/powerpoint/2010/main" val="2093111804"/>
+        <p14:creationId xmlns:p14="http://schemas.microsoft.com/office/powerpoint/2010/main" val="1579563712"/>
       </p:ext>
     </p:extLst>
   </p:cSld>
@@ -4058,4 +7404,299 @@
     </a:ext>
   </a:extLst>
 </a:theme>
+</file>
+
+<file path=ppt/theme/theme2.xml><?xml version="1.0" encoding="utf-8"?>
+<a:theme xmlns:a="http://schemas.openxmlformats.org/drawingml/2006/main" name="Office Theme">
+  <a:themeElements>
+    <a:clrScheme name="Office">
+      <a:dk1>
+        <a:sysClr val="windowText" lastClr="000000"/>
+      </a:dk1>
+      <a:lt1>
+        <a:sysClr val="window" lastClr="FFFFFF"/>
+      </a:lt1>
+      <a:dk2>
+        <a:srgbClr val="44546A"/>
+      </a:dk2>
+      <a:lt2>
+        <a:srgbClr val="E7E6E6"/>
+      </a:lt2>
+      <a:accent1>
+        <a:srgbClr val="4472C4"/>
+      </a:accent1>
+      <a:accent2>
+        <a:srgbClr val="ED7D31"/>
+      </a:accent2>
+      <a:accent3>
+        <a:srgbClr val="A5A5A5"/>
+      </a:accent3>
+      <a:accent4>
+        <a:srgbClr val="FFC000"/>
+      </a:accent4>
+      <a:accent5>
+        <a:srgbClr val="5B9BD5"/>
+      </a:accent5>
+      <a:accent6>
+        <a:srgbClr val="70AD47"/>
+      </a:accent6>
+      <a:hlink>
+        <a:srgbClr val="0563C1"/>
+      </a:hlink>
+      <a:folHlink>
+        <a:srgbClr val="954F72"/>
+      </a:folHlink>
+    </a:clrScheme>
+    <a:fontScheme name="Office">
+      <a:majorFont>
+        <a:latin typeface="Calibri Light" panose="020F0302020204030204"/>
+        <a:ea typeface=""/>
+        <a:cs typeface=""/>
+        <a:font script="Jpan" typeface="游ゴシック Light"/>
+        <a:font script="Hang" typeface="맑은 고딕"/>
+        <a:font script="Hans" typeface="等线 Light"/>
+        <a:font script="Hant" typeface="新細明體"/>
+        <a:font script="Arab" typeface="Times New Roman"/>
+        <a:font script="Hebr" typeface="Times New Roman"/>
+        <a:font script="Thai" typeface="Angsana New"/>
+        <a:font script="Ethi" typeface="Nyala"/>
+        <a:font script="Beng" typeface="Vrinda"/>
+        <a:font script="Gujr" typeface="Shruti"/>
+        <a:font script="Khmr" typeface="MoolBoran"/>
+        <a:font script="Knda" typeface="Tunga"/>
+        <a:font script="Guru" typeface="Raavi"/>
+        <a:font script="Cans" typeface="Euphemia"/>
+        <a:font script="Cher" typeface="Plantagenet Cherokee"/>
+        <a:font script="Yiii" typeface="Microsoft Yi Baiti"/>
+        <a:font script="Tibt" typeface="Microsoft Himalaya"/>
+        <a:font script="Thaa" typeface="MV Boli"/>
+        <a:font script="Deva" typeface="Mangal"/>
+        <a:font script="Telu" typeface="Gautami"/>
+        <a:font script="Taml" typeface="Latha"/>
+        <a:font script="Syrc" typeface="Estrangelo Edessa"/>
+        <a:font script="Orya" typeface="Kalinga"/>
+        <a:font script="Mlym" typeface="Kartika"/>
+        <a:font script="Laoo" typeface="DokChampa"/>
+        <a:font script="Sinh" typeface="Iskoola Pota"/>
+        <a:font script="Mong" typeface="Mongolian Baiti"/>
+        <a:font script="Viet" typeface="Times New Roman"/>
+        <a:font script="Uigh" typeface="Microsoft Uighur"/>
+        <a:font script="Geor" typeface="Sylfaen"/>
+        <a:font script="Armn" typeface="Arial"/>
+        <a:font script="Bugi" typeface="Leelawadee UI"/>
+        <a:font script="Bopo" typeface="Microsoft JhengHei"/>
+        <a:font script="Java" typeface="Javanese Text"/>
+        <a:font script="Lisu" typeface="Segoe UI"/>
+        <a:font script="Mymr" typeface="Myanmar Text"/>
+        <a:font script="Nkoo" typeface="Ebrima"/>
+        <a:font script="Olck" typeface="Nirmala UI"/>
+        <a:font script="Osma" typeface="Ebrima"/>
+        <a:font script="Phag" typeface="Phagspa"/>
+        <a:font script="Syrn" typeface="Estrangelo Edessa"/>
+        <a:font script="Syrj" typeface="Estrangelo Edessa"/>
+        <a:font script="Syre" typeface="Estrangelo Edessa"/>
+        <a:font script="Sora" typeface="Nirmala UI"/>
+        <a:font script="Tale" typeface="Microsoft Tai Le"/>
+        <a:font script="Talu" typeface="Microsoft New Tai Lue"/>
+        <a:font script="Tfng" typeface="Ebrima"/>
+      </a:majorFont>
+      <a:minorFont>
+        <a:latin typeface="Calibri" panose="020F0502020204030204"/>
+        <a:ea typeface=""/>
+        <a:cs typeface=""/>
+        <a:font script="Jpan" typeface="游ゴシック"/>
+        <a:font script="Hang" typeface="맑은 고딕"/>
+        <a:font script="Hans" typeface="等线"/>
+        <a:font script="Hant" typeface="新細明體"/>
+        <a:font script="Arab" typeface="Arial"/>
+        <a:font script="Hebr" typeface="Arial"/>
+        <a:font script="Thai" typeface="Cordia New"/>
+        <a:font script="Ethi" typeface="Nyala"/>
+        <a:font script="Beng" typeface="Vrinda"/>
+        <a:font script="Gujr" typeface="Shruti"/>
+        <a:font script="Khmr" typeface="DaunPenh"/>
+        <a:font script="Knda" typeface="Tunga"/>
+        <a:font script="Guru" typeface="Raavi"/>
+        <a:font script="Cans" typeface="Euphemia"/>
+        <a:font script="Cher" typeface="Plantagenet Cherokee"/>
+        <a:font script="Yiii" typeface="Microsoft Yi Baiti"/>
+        <a:font script="Tibt" typeface="Microsoft Himalaya"/>
+        <a:font script="Thaa" typeface="MV Boli"/>
+        <a:font script="Deva" typeface="Mangal"/>
+        <a:font script="Telu" typeface="Gautami"/>
+        <a:font script="Taml" typeface="Latha"/>
+        <a:font script="Syrc" typeface="Estrangelo Edessa"/>
+        <a:font script="Orya" typeface="Kalinga"/>
+        <a:font script="Mlym" typeface="Kartika"/>
+        <a:font script="Laoo" typeface="DokChampa"/>
+        <a:font script="Sinh" typeface="Iskoola Pota"/>
+        <a:font script="Mong" typeface="Mongolian Baiti"/>
+        <a:font script="Viet" typeface="Arial"/>
+        <a:font script="Uigh" typeface="Microsoft Uighur"/>
+        <a:font script="Geor" typeface="Sylfaen"/>
+        <a:font script="Armn" typeface="Arial"/>
+        <a:font script="Bugi" typeface="Leelawadee UI"/>
+        <a:font script="Bopo" typeface="Microsoft JhengHei"/>
+        <a:font script="Java" typeface="Javanese Text"/>
+        <a:font script="Lisu" typeface="Segoe UI"/>
+        <a:font script="Mymr" typeface="Myanmar Text"/>
+        <a:font script="Nkoo" typeface="Ebrima"/>
+        <a:font script="Olck" typeface="Nirmala UI"/>
+        <a:font script="Osma" typeface="Ebrima"/>
+        <a:font script="Phag" typeface="Phagspa"/>
+        <a:font script="Syrn" typeface="Estrangelo Edessa"/>
+        <a:font script="Syrj" typeface="Estrangelo Edessa"/>
+        <a:font script="Syre" typeface="Estrangelo Edessa"/>
+        <a:font script="Sora" typeface="Nirmala UI"/>
+        <a:font script="Tale" typeface="Microsoft Tai Le"/>
+        <a:font script="Talu" typeface="Microsoft New Tai Lue"/>
+        <a:font script="Tfng" typeface="Ebrima"/>
+      </a:minorFont>
+    </a:fontScheme>
+    <a:fmtScheme name="Office">
+      <a:fillStyleLst>
+        <a:solidFill>
+          <a:schemeClr val="phClr"/>
+        </a:solidFill>
+        <a:gradFill rotWithShape="1">
+          <a:gsLst>
+            <a:gs pos="0">
+              <a:schemeClr val="phClr">
+                <a:lumMod val="110000"/>
+                <a:satMod val="105000"/>
+                <a:tint val="67000"/>
+              </a:schemeClr>
+            </a:gs>
+            <a:gs pos="50000">
+              <a:schemeClr val="phClr">
+                <a:lumMod val="105000"/>
+                <a:satMod val="103000"/>
+                <a:tint val="73000"/>
+              </a:schemeClr>
+            </a:gs>
+            <a:gs pos="100000">
+              <a:schemeClr val="phClr">
+                <a:lumMod val="105000"/>
+                <a:satMod val="109000"/>
+                <a:tint val="81000"/>
+              </a:schemeClr>
+            </a:gs>
+          </a:gsLst>
+          <a:lin ang="5400000" scaled="0"/>
+        </a:gradFill>
+        <a:gradFill rotWithShape="1">
+          <a:gsLst>
+            <a:gs pos="0">
+              <a:schemeClr val="phClr">
+                <a:satMod val="103000"/>
+                <a:lumMod val="102000"/>
+                <a:tint val="94000"/>
+              </a:schemeClr>
+            </a:gs>
+            <a:gs pos="50000">
+              <a:schemeClr val="phClr">
+                <a:satMod val="110000"/>
+                <a:lumMod val="100000"/>
+                <a:shade val="100000"/>
+              </a:schemeClr>
+            </a:gs>
+            <a:gs pos="100000">
+              <a:schemeClr val="phClr">
+                <a:lumMod val="99000"/>
+                <a:satMod val="120000"/>
+                <a:shade val="78000"/>
+              </a:schemeClr>
+            </a:gs>
+          </a:gsLst>
+          <a:lin ang="5400000" scaled="0"/>
+        </a:gradFill>
+      </a:fillStyleLst>
+      <a:lnStyleLst>
+        <a:ln w="6350" cap="flat" cmpd="sng" algn="ctr">
+          <a:solidFill>
+            <a:schemeClr val="phClr"/>
+          </a:solidFill>
+          <a:prstDash val="solid"/>
+          <a:miter lim="800000"/>
+        </a:ln>
+        <a:ln w="12700" cap="flat" cmpd="sng" algn="ctr">
+          <a:solidFill>
+            <a:schemeClr val="phClr"/>
+          </a:solidFill>
+          <a:prstDash val="solid"/>
+          <a:miter lim="800000"/>
+        </a:ln>
+        <a:ln w="19050" cap="flat" cmpd="sng" algn="ctr">
+          <a:solidFill>
+            <a:schemeClr val="phClr"/>
+          </a:solidFill>
+          <a:prstDash val="solid"/>
+          <a:miter lim="800000"/>
+        </a:ln>
+      </a:lnStyleLst>
+      <a:effectStyleLst>
+        <a:effectStyle>
+          <a:effectLst/>
+        </a:effectStyle>
+        <a:effectStyle>
+          <a:effectLst/>
+        </a:effectStyle>
+        <a:effectStyle>
+          <a:effectLst>
+            <a:outerShdw blurRad="57150" dist="19050" dir="5400000" algn="ctr" rotWithShape="0">
+              <a:srgbClr val="000000">
+                <a:alpha val="63000"/>
+              </a:srgbClr>
+            </a:outerShdw>
+          </a:effectLst>
+        </a:effectStyle>
+      </a:effectStyleLst>
+      <a:bgFillStyleLst>
+        <a:solidFill>
+          <a:schemeClr val="phClr"/>
+        </a:solidFill>
+        <a:solidFill>
+          <a:schemeClr val="phClr">
+            <a:tint val="95000"/>
+            <a:satMod val="170000"/>
+          </a:schemeClr>
+        </a:solidFill>
+        <a:gradFill rotWithShape="1">
+          <a:gsLst>
+            <a:gs pos="0">
+              <a:schemeClr val="phClr">
+                <a:tint val="93000"/>
+                <a:satMod val="150000"/>
+                <a:shade val="98000"/>
+                <a:lumMod val="102000"/>
+              </a:schemeClr>
+            </a:gs>
+            <a:gs pos="50000">
+              <a:schemeClr val="phClr">
+                <a:tint val="98000"/>
+                <a:satMod val="130000"/>
+                <a:shade val="90000"/>
+                <a:lumMod val="103000"/>
+              </a:schemeClr>
+            </a:gs>
+            <a:gs pos="100000">
+              <a:schemeClr val="phClr">
+                <a:shade val="63000"/>
+                <a:satMod val="120000"/>
+              </a:schemeClr>
+            </a:gs>
+          </a:gsLst>
+          <a:lin ang="5400000" scaled="0"/>
+        </a:gradFill>
+      </a:bgFillStyleLst>
+    </a:fmtScheme>
+  </a:themeElements>
+  <a:objectDefaults/>
+  <a:extraClrSchemeLst/>
+  <a:extLst>
+    <a:ext uri="{05A4C25C-085E-4340-85A3-A5531E510DB2}">
+      <thm15:themeFamily xmlns:thm15="http://schemas.microsoft.com/office/thememl/2012/main" name="Office Theme" id="{62F939B6-93AF-4DB8-9C6B-D6C7DFDC589F}" vid="{4A3C46E8-61CC-4603-A589-7422A47A8E4A}"/>
+    </a:ext>
+  </a:extLst>
+</a:theme>
 </file>
</xml_diff>

<commit_message>
LZ finished first set of slides
</commit_message>
<xml_diff>
--- a/midterm.pptx
+++ b/midterm.pptx
@@ -5,18 +5,21 @@
     <p:sldMasterId id="2147483648" r:id="rId1"/>
   </p:sldMasterIdLst>
   <p:notesMasterIdLst>
-    <p:notesMasterId r:id="rId11"/>
+    <p:notesMasterId r:id="rId14"/>
   </p:notesMasterIdLst>
   <p:sldIdLst>
     <p:sldId id="256" r:id="rId2"/>
     <p:sldId id="261" r:id="rId3"/>
     <p:sldId id="280" r:id="rId4"/>
     <p:sldId id="281" r:id="rId5"/>
-    <p:sldId id="282" r:id="rId6"/>
-    <p:sldId id="283" r:id="rId7"/>
+    <p:sldId id="283" r:id="rId6"/>
+    <p:sldId id="282" r:id="rId7"/>
     <p:sldId id="257" r:id="rId8"/>
     <p:sldId id="258" r:id="rId9"/>
-    <p:sldId id="260" r:id="rId10"/>
+    <p:sldId id="284" r:id="rId10"/>
+    <p:sldId id="285" r:id="rId11"/>
+    <p:sldId id="260" r:id="rId12"/>
+    <p:sldId id="286" r:id="rId13"/>
   </p:sldIdLst>
   <p:sldSz cx="12192000" cy="6858000"/>
   <p:notesSz cx="6858000" cy="9144000"/>
@@ -602,7 +605,7 @@
           <a:p>
             <a:r>
               <a:rPr lang="en-US" dirty="0"/>
-              <a:t>Still, the subsystem is riddled with error</a:t>
+              <a:t>Draw attention to LLC-load-misses</a:t>
             </a:r>
           </a:p>
         </p:txBody>
@@ -633,7 +636,7 @@
     </p:spTree>
     <p:extLst>
       <p:ext uri="{BB962C8B-B14F-4D97-AF65-F5344CB8AC3E}">
-        <p14:creationId xmlns:p14="http://schemas.microsoft.com/office/powerpoint/2010/main" val="3001585224"/>
+        <p14:creationId xmlns:p14="http://schemas.microsoft.com/office/powerpoint/2010/main" val="55506833"/>
       </p:ext>
     </p:extLst>
   </p:cSld>
@@ -689,7 +692,7 @@
           <a:p>
             <a:r>
               <a:rPr lang="en-US" dirty="0"/>
-              <a:t>Draw attention to LLC-load-misses</a:t>
+              <a:t>Still, the subsystem is riddled with error</a:t>
             </a:r>
           </a:p>
         </p:txBody>
@@ -720,7 +723,7 @@
     </p:spTree>
     <p:extLst>
       <p:ext uri="{BB962C8B-B14F-4D97-AF65-F5344CB8AC3E}">
-        <p14:creationId xmlns:p14="http://schemas.microsoft.com/office/powerpoint/2010/main" val="55506833"/>
+        <p14:creationId xmlns:p14="http://schemas.microsoft.com/office/powerpoint/2010/main" val="3001585224"/>
       </p:ext>
     </p:extLst>
   </p:cSld>
@@ -809,6 +812,43 @@
             <a:r>
               <a:rPr lang="en-US" dirty="0"/>
               <a:t>LLC-load-misses was the pre-selected event</a:t>
+            </a:r>
+          </a:p>
+          <a:p>
+            <a:pPr marL="171450" indent="-171450">
+              <a:buFontTx/>
+              <a:buChar char="-"/>
+            </a:pPr>
+            <a:endParaRPr lang="en-US" dirty="0"/>
+          </a:p>
+          <a:p>
+            <a:pPr marL="171450" indent="-171450">
+              <a:buFontTx/>
+              <a:buChar char="-"/>
+            </a:pPr>
+            <a:endParaRPr lang="en-US" dirty="0"/>
+          </a:p>
+          <a:p>
+            <a:pPr marL="171450" marR="0" lvl="0" indent="-171450" algn="l" defTabSz="914400" rtl="0" eaLnBrk="1" fontAlgn="auto" latinLnBrk="0" hangingPunct="1">
+              <a:lnSpc>
+                <a:spcPct val="100000"/>
+              </a:lnSpc>
+              <a:spcBef>
+                <a:spcPts val="0"/>
+              </a:spcBef>
+              <a:spcAft>
+                <a:spcPts val="0"/>
+              </a:spcAft>
+              <a:buClrTx/>
+              <a:buSzTx/>
+              <a:buFontTx/>
+              <a:buChar char="-"/>
+              <a:tabLst/>
+              <a:defRPr/>
+            </a:pPr>
+            <a:r>
+              <a:rPr lang="en-US" dirty="0"/>
+              <a:t>So multiplexing is quite impactful and how events are assigned to counters is solved by event scheduling algorithms</a:t>
             </a:r>
           </a:p>
         </p:txBody>
@@ -893,19 +933,213 @@
           <a:bodyPr/>
           <a:lstStyle/>
           <a:p>
-            <a:r>
-              <a:rPr lang="en-US" sz="1200" dirty="0"/>
-              <a:t>Once a hardware event group fails to be scheduled, software events are scheduled onto the remaining counters.</a:t>
-            </a:r>
-          </a:p>
-          <a:p>
+            <a:pPr marL="171450" marR="0" lvl="0" indent="-171450" algn="l" defTabSz="914400" rtl="0" eaLnBrk="1" fontAlgn="auto" latinLnBrk="0" hangingPunct="1">
+              <a:lnSpc>
+                <a:spcPct val="100000"/>
+              </a:lnSpc>
+              <a:spcBef>
+                <a:spcPts val="0"/>
+              </a:spcBef>
+              <a:spcAft>
+                <a:spcPts val="0"/>
+              </a:spcAft>
+              <a:buClrTx/>
+              <a:buSzTx/>
+              <a:buFontTx/>
+              <a:buChar char="-"/>
+              <a:tabLst/>
+              <a:defRPr/>
+            </a:pPr>
+            <a:r>
+              <a:rPr lang="en-US" dirty="0"/>
+              <a:t>List is traversed head to tail</a:t>
+            </a:r>
+          </a:p>
+          <a:p>
+            <a:pPr marL="171450" marR="0" lvl="0" indent="-171450" algn="l" defTabSz="914400" rtl="0" eaLnBrk="1" fontAlgn="auto" latinLnBrk="0" hangingPunct="1">
+              <a:lnSpc>
+                <a:spcPct val="100000"/>
+              </a:lnSpc>
+              <a:spcBef>
+                <a:spcPts val="0"/>
+              </a:spcBef>
+              <a:spcAft>
+                <a:spcPts val="0"/>
+              </a:spcAft>
+              <a:buClrTx/>
+              <a:buSzTx/>
+              <a:buFontTx/>
+              <a:buChar char="-"/>
+              <a:tabLst/>
+              <a:defRPr/>
+            </a:pPr>
             <a:endParaRPr lang="en-US" dirty="0"/>
           </a:p>
           <a:p>
-            <a:r>
-              <a:rPr lang="en-US" sz="1200" dirty="0"/>
-              <a:t>This reduces time on PMU for hardware events which exacerbates error from extrapolation</a:t>
-            </a:r>
+            <a:pPr marL="171450" marR="0" lvl="0" indent="-171450" algn="l" defTabSz="914400" rtl="0" eaLnBrk="1" fontAlgn="auto" latinLnBrk="0" hangingPunct="1">
+              <a:lnSpc>
+                <a:spcPct val="100000"/>
+              </a:lnSpc>
+              <a:spcBef>
+                <a:spcPts val="0"/>
+              </a:spcBef>
+              <a:spcAft>
+                <a:spcPts val="0"/>
+              </a:spcAft>
+              <a:buClrTx/>
+              <a:buSzTx/>
+              <a:buFontTx/>
+              <a:buChar char="-"/>
+              <a:tabLst/>
+              <a:defRPr/>
+            </a:pPr>
+            <a:r>
+              <a:rPr lang="en-US" dirty="0"/>
+              <a:t>G2 fails to schedule</a:t>
+            </a:r>
+          </a:p>
+          <a:p>
+            <a:pPr marL="171450" marR="0" lvl="0" indent="-171450" algn="l" defTabSz="914400" rtl="0" eaLnBrk="1" fontAlgn="auto" latinLnBrk="0" hangingPunct="1">
+              <a:lnSpc>
+                <a:spcPct val="100000"/>
+              </a:lnSpc>
+              <a:spcBef>
+                <a:spcPts val="0"/>
+              </a:spcBef>
+              <a:spcAft>
+                <a:spcPts val="0"/>
+              </a:spcAft>
+              <a:buClrTx/>
+              <a:buSzTx/>
+              <a:buFontTx/>
+              <a:buChar char="-"/>
+              <a:tabLst/>
+              <a:defRPr/>
+            </a:pPr>
+            <a:endParaRPr lang="en-US" dirty="0"/>
+          </a:p>
+          <a:p>
+            <a:pPr marL="171450" marR="0" lvl="0" indent="-171450" algn="l" defTabSz="914400" rtl="0" eaLnBrk="1" fontAlgn="auto" latinLnBrk="0" hangingPunct="1">
+              <a:lnSpc>
+                <a:spcPct val="100000"/>
+              </a:lnSpc>
+              <a:spcBef>
+                <a:spcPts val="0"/>
+              </a:spcBef>
+              <a:spcAft>
+                <a:spcPts val="0"/>
+              </a:spcAft>
+              <a:buClrTx/>
+              <a:buSzTx/>
+              <a:buFontTx/>
+              <a:buChar char="-"/>
+              <a:tabLst/>
+              <a:defRPr/>
+            </a:pPr>
+            <a:r>
+              <a:rPr lang="en-US" dirty="0"/>
+              <a:t>Upon failure, the algorithm activates counters for counting and iteration proceeds</a:t>
+            </a:r>
+          </a:p>
+          <a:p>
+            <a:pPr marL="171450" marR="0" lvl="0" indent="-171450" algn="l" defTabSz="914400" rtl="0" eaLnBrk="1" fontAlgn="auto" latinLnBrk="0" hangingPunct="1">
+              <a:lnSpc>
+                <a:spcPct val="100000"/>
+              </a:lnSpc>
+              <a:spcBef>
+                <a:spcPts val="0"/>
+              </a:spcBef>
+              <a:spcAft>
+                <a:spcPts val="0"/>
+              </a:spcAft>
+              <a:buClrTx/>
+              <a:buSzTx/>
+              <a:buFontTx/>
+              <a:buChar char="-"/>
+              <a:tabLst/>
+              <a:defRPr/>
+            </a:pPr>
+            <a:endParaRPr lang="en-US" dirty="0"/>
+          </a:p>
+          <a:p>
+            <a:pPr marL="171450" marR="0" lvl="0" indent="-171450" algn="l" defTabSz="914400" rtl="0" eaLnBrk="1" fontAlgn="auto" latinLnBrk="0" hangingPunct="1">
+              <a:lnSpc>
+                <a:spcPct val="100000"/>
+              </a:lnSpc>
+              <a:spcBef>
+                <a:spcPts val="0"/>
+              </a:spcBef>
+              <a:spcAft>
+                <a:spcPts val="0"/>
+              </a:spcAft>
+              <a:buClrTx/>
+              <a:buSzTx/>
+              <a:buFontTx/>
+              <a:buChar char="-"/>
+              <a:tabLst/>
+              <a:defRPr/>
+            </a:pPr>
+            <a:r>
+              <a:rPr lang="en-US" dirty="0"/>
+              <a:t>Software events fill the rest of counters, but error in hardware event counts is exacerbated</a:t>
+            </a:r>
+          </a:p>
+          <a:p>
+            <a:pPr marL="0" marR="0" lvl="0" indent="0" algn="l" defTabSz="914400" rtl="0" eaLnBrk="1" fontAlgn="auto" latinLnBrk="0" hangingPunct="1">
+              <a:lnSpc>
+                <a:spcPct val="100000"/>
+              </a:lnSpc>
+              <a:spcBef>
+                <a:spcPts val="0"/>
+              </a:spcBef>
+              <a:spcAft>
+                <a:spcPts val="0"/>
+              </a:spcAft>
+              <a:buClrTx/>
+              <a:buSzTx/>
+              <a:buFontTx/>
+              <a:buNone/>
+              <a:tabLst/>
+              <a:defRPr/>
+            </a:pPr>
+            <a:endParaRPr lang="en-US" dirty="0"/>
+          </a:p>
+          <a:p>
+            <a:pPr marL="0" marR="0" lvl="0" indent="0" algn="l" defTabSz="914400" rtl="0" eaLnBrk="1" fontAlgn="auto" latinLnBrk="0" hangingPunct="1">
+              <a:lnSpc>
+                <a:spcPct val="100000"/>
+              </a:lnSpc>
+              <a:spcBef>
+                <a:spcPts val="0"/>
+              </a:spcBef>
+              <a:spcAft>
+                <a:spcPts val="0"/>
+              </a:spcAft>
+              <a:buClrTx/>
+              <a:buSzTx/>
+              <a:buFontTx/>
+              <a:buNone/>
+              <a:tabLst/>
+              <a:defRPr/>
+            </a:pPr>
+            <a:r>
+              <a:rPr lang="en-US" dirty="0"/>
+              <a:t>- Linux </a:t>
+            </a:r>
+            <a:r>
+              <a:rPr lang="en-US" dirty="0">
+                <a:latin typeface="Consolas" panose="020B0609020204030204" pitchFamily="49" charset="0"/>
+                <a:cs typeface="Consolas" panose="020B0609020204030204" pitchFamily="49" charset="0"/>
+              </a:rPr>
+              <a:t>hrtimer</a:t>
+            </a:r>
+            <a:r>
+              <a:rPr lang="en-US" dirty="0"/>
+              <a:t> sends multiplexing interrupt for interval</a:t>
+            </a:r>
+          </a:p>
+          <a:p>
+            <a:endParaRPr lang="en-US" dirty="0"/>
           </a:p>
         </p:txBody>
       </p:sp>
@@ -935,7 +1169,326 @@
     </p:spTree>
     <p:extLst>
       <p:ext uri="{BB962C8B-B14F-4D97-AF65-F5344CB8AC3E}">
+        <p14:creationId xmlns:p14="http://schemas.microsoft.com/office/powerpoint/2010/main" val="3094749063"/>
+      </p:ext>
+    </p:extLst>
+  </p:cSld>
+  <p:clrMapOvr>
+    <a:masterClrMapping/>
+  </p:clrMapOvr>
+</p:notes>
+</file>
+
+<file path=ppt/notesSlides/notesSlide6.xml><?xml version="1.0" encoding="utf-8"?>
+<p:notes xmlns:a="http://schemas.openxmlformats.org/drawingml/2006/main" xmlns:r="http://schemas.openxmlformats.org/officeDocument/2006/relationships" xmlns:p="http://schemas.openxmlformats.org/presentationml/2006/main">
+  <p:cSld>
+    <p:spTree>
+      <p:nvGrpSpPr>
+        <p:cNvPr id="1" name=""/>
+        <p:cNvGrpSpPr/>
+        <p:nvPr/>
+      </p:nvGrpSpPr>
+      <p:grpSpPr>
+        <a:xfrm>
+          <a:off x="0" y="0"/>
+          <a:ext cx="0" cy="0"/>
+          <a:chOff x="0" y="0"/>
+          <a:chExt cx="0" cy="0"/>
+        </a:xfrm>
+      </p:grpSpPr>
+      <p:sp>
+        <p:nvSpPr>
+          <p:cNvPr id="2" name="Slide Image Placeholder 1"/>
+          <p:cNvSpPr>
+            <a:spLocks noGrp="1" noRot="1" noChangeAspect="1"/>
+          </p:cNvSpPr>
+          <p:nvPr>
+            <p:ph type="sldImg"/>
+          </p:nvPr>
+        </p:nvSpPr>
+        <p:spPr/>
+      </p:sp>
+      <p:sp>
+        <p:nvSpPr>
+          <p:cNvPr id="3" name="Notes Placeholder 2"/>
+          <p:cNvSpPr>
+            <a:spLocks noGrp="1"/>
+          </p:cNvSpPr>
+          <p:nvPr>
+            <p:ph type="body" idx="1"/>
+          </p:nvPr>
+        </p:nvSpPr>
+        <p:spPr/>
+        <p:txBody>
+          <a:bodyPr/>
+          <a:lstStyle/>
+          <a:p>
+            <a:pPr marL="0" marR="0" lvl="0" indent="0" algn="l" defTabSz="914400" rtl="0" eaLnBrk="1" fontAlgn="auto" latinLnBrk="0" hangingPunct="1">
+              <a:lnSpc>
+                <a:spcPct val="100000"/>
+              </a:lnSpc>
+              <a:spcBef>
+                <a:spcPts val="0"/>
+              </a:spcBef>
+              <a:spcAft>
+                <a:spcPts val="0"/>
+              </a:spcAft>
+              <a:buClrTx/>
+              <a:buSzTx/>
+              <a:buFontTx/>
+              <a:buNone/>
+              <a:tabLst/>
+              <a:defRPr/>
+            </a:pPr>
+            <a:r>
+              <a:rPr lang="en-US" dirty="0"/>
+              <a:t>- Tail rotates to head</a:t>
+            </a:r>
+          </a:p>
+          <a:p>
+            <a:r>
+              <a:rPr lang="en-US" dirty="0"/>
+              <a:t>- This time all counters are utilized</a:t>
+            </a:r>
+          </a:p>
+        </p:txBody>
+      </p:sp>
+      <p:sp>
+        <p:nvSpPr>
+          <p:cNvPr id="4" name="Slide Number Placeholder 3"/>
+          <p:cNvSpPr>
+            <a:spLocks noGrp="1"/>
+          </p:cNvSpPr>
+          <p:nvPr>
+            <p:ph type="sldNum" sz="quarter" idx="5"/>
+          </p:nvPr>
+        </p:nvSpPr>
+        <p:spPr/>
+        <p:txBody>
+          <a:bodyPr/>
+          <a:lstStyle/>
+          <a:p>
+            <a:fld id="{20E657E1-BE6E-F343-8593-856120E10085}" type="slidenum">
+              <a:rPr lang="en-US" smtClean="0"/>
+              <a:t>10</a:t>
+            </a:fld>
+            <a:endParaRPr lang="en-US"/>
+          </a:p>
+        </p:txBody>
+      </p:sp>
+    </p:spTree>
+    <p:extLst>
+      <p:ext uri="{BB962C8B-B14F-4D97-AF65-F5344CB8AC3E}">
+        <p14:creationId xmlns:p14="http://schemas.microsoft.com/office/powerpoint/2010/main" val="3015628923"/>
+      </p:ext>
+    </p:extLst>
+  </p:cSld>
+  <p:clrMapOvr>
+    <a:masterClrMapping/>
+  </p:clrMapOvr>
+</p:notes>
+</file>
+
+<file path=ppt/notesSlides/notesSlide7.xml><?xml version="1.0" encoding="utf-8"?>
+<p:notes xmlns:a="http://schemas.openxmlformats.org/drawingml/2006/main" xmlns:r="http://schemas.openxmlformats.org/officeDocument/2006/relationships" xmlns:p="http://schemas.openxmlformats.org/presentationml/2006/main">
+  <p:cSld>
+    <p:spTree>
+      <p:nvGrpSpPr>
+        <p:cNvPr id="1" name=""/>
+        <p:cNvGrpSpPr/>
+        <p:nvPr/>
+      </p:nvGrpSpPr>
+      <p:grpSpPr>
+        <a:xfrm>
+          <a:off x="0" y="0"/>
+          <a:ext cx="0" cy="0"/>
+          <a:chOff x="0" y="0"/>
+          <a:chExt cx="0" cy="0"/>
+        </a:xfrm>
+      </p:grpSpPr>
+      <p:sp>
+        <p:nvSpPr>
+          <p:cNvPr id="2" name="Slide Image Placeholder 1"/>
+          <p:cNvSpPr>
+            <a:spLocks noGrp="1" noRot="1" noChangeAspect="1"/>
+          </p:cNvSpPr>
+          <p:nvPr>
+            <p:ph type="sldImg"/>
+          </p:nvPr>
+        </p:nvSpPr>
+        <p:spPr/>
+      </p:sp>
+      <p:sp>
+        <p:nvSpPr>
+          <p:cNvPr id="3" name="Notes Placeholder 2"/>
+          <p:cNvSpPr>
+            <a:spLocks noGrp="1"/>
+          </p:cNvSpPr>
+          <p:nvPr>
+            <p:ph type="body" idx="1"/>
+          </p:nvPr>
+        </p:nvSpPr>
+        <p:spPr/>
+        <p:txBody>
+          <a:bodyPr/>
+          <a:lstStyle/>
+          <a:p>
+            <a:r>
+              <a:rPr lang="en-US" sz="1200" dirty="0"/>
+              <a:t>Once a hardware event group fails to be scheduled, software events are scheduled onto the remaining counters.</a:t>
+            </a:r>
+          </a:p>
+          <a:p>
+            <a:endParaRPr lang="en-US" dirty="0"/>
+          </a:p>
+          <a:p>
+            <a:r>
+              <a:rPr lang="en-US" sz="1200" dirty="0"/>
+              <a:t>This reduces time on PMU for hardware events which exacerbates error from extrapolation</a:t>
+            </a:r>
+          </a:p>
+          <a:p>
+            <a:endParaRPr lang="en-US" sz="1200" dirty="0"/>
+          </a:p>
+          <a:p>
+            <a:r>
+              <a:rPr lang="en-US" sz="1200" dirty="0"/>
+              <a:t>Modifying the event scheduler </a:t>
+            </a:r>
+            <a:r>
+              <a:rPr lang="en-US" sz="1200"/>
+              <a:t>is difficult, but may </a:t>
+            </a:r>
+            <a:r>
+              <a:rPr lang="en-US" sz="1200" dirty="0"/>
+              <a:t>not be necessary to see significant improvements</a:t>
+            </a:r>
+          </a:p>
+        </p:txBody>
+      </p:sp>
+      <p:sp>
+        <p:nvSpPr>
+          <p:cNvPr id="4" name="Slide Number Placeholder 3"/>
+          <p:cNvSpPr>
+            <a:spLocks noGrp="1"/>
+          </p:cNvSpPr>
+          <p:nvPr>
+            <p:ph type="sldNum" sz="quarter" idx="5"/>
+          </p:nvPr>
+        </p:nvSpPr>
+        <p:spPr/>
+        <p:txBody>
+          <a:bodyPr/>
+          <a:lstStyle/>
+          <a:p>
+            <a:fld id="{20E657E1-BE6E-F343-8593-856120E10085}" type="slidenum">
+              <a:rPr lang="en-US" smtClean="0"/>
+              <a:t>11</a:t>
+            </a:fld>
+            <a:endParaRPr lang="en-US"/>
+          </a:p>
+        </p:txBody>
+      </p:sp>
+    </p:spTree>
+    <p:extLst>
+      <p:ext uri="{BB962C8B-B14F-4D97-AF65-F5344CB8AC3E}">
         <p14:creationId xmlns:p14="http://schemas.microsoft.com/office/powerpoint/2010/main" val="1375549576"/>
+      </p:ext>
+    </p:extLst>
+  </p:cSld>
+  <p:clrMapOvr>
+    <a:masterClrMapping/>
+  </p:clrMapOvr>
+</p:notes>
+</file>
+
+<file path=ppt/notesSlides/notesSlide8.xml><?xml version="1.0" encoding="utf-8"?>
+<p:notes xmlns:a="http://schemas.openxmlformats.org/drawingml/2006/main" xmlns:r="http://schemas.openxmlformats.org/officeDocument/2006/relationships" xmlns:p="http://schemas.openxmlformats.org/presentationml/2006/main">
+  <p:cSld>
+    <p:spTree>
+      <p:nvGrpSpPr>
+        <p:cNvPr id="1" name=""/>
+        <p:cNvGrpSpPr/>
+        <p:nvPr/>
+      </p:nvGrpSpPr>
+      <p:grpSpPr>
+        <a:xfrm>
+          <a:off x="0" y="0"/>
+          <a:ext cx="0" cy="0"/>
+          <a:chOff x="0" y="0"/>
+          <a:chExt cx="0" cy="0"/>
+        </a:xfrm>
+      </p:grpSpPr>
+      <p:sp>
+        <p:nvSpPr>
+          <p:cNvPr id="2" name="Slide Image Placeholder 1"/>
+          <p:cNvSpPr>
+            <a:spLocks noGrp="1" noRot="1" noChangeAspect="1"/>
+          </p:cNvSpPr>
+          <p:nvPr>
+            <p:ph type="sldImg"/>
+          </p:nvPr>
+        </p:nvSpPr>
+        <p:spPr/>
+      </p:sp>
+      <p:sp>
+        <p:nvSpPr>
+          <p:cNvPr id="3" name="Notes Placeholder 2"/>
+          <p:cNvSpPr>
+            <a:spLocks noGrp="1"/>
+          </p:cNvSpPr>
+          <p:nvPr>
+            <p:ph type="body" idx="1"/>
+          </p:nvPr>
+        </p:nvSpPr>
+        <p:spPr/>
+        <p:txBody>
+          <a:bodyPr/>
+          <a:lstStyle/>
+          <a:p>
+            <a:r>
+              <a:rPr lang="en-US" dirty="0"/>
+              <a:t>We can reduce the need to multiplex in the first place by reducing the events that are traced</a:t>
+            </a:r>
+          </a:p>
+          <a:p>
+            <a:endParaRPr lang="en-US" dirty="0"/>
+          </a:p>
+          <a:p>
+            <a:r>
+              <a:rPr lang="en-US" dirty="0"/>
+              <a:t>Transition to Tomson</a:t>
+            </a:r>
+          </a:p>
+        </p:txBody>
+      </p:sp>
+      <p:sp>
+        <p:nvSpPr>
+          <p:cNvPr id="4" name="Slide Number Placeholder 3"/>
+          <p:cNvSpPr>
+            <a:spLocks noGrp="1"/>
+          </p:cNvSpPr>
+          <p:nvPr>
+            <p:ph type="sldNum" sz="quarter" idx="5"/>
+          </p:nvPr>
+        </p:nvSpPr>
+        <p:spPr/>
+        <p:txBody>
+          <a:bodyPr/>
+          <a:lstStyle/>
+          <a:p>
+            <a:fld id="{20E657E1-BE6E-F343-8593-856120E10085}" type="slidenum">
+              <a:rPr lang="en-US" smtClean="0"/>
+              <a:t>12</a:t>
+            </a:fld>
+            <a:endParaRPr lang="en-US"/>
+          </a:p>
+        </p:txBody>
+      </p:sp>
+    </p:spTree>
+    <p:extLst>
+      <p:ext uri="{BB962C8B-B14F-4D97-AF65-F5344CB8AC3E}">
+        <p14:creationId xmlns:p14="http://schemas.microsoft.com/office/powerpoint/2010/main" val="2527501957"/>
       </p:ext>
     </p:extLst>
   </p:cSld>
@@ -4219,6 +4772,2106 @@
     <p:extLst>
       <p:ext uri="{BB962C8B-B14F-4D97-AF65-F5344CB8AC3E}">
         <p14:creationId xmlns:p14="http://schemas.microsoft.com/office/powerpoint/2010/main" val="3954250344"/>
+      </p:ext>
+    </p:extLst>
+  </p:cSld>
+  <p:clrMapOvr>
+    <a:masterClrMapping/>
+  </p:clrMapOvr>
+</p:sld>
+</file>
+
+<file path=ppt/slides/slide10.xml><?xml version="1.0" encoding="utf-8"?>
+<p:sld xmlns:a="http://schemas.openxmlformats.org/drawingml/2006/main" xmlns:r="http://schemas.openxmlformats.org/officeDocument/2006/relationships" xmlns:p="http://schemas.openxmlformats.org/presentationml/2006/main">
+  <p:cSld>
+    <p:spTree>
+      <p:nvGrpSpPr>
+        <p:cNvPr id="1" name=""/>
+        <p:cNvGrpSpPr/>
+        <p:nvPr/>
+      </p:nvGrpSpPr>
+      <p:grpSpPr>
+        <a:xfrm>
+          <a:off x="0" y="0"/>
+          <a:ext cx="0" cy="0"/>
+          <a:chOff x="0" y="0"/>
+          <a:chExt cx="0" cy="0"/>
+        </a:xfrm>
+      </p:grpSpPr>
+      <p:sp>
+        <p:nvSpPr>
+          <p:cNvPr id="2" name="Title 1">
+            <a:extLst>
+              <a:ext uri="{FF2B5EF4-FFF2-40B4-BE49-F238E27FC236}">
+                <a16:creationId xmlns:a16="http://schemas.microsoft.com/office/drawing/2014/main" id="{D0C68011-41C2-2645-E240-30FA9548DD5A}"/>
+              </a:ext>
+            </a:extLst>
+          </p:cNvPr>
+          <p:cNvSpPr>
+            <a:spLocks noGrp="1"/>
+          </p:cNvSpPr>
+          <p:nvPr>
+            <p:ph type="title"/>
+          </p:nvPr>
+        </p:nvSpPr>
+        <p:spPr/>
+        <p:txBody>
+          <a:bodyPr/>
+          <a:lstStyle/>
+          <a:p>
+            <a:r>
+              <a:rPr lang="en-US" dirty="0"/>
+              <a:t>The Event Scheduler algorithm</a:t>
+            </a:r>
+            <a:br>
+              <a:rPr lang="en-US" dirty="0"/>
+            </a:br>
+            <a:r>
+              <a:rPr lang="en-US" dirty="0"/>
+              <a:t>Example, second iteration</a:t>
+            </a:r>
+          </a:p>
+        </p:txBody>
+      </p:sp>
+      <p:sp>
+        <p:nvSpPr>
+          <p:cNvPr id="4" name="Rounded Rectangle 3">
+            <a:extLst>
+              <a:ext uri="{FF2B5EF4-FFF2-40B4-BE49-F238E27FC236}">
+                <a16:creationId xmlns:a16="http://schemas.microsoft.com/office/drawing/2014/main" id="{D2BF02E5-11FD-A766-C7EA-DBD087C6587E}"/>
+              </a:ext>
+            </a:extLst>
+          </p:cNvPr>
+          <p:cNvSpPr/>
+          <p:nvPr/>
+        </p:nvSpPr>
+        <p:spPr>
+          <a:xfrm>
+            <a:off x="9004743" y="2377966"/>
+            <a:ext cx="2225566" cy="1051034"/>
+          </a:xfrm>
+          <a:prstGeom prst="roundRect">
+            <a:avLst/>
+          </a:prstGeom>
+          <a:solidFill>
+            <a:srgbClr val="FF817F"/>
+          </a:solidFill>
+          <a:ln>
+            <a:noFill/>
+          </a:ln>
+        </p:spPr>
+        <p:style>
+          <a:lnRef idx="2">
+            <a:schemeClr val="accent1">
+              <a:shade val="50000"/>
+            </a:schemeClr>
+          </a:lnRef>
+          <a:fillRef idx="1">
+            <a:schemeClr val="accent1"/>
+          </a:fillRef>
+          <a:effectRef idx="0">
+            <a:schemeClr val="accent1"/>
+          </a:effectRef>
+          <a:fontRef idx="minor">
+            <a:schemeClr val="lt1"/>
+          </a:fontRef>
+        </p:style>
+        <p:txBody>
+          <a:bodyPr rtlCol="0" anchor="ctr"/>
+          <a:lstStyle/>
+          <a:p>
+            <a:pPr algn="ctr"/>
+            <a:r>
+              <a:rPr lang="en-US" b="1" dirty="0">
+                <a:solidFill>
+                  <a:schemeClr val="tx1"/>
+                </a:solidFill>
+              </a:rPr>
+              <a:t>E1, E2, E3</a:t>
+            </a:r>
+          </a:p>
+        </p:txBody>
+      </p:sp>
+      <p:cxnSp>
+        <p:nvCxnSpPr>
+          <p:cNvPr id="5" name="Straight Arrow Connector 4">
+            <a:extLst>
+              <a:ext uri="{FF2B5EF4-FFF2-40B4-BE49-F238E27FC236}">
+                <a16:creationId xmlns:a16="http://schemas.microsoft.com/office/drawing/2014/main" id="{5B9585E8-333B-9E88-45F9-029E02406E72}"/>
+              </a:ext>
+            </a:extLst>
+          </p:cNvPr>
+          <p:cNvCxnSpPr>
+            <a:cxnSpLocks/>
+            <a:stCxn id="9" idx="3"/>
+            <a:endCxn id="6" idx="1"/>
+          </p:cNvCxnSpPr>
+          <p:nvPr/>
+        </p:nvCxnSpPr>
+        <p:spPr>
+          <a:xfrm>
+            <a:off x="3063766" y="2903483"/>
+            <a:ext cx="496615" cy="0"/>
+          </a:xfrm>
+          <a:prstGeom prst="straightConnector1">
+            <a:avLst/>
+          </a:prstGeom>
+          <a:ln w="25400">
+            <a:solidFill>
+              <a:schemeClr val="tx1"/>
+            </a:solidFill>
+            <a:tailEnd type="triangle"/>
+          </a:ln>
+        </p:spPr>
+        <p:style>
+          <a:lnRef idx="1">
+            <a:schemeClr val="accent2"/>
+          </a:lnRef>
+          <a:fillRef idx="0">
+            <a:schemeClr val="accent2"/>
+          </a:fillRef>
+          <a:effectRef idx="0">
+            <a:schemeClr val="accent2"/>
+          </a:effectRef>
+          <a:fontRef idx="minor">
+            <a:schemeClr val="tx1"/>
+          </a:fontRef>
+        </p:style>
+      </p:cxnSp>
+      <p:sp>
+        <p:nvSpPr>
+          <p:cNvPr id="6" name="Rounded Rectangle 5">
+            <a:extLst>
+              <a:ext uri="{FF2B5EF4-FFF2-40B4-BE49-F238E27FC236}">
+                <a16:creationId xmlns:a16="http://schemas.microsoft.com/office/drawing/2014/main" id="{3941DA7F-0F6E-76E5-A21A-449A949CB392}"/>
+              </a:ext>
+            </a:extLst>
+          </p:cNvPr>
+          <p:cNvSpPr/>
+          <p:nvPr/>
+        </p:nvSpPr>
+        <p:spPr>
+          <a:xfrm>
+            <a:off x="3560381" y="2377966"/>
+            <a:ext cx="2225566" cy="1051034"/>
+          </a:xfrm>
+          <a:prstGeom prst="roundRect">
+            <a:avLst/>
+          </a:prstGeom>
+          <a:solidFill>
+            <a:srgbClr val="FF0000"/>
+          </a:solidFill>
+          <a:ln>
+            <a:noFill/>
+          </a:ln>
+        </p:spPr>
+        <p:style>
+          <a:lnRef idx="2">
+            <a:schemeClr val="accent1">
+              <a:shade val="50000"/>
+            </a:schemeClr>
+          </a:lnRef>
+          <a:fillRef idx="1">
+            <a:schemeClr val="accent1"/>
+          </a:fillRef>
+          <a:effectRef idx="0">
+            <a:schemeClr val="accent1"/>
+          </a:effectRef>
+          <a:fontRef idx="minor">
+            <a:schemeClr val="lt1"/>
+          </a:fontRef>
+        </p:style>
+        <p:txBody>
+          <a:bodyPr rtlCol="0" anchor="ctr"/>
+          <a:lstStyle/>
+          <a:p>
+            <a:pPr algn="ctr"/>
+            <a:r>
+              <a:rPr lang="en-US" b="1" dirty="0">
+                <a:solidFill>
+                  <a:schemeClr val="bg1"/>
+                </a:solidFill>
+              </a:rPr>
+              <a:t>E4, E5, E6, E7</a:t>
+            </a:r>
+          </a:p>
+        </p:txBody>
+      </p:sp>
+      <p:sp>
+        <p:nvSpPr>
+          <p:cNvPr id="7" name="Rounded Rectangle 6">
+            <a:extLst>
+              <a:ext uri="{FF2B5EF4-FFF2-40B4-BE49-F238E27FC236}">
+                <a16:creationId xmlns:a16="http://schemas.microsoft.com/office/drawing/2014/main" id="{244C1AEF-0494-C1FB-DA13-D3BEB5A97850}"/>
+              </a:ext>
+            </a:extLst>
+          </p:cNvPr>
+          <p:cNvSpPr/>
+          <p:nvPr/>
+        </p:nvSpPr>
+        <p:spPr>
+          <a:xfrm>
+            <a:off x="6282562" y="2377966"/>
+            <a:ext cx="2225566" cy="1051034"/>
+          </a:xfrm>
+          <a:prstGeom prst="roundRect">
+            <a:avLst/>
+          </a:prstGeom>
+          <a:solidFill>
+            <a:srgbClr val="C473FF"/>
+          </a:solidFill>
+          <a:ln>
+            <a:noFill/>
+          </a:ln>
+        </p:spPr>
+        <p:style>
+          <a:lnRef idx="2">
+            <a:schemeClr val="accent1">
+              <a:shade val="50000"/>
+            </a:schemeClr>
+          </a:lnRef>
+          <a:fillRef idx="1">
+            <a:schemeClr val="accent1"/>
+          </a:fillRef>
+          <a:effectRef idx="0">
+            <a:schemeClr val="accent1"/>
+          </a:effectRef>
+          <a:fontRef idx="minor">
+            <a:schemeClr val="lt1"/>
+          </a:fontRef>
+        </p:style>
+        <p:txBody>
+          <a:bodyPr rtlCol="0" anchor="ctr"/>
+          <a:lstStyle/>
+          <a:p>
+            <a:pPr algn="ctr"/>
+            <a:r>
+              <a:rPr lang="en-US" b="1" dirty="0">
+                <a:solidFill>
+                  <a:schemeClr val="tx1"/>
+                </a:solidFill>
+              </a:rPr>
+              <a:t>E8, E9, E10</a:t>
+            </a:r>
+          </a:p>
+        </p:txBody>
+      </p:sp>
+      <p:sp>
+        <p:nvSpPr>
+          <p:cNvPr id="9" name="Rounded Rectangle 8">
+            <a:extLst>
+              <a:ext uri="{FF2B5EF4-FFF2-40B4-BE49-F238E27FC236}">
+                <a16:creationId xmlns:a16="http://schemas.microsoft.com/office/drawing/2014/main" id="{6197DD73-C2E6-584A-4DB2-D57C826F4B3B}"/>
+              </a:ext>
+            </a:extLst>
+          </p:cNvPr>
+          <p:cNvSpPr/>
+          <p:nvPr/>
+        </p:nvSpPr>
+        <p:spPr>
+          <a:xfrm>
+            <a:off x="838200" y="2377966"/>
+            <a:ext cx="2225566" cy="1051034"/>
+          </a:xfrm>
+          <a:prstGeom prst="roundRect">
+            <a:avLst/>
+          </a:prstGeom>
+          <a:solidFill>
+            <a:srgbClr val="0040FF"/>
+          </a:solidFill>
+          <a:ln>
+            <a:noFill/>
+          </a:ln>
+        </p:spPr>
+        <p:style>
+          <a:lnRef idx="2">
+            <a:schemeClr val="accent1">
+              <a:shade val="50000"/>
+            </a:schemeClr>
+          </a:lnRef>
+          <a:fillRef idx="1">
+            <a:schemeClr val="accent1"/>
+          </a:fillRef>
+          <a:effectRef idx="0">
+            <a:schemeClr val="accent1"/>
+          </a:effectRef>
+          <a:fontRef idx="minor">
+            <a:schemeClr val="lt1"/>
+          </a:fontRef>
+        </p:style>
+        <p:txBody>
+          <a:bodyPr rtlCol="0" anchor="ctr"/>
+          <a:lstStyle/>
+          <a:p>
+            <a:pPr algn="ctr"/>
+            <a:r>
+              <a:rPr lang="en-US" b="1" dirty="0">
+                <a:solidFill>
+                  <a:schemeClr val="bg1"/>
+                </a:solidFill>
+              </a:rPr>
+              <a:t>E11, E12</a:t>
+            </a:r>
+          </a:p>
+        </p:txBody>
+      </p:sp>
+      <p:cxnSp>
+        <p:nvCxnSpPr>
+          <p:cNvPr id="10" name="Straight Arrow Connector 9">
+            <a:extLst>
+              <a:ext uri="{FF2B5EF4-FFF2-40B4-BE49-F238E27FC236}">
+                <a16:creationId xmlns:a16="http://schemas.microsoft.com/office/drawing/2014/main" id="{1DCB7FEC-B89E-51DF-7E56-E643F44911AF}"/>
+              </a:ext>
+            </a:extLst>
+          </p:cNvPr>
+          <p:cNvCxnSpPr>
+            <a:cxnSpLocks/>
+          </p:cNvCxnSpPr>
+          <p:nvPr/>
+        </p:nvCxnSpPr>
+        <p:spPr>
+          <a:xfrm>
+            <a:off x="5785947" y="2913992"/>
+            <a:ext cx="496615" cy="0"/>
+          </a:xfrm>
+          <a:prstGeom prst="straightConnector1">
+            <a:avLst/>
+          </a:prstGeom>
+          <a:ln w="25400">
+            <a:solidFill>
+              <a:schemeClr val="tx1"/>
+            </a:solidFill>
+            <a:tailEnd type="triangle"/>
+          </a:ln>
+        </p:spPr>
+        <p:style>
+          <a:lnRef idx="1">
+            <a:schemeClr val="accent2"/>
+          </a:lnRef>
+          <a:fillRef idx="0">
+            <a:schemeClr val="accent2"/>
+          </a:fillRef>
+          <a:effectRef idx="0">
+            <a:schemeClr val="accent2"/>
+          </a:effectRef>
+          <a:fontRef idx="minor">
+            <a:schemeClr val="tx1"/>
+          </a:fontRef>
+        </p:style>
+      </p:cxnSp>
+      <p:sp>
+        <p:nvSpPr>
+          <p:cNvPr id="25" name="TextBox 24">
+            <a:extLst>
+              <a:ext uri="{FF2B5EF4-FFF2-40B4-BE49-F238E27FC236}">
+                <a16:creationId xmlns:a16="http://schemas.microsoft.com/office/drawing/2014/main" id="{5597EDFE-343F-62BD-C43E-E8C60231EB57}"/>
+              </a:ext>
+            </a:extLst>
+          </p:cNvPr>
+          <p:cNvSpPr txBox="1"/>
+          <p:nvPr/>
+        </p:nvSpPr>
+        <p:spPr>
+          <a:xfrm>
+            <a:off x="9004743" y="2388477"/>
+            <a:ext cx="496615" cy="369332"/>
+          </a:xfrm>
+          <a:prstGeom prst="rect">
+            <a:avLst/>
+          </a:prstGeom>
+          <a:noFill/>
+        </p:spPr>
+        <p:txBody>
+          <a:bodyPr wrap="square" rtlCol="0">
+            <a:spAutoFit/>
+          </a:bodyPr>
+          <a:lstStyle/>
+          <a:p>
+            <a:r>
+              <a:rPr lang="en-US" b="1" dirty="0"/>
+              <a:t>G1</a:t>
+            </a:r>
+          </a:p>
+        </p:txBody>
+      </p:sp>
+      <p:sp>
+        <p:nvSpPr>
+          <p:cNvPr id="26" name="TextBox 25">
+            <a:extLst>
+              <a:ext uri="{FF2B5EF4-FFF2-40B4-BE49-F238E27FC236}">
+                <a16:creationId xmlns:a16="http://schemas.microsoft.com/office/drawing/2014/main" id="{3B53E386-8777-4A7A-CF6B-5EBA473BE8AB}"/>
+              </a:ext>
+            </a:extLst>
+          </p:cNvPr>
+          <p:cNvSpPr txBox="1"/>
+          <p:nvPr/>
+        </p:nvSpPr>
+        <p:spPr>
+          <a:xfrm>
+            <a:off x="3560381" y="2385075"/>
+            <a:ext cx="496615" cy="369332"/>
+          </a:xfrm>
+          <a:prstGeom prst="rect">
+            <a:avLst/>
+          </a:prstGeom>
+          <a:noFill/>
+        </p:spPr>
+        <p:txBody>
+          <a:bodyPr wrap="square" rtlCol="0">
+            <a:spAutoFit/>
+          </a:bodyPr>
+          <a:lstStyle/>
+          <a:p>
+            <a:r>
+              <a:rPr lang="en-US" b="1" dirty="0">
+                <a:solidFill>
+                  <a:schemeClr val="bg1"/>
+                </a:solidFill>
+              </a:rPr>
+              <a:t>G2</a:t>
+            </a:r>
+          </a:p>
+        </p:txBody>
+      </p:sp>
+      <p:sp>
+        <p:nvSpPr>
+          <p:cNvPr id="27" name="TextBox 26">
+            <a:extLst>
+              <a:ext uri="{FF2B5EF4-FFF2-40B4-BE49-F238E27FC236}">
+                <a16:creationId xmlns:a16="http://schemas.microsoft.com/office/drawing/2014/main" id="{B9CDBC98-F8EC-7E4E-FBBD-148749538031}"/>
+              </a:ext>
+            </a:extLst>
+          </p:cNvPr>
+          <p:cNvSpPr txBox="1"/>
+          <p:nvPr/>
+        </p:nvSpPr>
+        <p:spPr>
+          <a:xfrm>
+            <a:off x="6282562" y="2381673"/>
+            <a:ext cx="496615" cy="369332"/>
+          </a:xfrm>
+          <a:prstGeom prst="rect">
+            <a:avLst/>
+          </a:prstGeom>
+          <a:noFill/>
+        </p:spPr>
+        <p:txBody>
+          <a:bodyPr wrap="square" rtlCol="0">
+            <a:spAutoFit/>
+          </a:bodyPr>
+          <a:lstStyle/>
+          <a:p>
+            <a:r>
+              <a:rPr lang="en-US" b="1" dirty="0"/>
+              <a:t>G3</a:t>
+            </a:r>
+          </a:p>
+        </p:txBody>
+      </p:sp>
+      <p:sp>
+        <p:nvSpPr>
+          <p:cNvPr id="28" name="TextBox 27">
+            <a:extLst>
+              <a:ext uri="{FF2B5EF4-FFF2-40B4-BE49-F238E27FC236}">
+                <a16:creationId xmlns:a16="http://schemas.microsoft.com/office/drawing/2014/main" id="{36EC8021-F9E8-2E5B-5352-1F4CF9D1937B}"/>
+              </a:ext>
+            </a:extLst>
+          </p:cNvPr>
+          <p:cNvSpPr txBox="1"/>
+          <p:nvPr/>
+        </p:nvSpPr>
+        <p:spPr>
+          <a:xfrm>
+            <a:off x="838200" y="2396037"/>
+            <a:ext cx="496615" cy="369332"/>
+          </a:xfrm>
+          <a:prstGeom prst="rect">
+            <a:avLst/>
+          </a:prstGeom>
+          <a:noFill/>
+        </p:spPr>
+        <p:txBody>
+          <a:bodyPr wrap="square" rtlCol="0">
+            <a:spAutoFit/>
+          </a:bodyPr>
+          <a:lstStyle/>
+          <a:p>
+            <a:r>
+              <a:rPr lang="en-US" b="1" dirty="0">
+                <a:solidFill>
+                  <a:schemeClr val="bg1"/>
+                </a:solidFill>
+              </a:rPr>
+              <a:t>G4</a:t>
+            </a:r>
+          </a:p>
+        </p:txBody>
+      </p:sp>
+      <p:graphicFrame>
+        <p:nvGraphicFramePr>
+          <p:cNvPr id="31" name="Table 31">
+            <a:extLst>
+              <a:ext uri="{FF2B5EF4-FFF2-40B4-BE49-F238E27FC236}">
+                <a16:creationId xmlns:a16="http://schemas.microsoft.com/office/drawing/2014/main" id="{454928A9-0975-D0FB-0116-4C31D199FE83}"/>
+              </a:ext>
+            </a:extLst>
+          </p:cNvPr>
+          <p:cNvGraphicFramePr>
+            <a:graphicFrameLocks noGrp="1"/>
+          </p:cNvGraphicFramePr>
+          <p:nvPr>
+            <p:extLst>
+              <p:ext uri="{D42A27DB-BD31-4B8C-83A1-F6EECF244321}">
+                <p14:modId xmlns:p14="http://schemas.microsoft.com/office/powerpoint/2010/main" val="2595697847"/>
+              </p:ext>
+            </p:extLst>
+          </p:nvPr>
+        </p:nvGraphicFramePr>
+        <p:xfrm>
+          <a:off x="2031999" y="4376461"/>
+          <a:ext cx="8128002" cy="741680"/>
+        </p:xfrm>
+        <a:graphic>
+          <a:graphicData uri="http://schemas.openxmlformats.org/drawingml/2006/table">
+            <a:tbl>
+              <a:tblPr firstRow="1" bandRow="1">
+                <a:tableStyleId>{F5AB1C69-6EDB-4FF4-983F-18BD219EF322}</a:tableStyleId>
+              </a:tblPr>
+              <a:tblGrid>
+                <a:gridCol w="1354667">
+                  <a:extLst>
+                    <a:ext uri="{9D8B030D-6E8A-4147-A177-3AD203B41FA5}">
+                      <a16:colId xmlns:a16="http://schemas.microsoft.com/office/drawing/2014/main" val="2439474539"/>
+                    </a:ext>
+                  </a:extLst>
+                </a:gridCol>
+                <a:gridCol w="1354667">
+                  <a:extLst>
+                    <a:ext uri="{9D8B030D-6E8A-4147-A177-3AD203B41FA5}">
+                      <a16:colId xmlns:a16="http://schemas.microsoft.com/office/drawing/2014/main" val="1301125640"/>
+                    </a:ext>
+                  </a:extLst>
+                </a:gridCol>
+                <a:gridCol w="1354667">
+                  <a:extLst>
+                    <a:ext uri="{9D8B030D-6E8A-4147-A177-3AD203B41FA5}">
+                      <a16:colId xmlns:a16="http://schemas.microsoft.com/office/drawing/2014/main" val="3480179052"/>
+                    </a:ext>
+                  </a:extLst>
+                </a:gridCol>
+                <a:gridCol w="1354667">
+                  <a:extLst>
+                    <a:ext uri="{9D8B030D-6E8A-4147-A177-3AD203B41FA5}">
+                      <a16:colId xmlns:a16="http://schemas.microsoft.com/office/drawing/2014/main" val="2678239239"/>
+                    </a:ext>
+                  </a:extLst>
+                </a:gridCol>
+                <a:gridCol w="1354667">
+                  <a:extLst>
+                    <a:ext uri="{9D8B030D-6E8A-4147-A177-3AD203B41FA5}">
+                      <a16:colId xmlns:a16="http://schemas.microsoft.com/office/drawing/2014/main" val="69290392"/>
+                    </a:ext>
+                  </a:extLst>
+                </a:gridCol>
+                <a:gridCol w="1354667">
+                  <a:extLst>
+                    <a:ext uri="{9D8B030D-6E8A-4147-A177-3AD203B41FA5}">
+                      <a16:colId xmlns:a16="http://schemas.microsoft.com/office/drawing/2014/main" val="451300200"/>
+                    </a:ext>
+                  </a:extLst>
+                </a:gridCol>
+              </a:tblGrid>
+              <a:tr h="370840">
+                <a:tc>
+                  <a:txBody>
+                    <a:bodyPr/>
+                    <a:lstStyle/>
+                    <a:p>
+                      <a:r>
+                        <a:rPr lang="en-US" dirty="0"/>
+                        <a:t>C1</a:t>
+                      </a:r>
+                    </a:p>
+                  </a:txBody>
+                  <a:tcPr/>
+                </a:tc>
+                <a:tc>
+                  <a:txBody>
+                    <a:bodyPr/>
+                    <a:lstStyle/>
+                    <a:p>
+                      <a:r>
+                        <a:rPr lang="en-US" dirty="0"/>
+                        <a:t>C2</a:t>
+                      </a:r>
+                    </a:p>
+                  </a:txBody>
+                  <a:tcPr/>
+                </a:tc>
+                <a:tc>
+                  <a:txBody>
+                    <a:bodyPr/>
+                    <a:lstStyle/>
+                    <a:p>
+                      <a:r>
+                        <a:rPr lang="en-US" dirty="0"/>
+                        <a:t>C3</a:t>
+                      </a:r>
+                    </a:p>
+                  </a:txBody>
+                  <a:tcPr/>
+                </a:tc>
+                <a:tc>
+                  <a:txBody>
+                    <a:bodyPr/>
+                    <a:lstStyle/>
+                    <a:p>
+                      <a:r>
+                        <a:rPr lang="en-US" dirty="0"/>
+                        <a:t>C4</a:t>
+                      </a:r>
+                    </a:p>
+                  </a:txBody>
+                  <a:tcPr/>
+                </a:tc>
+                <a:tc>
+                  <a:txBody>
+                    <a:bodyPr/>
+                    <a:lstStyle/>
+                    <a:p>
+                      <a:r>
+                        <a:rPr lang="en-US" dirty="0"/>
+                        <a:t>C5</a:t>
+                      </a:r>
+                    </a:p>
+                  </a:txBody>
+                  <a:tcPr/>
+                </a:tc>
+                <a:tc>
+                  <a:txBody>
+                    <a:bodyPr/>
+                    <a:lstStyle/>
+                    <a:p>
+                      <a:r>
+                        <a:rPr lang="en-US" dirty="0"/>
+                        <a:t>C6</a:t>
+                      </a:r>
+                    </a:p>
+                  </a:txBody>
+                  <a:tcPr/>
+                </a:tc>
+                <a:extLst>
+                  <a:ext uri="{0D108BD9-81ED-4DB2-BD59-A6C34878D82A}">
+                    <a16:rowId xmlns:a16="http://schemas.microsoft.com/office/drawing/2014/main" val="1826944969"/>
+                  </a:ext>
+                </a:extLst>
+              </a:tr>
+              <a:tr h="370840">
+                <a:tc>
+                  <a:txBody>
+                    <a:bodyPr/>
+                    <a:lstStyle/>
+                    <a:p>
+                      <a:r>
+                        <a:rPr lang="en-US" dirty="0"/>
+                        <a:t>E11</a:t>
+                      </a:r>
+                    </a:p>
+                  </a:txBody>
+                  <a:tcPr/>
+                </a:tc>
+                <a:tc>
+                  <a:txBody>
+                    <a:bodyPr/>
+                    <a:lstStyle/>
+                    <a:p>
+                      <a:r>
+                        <a:rPr lang="en-US" dirty="0"/>
+                        <a:t>E12</a:t>
+                      </a:r>
+                    </a:p>
+                  </a:txBody>
+                  <a:tcPr/>
+                </a:tc>
+                <a:tc>
+                  <a:txBody>
+                    <a:bodyPr/>
+                    <a:lstStyle/>
+                    <a:p>
+                      <a:r>
+                        <a:rPr lang="en-US" dirty="0"/>
+                        <a:t>E4</a:t>
+                      </a:r>
+                    </a:p>
+                  </a:txBody>
+                  <a:tcPr/>
+                </a:tc>
+                <a:tc>
+                  <a:txBody>
+                    <a:bodyPr/>
+                    <a:lstStyle/>
+                    <a:p>
+                      <a:r>
+                        <a:rPr lang="en-US" dirty="0"/>
+                        <a:t>E5</a:t>
+                      </a:r>
+                    </a:p>
+                  </a:txBody>
+                  <a:tcPr/>
+                </a:tc>
+                <a:tc>
+                  <a:txBody>
+                    <a:bodyPr/>
+                    <a:lstStyle/>
+                    <a:p>
+                      <a:r>
+                        <a:rPr lang="en-US" dirty="0"/>
+                        <a:t>E6</a:t>
+                      </a:r>
+                    </a:p>
+                  </a:txBody>
+                  <a:tcPr/>
+                </a:tc>
+                <a:tc>
+                  <a:txBody>
+                    <a:bodyPr/>
+                    <a:lstStyle/>
+                    <a:p>
+                      <a:r>
+                        <a:rPr lang="en-US" dirty="0"/>
+                        <a:t>E7</a:t>
+                      </a:r>
+                    </a:p>
+                  </a:txBody>
+                  <a:tcPr/>
+                </a:tc>
+                <a:extLst>
+                  <a:ext uri="{0D108BD9-81ED-4DB2-BD59-A6C34878D82A}">
+                    <a16:rowId xmlns:a16="http://schemas.microsoft.com/office/drawing/2014/main" val="3761861412"/>
+                  </a:ext>
+                </a:extLst>
+              </a:tr>
+            </a:tbl>
+          </a:graphicData>
+        </a:graphic>
+      </p:graphicFrame>
+      <p:pic>
+        <p:nvPicPr>
+          <p:cNvPr id="33" name="Graphic 32" descr="Checkmark with solid fill">
+            <a:extLst>
+              <a:ext uri="{FF2B5EF4-FFF2-40B4-BE49-F238E27FC236}">
+                <a16:creationId xmlns:a16="http://schemas.microsoft.com/office/drawing/2014/main" id="{9DE34486-85E8-3AB4-A771-614086F77771}"/>
+              </a:ext>
+            </a:extLst>
+          </p:cNvPr>
+          <p:cNvPicPr>
+            <a:picLocks noChangeAspect="1"/>
+          </p:cNvPicPr>
+          <p:nvPr/>
+        </p:nvPicPr>
+        <p:blipFill>
+          <a:blip r:embed="rId3">
+            <a:extLst>
+              <a:ext uri="{96DAC541-7B7A-43D3-8B79-37D633B846F1}">
+                <asvg:svgBlip xmlns:asvg="http://schemas.microsoft.com/office/drawing/2016/SVG/main" r:embed="rId4"/>
+              </a:ext>
+            </a:extLst>
+          </a:blip>
+          <a:stretch>
+            <a:fillRect/>
+          </a:stretch>
+        </p:blipFill>
+        <p:spPr>
+          <a:xfrm>
+            <a:off x="2439714" y="1877793"/>
+            <a:ext cx="914400" cy="914400"/>
+          </a:xfrm>
+          <a:prstGeom prst="rect">
+            <a:avLst/>
+          </a:prstGeom>
+        </p:spPr>
+      </p:pic>
+      <p:pic>
+        <p:nvPicPr>
+          <p:cNvPr id="35" name="Graphic 34" descr="Badge Cross with solid fill">
+            <a:extLst>
+              <a:ext uri="{FF2B5EF4-FFF2-40B4-BE49-F238E27FC236}">
+                <a16:creationId xmlns:a16="http://schemas.microsoft.com/office/drawing/2014/main" id="{35F4B7EA-14CC-B241-C346-DE5F2F719C1C}"/>
+              </a:ext>
+            </a:extLst>
+          </p:cNvPr>
+          <p:cNvPicPr>
+            <a:picLocks noChangeAspect="1"/>
+          </p:cNvPicPr>
+          <p:nvPr/>
+        </p:nvPicPr>
+        <p:blipFill>
+          <a:blip r:embed="rId5">
+            <a:extLst>
+              <a:ext uri="{96DAC541-7B7A-43D3-8B79-37D633B846F1}">
+                <asvg:svgBlip xmlns:asvg="http://schemas.microsoft.com/office/drawing/2016/SVG/main" r:embed="rId6"/>
+              </a:ext>
+            </a:extLst>
+          </a:blip>
+          <a:stretch>
+            <a:fillRect/>
+          </a:stretch>
+        </p:blipFill>
+        <p:spPr>
+          <a:xfrm>
+            <a:off x="7884076" y="1877793"/>
+            <a:ext cx="914400" cy="914400"/>
+          </a:xfrm>
+          <a:prstGeom prst="rect">
+            <a:avLst/>
+          </a:prstGeom>
+        </p:spPr>
+      </p:pic>
+      <p:cxnSp>
+        <p:nvCxnSpPr>
+          <p:cNvPr id="16" name="Straight Arrow Connector 15">
+            <a:extLst>
+              <a:ext uri="{FF2B5EF4-FFF2-40B4-BE49-F238E27FC236}">
+                <a16:creationId xmlns:a16="http://schemas.microsoft.com/office/drawing/2014/main" id="{92F4EDE1-E185-E53F-1AAC-3E75E21BB5B4}"/>
+              </a:ext>
+            </a:extLst>
+          </p:cNvPr>
+          <p:cNvCxnSpPr>
+            <a:cxnSpLocks/>
+          </p:cNvCxnSpPr>
+          <p:nvPr/>
+        </p:nvCxnSpPr>
+        <p:spPr>
+          <a:xfrm>
+            <a:off x="8508128" y="2903483"/>
+            <a:ext cx="496615" cy="0"/>
+          </a:xfrm>
+          <a:prstGeom prst="straightConnector1">
+            <a:avLst/>
+          </a:prstGeom>
+          <a:ln w="25400">
+            <a:solidFill>
+              <a:schemeClr val="tx1"/>
+            </a:solidFill>
+            <a:tailEnd type="triangle"/>
+          </a:ln>
+        </p:spPr>
+        <p:style>
+          <a:lnRef idx="1">
+            <a:schemeClr val="accent2"/>
+          </a:lnRef>
+          <a:fillRef idx="0">
+            <a:schemeClr val="accent2"/>
+          </a:fillRef>
+          <a:effectRef idx="0">
+            <a:schemeClr val="accent2"/>
+          </a:effectRef>
+          <a:fontRef idx="minor">
+            <a:schemeClr val="tx1"/>
+          </a:fontRef>
+        </p:style>
+      </p:cxnSp>
+      <p:pic>
+        <p:nvPicPr>
+          <p:cNvPr id="17" name="Graphic 16" descr="Checkmark with solid fill">
+            <a:extLst>
+              <a:ext uri="{FF2B5EF4-FFF2-40B4-BE49-F238E27FC236}">
+                <a16:creationId xmlns:a16="http://schemas.microsoft.com/office/drawing/2014/main" id="{CA82E7AA-80DB-9AEC-271B-92FE495A849B}"/>
+              </a:ext>
+            </a:extLst>
+          </p:cNvPr>
+          <p:cNvPicPr>
+            <a:picLocks noChangeAspect="1"/>
+          </p:cNvPicPr>
+          <p:nvPr/>
+        </p:nvPicPr>
+        <p:blipFill>
+          <a:blip r:embed="rId3">
+            <a:extLst>
+              <a:ext uri="{96DAC541-7B7A-43D3-8B79-37D633B846F1}">
+                <asvg:svgBlip xmlns:asvg="http://schemas.microsoft.com/office/drawing/2016/SVG/main" r:embed="rId4"/>
+              </a:ext>
+            </a:extLst>
+          </a:blip>
+          <a:stretch>
+            <a:fillRect/>
+          </a:stretch>
+        </p:blipFill>
+        <p:spPr>
+          <a:xfrm>
+            <a:off x="5161895" y="1877793"/>
+            <a:ext cx="914400" cy="914400"/>
+          </a:xfrm>
+          <a:prstGeom prst="rect">
+            <a:avLst/>
+          </a:prstGeom>
+        </p:spPr>
+      </p:pic>
+    </p:spTree>
+    <p:extLst>
+      <p:ext uri="{BB962C8B-B14F-4D97-AF65-F5344CB8AC3E}">
+        <p14:creationId xmlns:p14="http://schemas.microsoft.com/office/powerpoint/2010/main" val="3727702769"/>
+      </p:ext>
+    </p:extLst>
+  </p:cSld>
+  <p:clrMapOvr>
+    <a:masterClrMapping/>
+  </p:clrMapOvr>
+</p:sld>
+</file>
+
+<file path=ppt/slides/slide11.xml><?xml version="1.0" encoding="utf-8"?>
+<p:sld xmlns:a="http://schemas.openxmlformats.org/drawingml/2006/main" xmlns:r="http://schemas.openxmlformats.org/officeDocument/2006/relationships" xmlns:p="http://schemas.openxmlformats.org/presentationml/2006/main">
+  <p:cSld>
+    <p:spTree>
+      <p:nvGrpSpPr>
+        <p:cNvPr id="1" name=""/>
+        <p:cNvGrpSpPr/>
+        <p:nvPr/>
+      </p:nvGrpSpPr>
+      <p:grpSpPr>
+        <a:xfrm>
+          <a:off x="0" y="0"/>
+          <a:ext cx="0" cy="0"/>
+          <a:chOff x="0" y="0"/>
+          <a:chExt cx="0" cy="0"/>
+        </a:xfrm>
+      </p:grpSpPr>
+      <p:sp>
+        <p:nvSpPr>
+          <p:cNvPr id="2" name="Title 1">
+            <a:extLst>
+              <a:ext uri="{FF2B5EF4-FFF2-40B4-BE49-F238E27FC236}">
+                <a16:creationId xmlns:a16="http://schemas.microsoft.com/office/drawing/2014/main" id="{61DB3BD7-1A15-6B75-3BC7-4813867BC3B5}"/>
+              </a:ext>
+            </a:extLst>
+          </p:cNvPr>
+          <p:cNvSpPr>
+            <a:spLocks noGrp="1"/>
+          </p:cNvSpPr>
+          <p:nvPr>
+            <p:ph type="title"/>
+          </p:nvPr>
+        </p:nvSpPr>
+        <p:spPr/>
+        <p:txBody>
+          <a:bodyPr/>
+          <a:lstStyle/>
+          <a:p>
+            <a:r>
+              <a:rPr lang="en-US" dirty="0"/>
+              <a:t>Observations</a:t>
+            </a:r>
+          </a:p>
+        </p:txBody>
+      </p:sp>
+      <p:sp>
+        <p:nvSpPr>
+          <p:cNvPr id="3" name="Content Placeholder 2">
+            <a:extLst>
+              <a:ext uri="{FF2B5EF4-FFF2-40B4-BE49-F238E27FC236}">
+                <a16:creationId xmlns:a16="http://schemas.microsoft.com/office/drawing/2014/main" id="{3C0983C5-19F5-29C5-39CA-995EC49D4BBC}"/>
+              </a:ext>
+            </a:extLst>
+          </p:cNvPr>
+          <p:cNvSpPr>
+            <a:spLocks noGrp="1"/>
+          </p:cNvSpPr>
+          <p:nvPr>
+            <p:ph idx="1"/>
+          </p:nvPr>
+        </p:nvSpPr>
+        <p:spPr>
+          <a:xfrm>
+            <a:off x="838200" y="1825625"/>
+            <a:ext cx="10515600" cy="1249648"/>
+          </a:xfrm>
+        </p:spPr>
+        <p:txBody>
+          <a:bodyPr/>
+          <a:lstStyle/>
+          <a:p>
+            <a:r>
+              <a:rPr lang="en-US" dirty="0"/>
+              <a:t>The algorithm is significantly </a:t>
+            </a:r>
+            <a:r>
+              <a:rPr lang="en-US" i="1" dirty="0"/>
+              <a:t>Inefficient</a:t>
+            </a:r>
+          </a:p>
+          <a:p>
+            <a:pPr lvl="1"/>
+            <a:r>
+              <a:rPr lang="en-US" dirty="0"/>
+              <a:t>Counters are activated as soon as a group fails, which does not consider schedulability of later event groups</a:t>
+            </a:r>
+          </a:p>
+          <a:p>
+            <a:pPr lvl="1"/>
+            <a:endParaRPr lang="en-US" dirty="0"/>
+          </a:p>
+          <a:p>
+            <a:pPr lvl="1"/>
+            <a:endParaRPr lang="en-US" dirty="0"/>
+          </a:p>
+          <a:p>
+            <a:pPr marL="457200" lvl="1" indent="0">
+              <a:buNone/>
+            </a:pPr>
+            <a:endParaRPr lang="en-US" dirty="0"/>
+          </a:p>
+          <a:p>
+            <a:pPr marL="457200" lvl="1" indent="0">
+              <a:buNone/>
+            </a:pPr>
+            <a:endParaRPr lang="en-US" dirty="0"/>
+          </a:p>
+          <a:p>
+            <a:pPr marL="457200" lvl="1" indent="0">
+              <a:buNone/>
+            </a:pPr>
+            <a:endParaRPr lang="en-US" dirty="0"/>
+          </a:p>
+          <a:p>
+            <a:pPr marL="457200" lvl="1" indent="0">
+              <a:buNone/>
+            </a:pPr>
+            <a:endParaRPr lang="en-US" dirty="0"/>
+          </a:p>
+        </p:txBody>
+      </p:sp>
+      <p:sp>
+        <p:nvSpPr>
+          <p:cNvPr id="8" name="Rounded Rectangle 7">
+            <a:extLst>
+              <a:ext uri="{FF2B5EF4-FFF2-40B4-BE49-F238E27FC236}">
+                <a16:creationId xmlns:a16="http://schemas.microsoft.com/office/drawing/2014/main" id="{0038F81B-5659-B8C6-7439-E65984E474E5}"/>
+              </a:ext>
+            </a:extLst>
+          </p:cNvPr>
+          <p:cNvSpPr/>
+          <p:nvPr/>
+        </p:nvSpPr>
+        <p:spPr>
+          <a:xfrm>
+            <a:off x="961691" y="3429000"/>
+            <a:ext cx="2225566" cy="1051034"/>
+          </a:xfrm>
+          <a:prstGeom prst="roundRect">
+            <a:avLst/>
+          </a:prstGeom>
+          <a:solidFill>
+            <a:srgbClr val="FF817F"/>
+          </a:solidFill>
+          <a:ln>
+            <a:noFill/>
+          </a:ln>
+        </p:spPr>
+        <p:style>
+          <a:lnRef idx="2">
+            <a:schemeClr val="accent1">
+              <a:shade val="50000"/>
+            </a:schemeClr>
+          </a:lnRef>
+          <a:fillRef idx="1">
+            <a:schemeClr val="accent1"/>
+          </a:fillRef>
+          <a:effectRef idx="0">
+            <a:schemeClr val="accent1"/>
+          </a:effectRef>
+          <a:fontRef idx="minor">
+            <a:schemeClr val="lt1"/>
+          </a:fontRef>
+        </p:style>
+        <p:txBody>
+          <a:bodyPr rtlCol="0" anchor="ctr"/>
+          <a:lstStyle/>
+          <a:p>
+            <a:pPr algn="ctr"/>
+            <a:r>
+              <a:rPr lang="en-US" b="1" dirty="0">
+                <a:solidFill>
+                  <a:schemeClr val="tx1"/>
+                </a:solidFill>
+              </a:rPr>
+              <a:t>E1, E2, E3</a:t>
+            </a:r>
+          </a:p>
+        </p:txBody>
+      </p:sp>
+      <p:cxnSp>
+        <p:nvCxnSpPr>
+          <p:cNvPr id="9" name="Straight Arrow Connector 8">
+            <a:extLst>
+              <a:ext uri="{FF2B5EF4-FFF2-40B4-BE49-F238E27FC236}">
+                <a16:creationId xmlns:a16="http://schemas.microsoft.com/office/drawing/2014/main" id="{6F4CF1DE-34A1-CDD7-0FB5-D5CD57B21276}"/>
+              </a:ext>
+            </a:extLst>
+          </p:cNvPr>
+          <p:cNvCxnSpPr>
+            <a:cxnSpLocks/>
+            <a:stCxn id="8" idx="3"/>
+            <a:endCxn id="10" idx="1"/>
+          </p:cNvCxnSpPr>
+          <p:nvPr/>
+        </p:nvCxnSpPr>
+        <p:spPr>
+          <a:xfrm>
+            <a:off x="3187257" y="3954517"/>
+            <a:ext cx="496615" cy="0"/>
+          </a:xfrm>
+          <a:prstGeom prst="straightConnector1">
+            <a:avLst/>
+          </a:prstGeom>
+          <a:ln w="25400">
+            <a:solidFill>
+              <a:schemeClr val="tx1"/>
+            </a:solidFill>
+            <a:tailEnd type="triangle"/>
+          </a:ln>
+        </p:spPr>
+        <p:style>
+          <a:lnRef idx="1">
+            <a:schemeClr val="accent2"/>
+          </a:lnRef>
+          <a:fillRef idx="0">
+            <a:schemeClr val="accent2"/>
+          </a:fillRef>
+          <a:effectRef idx="0">
+            <a:schemeClr val="accent2"/>
+          </a:effectRef>
+          <a:fontRef idx="minor">
+            <a:schemeClr val="tx1"/>
+          </a:fontRef>
+        </p:style>
+      </p:cxnSp>
+      <p:sp>
+        <p:nvSpPr>
+          <p:cNvPr id="10" name="Rounded Rectangle 9">
+            <a:extLst>
+              <a:ext uri="{FF2B5EF4-FFF2-40B4-BE49-F238E27FC236}">
+                <a16:creationId xmlns:a16="http://schemas.microsoft.com/office/drawing/2014/main" id="{616A1078-E140-5563-6AD1-A7C84BBB9EC4}"/>
+              </a:ext>
+            </a:extLst>
+          </p:cNvPr>
+          <p:cNvSpPr/>
+          <p:nvPr/>
+        </p:nvSpPr>
+        <p:spPr>
+          <a:xfrm>
+            <a:off x="3683872" y="3429000"/>
+            <a:ext cx="2225566" cy="1051034"/>
+          </a:xfrm>
+          <a:prstGeom prst="roundRect">
+            <a:avLst/>
+          </a:prstGeom>
+          <a:solidFill>
+            <a:srgbClr val="FF0000"/>
+          </a:solidFill>
+          <a:ln>
+            <a:noFill/>
+          </a:ln>
+        </p:spPr>
+        <p:style>
+          <a:lnRef idx="2">
+            <a:schemeClr val="accent1">
+              <a:shade val="50000"/>
+            </a:schemeClr>
+          </a:lnRef>
+          <a:fillRef idx="1">
+            <a:schemeClr val="accent1"/>
+          </a:fillRef>
+          <a:effectRef idx="0">
+            <a:schemeClr val="accent1"/>
+          </a:effectRef>
+          <a:fontRef idx="minor">
+            <a:schemeClr val="lt1"/>
+          </a:fontRef>
+        </p:style>
+        <p:txBody>
+          <a:bodyPr rtlCol="0" anchor="ctr"/>
+          <a:lstStyle/>
+          <a:p>
+            <a:pPr algn="ctr"/>
+            <a:r>
+              <a:rPr lang="en-US" b="1" dirty="0">
+                <a:solidFill>
+                  <a:schemeClr val="bg1"/>
+                </a:solidFill>
+              </a:rPr>
+              <a:t>E4, E5, E6, E7</a:t>
+            </a:r>
+          </a:p>
+        </p:txBody>
+      </p:sp>
+      <p:sp>
+        <p:nvSpPr>
+          <p:cNvPr id="11" name="Rounded Rectangle 10">
+            <a:extLst>
+              <a:ext uri="{FF2B5EF4-FFF2-40B4-BE49-F238E27FC236}">
+                <a16:creationId xmlns:a16="http://schemas.microsoft.com/office/drawing/2014/main" id="{92D36EA3-F278-35B8-AFBA-DEC79734A734}"/>
+              </a:ext>
+            </a:extLst>
+          </p:cNvPr>
+          <p:cNvSpPr/>
+          <p:nvPr/>
+        </p:nvSpPr>
+        <p:spPr>
+          <a:xfrm>
+            <a:off x="6406053" y="3429000"/>
+            <a:ext cx="2225566" cy="1051034"/>
+          </a:xfrm>
+          <a:prstGeom prst="roundRect">
+            <a:avLst/>
+          </a:prstGeom>
+          <a:solidFill>
+            <a:srgbClr val="C473FF"/>
+          </a:solidFill>
+          <a:ln>
+            <a:noFill/>
+          </a:ln>
+        </p:spPr>
+        <p:style>
+          <a:lnRef idx="2">
+            <a:schemeClr val="accent1">
+              <a:shade val="50000"/>
+            </a:schemeClr>
+          </a:lnRef>
+          <a:fillRef idx="1">
+            <a:schemeClr val="accent1"/>
+          </a:fillRef>
+          <a:effectRef idx="0">
+            <a:schemeClr val="accent1"/>
+          </a:effectRef>
+          <a:fontRef idx="minor">
+            <a:schemeClr val="lt1"/>
+          </a:fontRef>
+        </p:style>
+        <p:txBody>
+          <a:bodyPr rtlCol="0" anchor="ctr"/>
+          <a:lstStyle/>
+          <a:p>
+            <a:pPr algn="ctr"/>
+            <a:r>
+              <a:rPr lang="en-US" b="1" dirty="0">
+                <a:solidFill>
+                  <a:schemeClr val="tx1"/>
+                </a:solidFill>
+              </a:rPr>
+              <a:t>E8, E9, E10</a:t>
+            </a:r>
+          </a:p>
+        </p:txBody>
+      </p:sp>
+      <p:cxnSp>
+        <p:nvCxnSpPr>
+          <p:cNvPr id="12" name="Straight Arrow Connector 11">
+            <a:extLst>
+              <a:ext uri="{FF2B5EF4-FFF2-40B4-BE49-F238E27FC236}">
+                <a16:creationId xmlns:a16="http://schemas.microsoft.com/office/drawing/2014/main" id="{F060E41B-3563-B822-2978-8E3C361B7824}"/>
+              </a:ext>
+            </a:extLst>
+          </p:cNvPr>
+          <p:cNvCxnSpPr>
+            <a:cxnSpLocks/>
+            <a:stCxn id="11" idx="3"/>
+            <a:endCxn id="13" idx="1"/>
+          </p:cNvCxnSpPr>
+          <p:nvPr/>
+        </p:nvCxnSpPr>
+        <p:spPr>
+          <a:xfrm>
+            <a:off x="8631619" y="3954517"/>
+            <a:ext cx="496615" cy="0"/>
+          </a:xfrm>
+          <a:prstGeom prst="straightConnector1">
+            <a:avLst/>
+          </a:prstGeom>
+          <a:ln w="25400">
+            <a:solidFill>
+              <a:schemeClr val="tx1"/>
+            </a:solidFill>
+            <a:tailEnd type="triangle"/>
+          </a:ln>
+        </p:spPr>
+        <p:style>
+          <a:lnRef idx="1">
+            <a:schemeClr val="accent2"/>
+          </a:lnRef>
+          <a:fillRef idx="0">
+            <a:schemeClr val="accent2"/>
+          </a:fillRef>
+          <a:effectRef idx="0">
+            <a:schemeClr val="accent2"/>
+          </a:effectRef>
+          <a:fontRef idx="minor">
+            <a:schemeClr val="tx1"/>
+          </a:fontRef>
+        </p:style>
+      </p:cxnSp>
+      <p:sp>
+        <p:nvSpPr>
+          <p:cNvPr id="13" name="Rounded Rectangle 12">
+            <a:extLst>
+              <a:ext uri="{FF2B5EF4-FFF2-40B4-BE49-F238E27FC236}">
+                <a16:creationId xmlns:a16="http://schemas.microsoft.com/office/drawing/2014/main" id="{9CE46ACD-9439-5121-1E65-3D61E5C2BE16}"/>
+              </a:ext>
+            </a:extLst>
+          </p:cNvPr>
+          <p:cNvSpPr/>
+          <p:nvPr/>
+        </p:nvSpPr>
+        <p:spPr>
+          <a:xfrm>
+            <a:off x="9128234" y="3429000"/>
+            <a:ext cx="2225566" cy="1051034"/>
+          </a:xfrm>
+          <a:prstGeom prst="roundRect">
+            <a:avLst/>
+          </a:prstGeom>
+          <a:solidFill>
+            <a:srgbClr val="0040FF"/>
+          </a:solidFill>
+          <a:ln>
+            <a:noFill/>
+          </a:ln>
+        </p:spPr>
+        <p:style>
+          <a:lnRef idx="2">
+            <a:schemeClr val="accent1">
+              <a:shade val="50000"/>
+            </a:schemeClr>
+          </a:lnRef>
+          <a:fillRef idx="1">
+            <a:schemeClr val="accent1"/>
+          </a:fillRef>
+          <a:effectRef idx="0">
+            <a:schemeClr val="accent1"/>
+          </a:effectRef>
+          <a:fontRef idx="minor">
+            <a:schemeClr val="lt1"/>
+          </a:fontRef>
+        </p:style>
+        <p:txBody>
+          <a:bodyPr rtlCol="0" anchor="ctr"/>
+          <a:lstStyle/>
+          <a:p>
+            <a:pPr algn="ctr"/>
+            <a:r>
+              <a:rPr lang="en-US" b="1" dirty="0">
+                <a:solidFill>
+                  <a:schemeClr val="bg1"/>
+                </a:solidFill>
+              </a:rPr>
+              <a:t>E11, E12</a:t>
+            </a:r>
+          </a:p>
+        </p:txBody>
+      </p:sp>
+      <p:cxnSp>
+        <p:nvCxnSpPr>
+          <p:cNvPr id="14" name="Straight Arrow Connector 13">
+            <a:extLst>
+              <a:ext uri="{FF2B5EF4-FFF2-40B4-BE49-F238E27FC236}">
+                <a16:creationId xmlns:a16="http://schemas.microsoft.com/office/drawing/2014/main" id="{7B0FB12B-09B5-57B1-64D6-B29D0FB19D3D}"/>
+              </a:ext>
+            </a:extLst>
+          </p:cNvPr>
+          <p:cNvCxnSpPr>
+            <a:cxnSpLocks/>
+          </p:cNvCxnSpPr>
+          <p:nvPr/>
+        </p:nvCxnSpPr>
+        <p:spPr>
+          <a:xfrm>
+            <a:off x="5909438" y="3965026"/>
+            <a:ext cx="496615" cy="0"/>
+          </a:xfrm>
+          <a:prstGeom prst="straightConnector1">
+            <a:avLst/>
+          </a:prstGeom>
+          <a:ln w="25400">
+            <a:solidFill>
+              <a:schemeClr val="tx1"/>
+            </a:solidFill>
+            <a:tailEnd type="triangle"/>
+          </a:ln>
+        </p:spPr>
+        <p:style>
+          <a:lnRef idx="1">
+            <a:schemeClr val="accent2"/>
+          </a:lnRef>
+          <a:fillRef idx="0">
+            <a:schemeClr val="accent2"/>
+          </a:fillRef>
+          <a:effectRef idx="0">
+            <a:schemeClr val="accent2"/>
+          </a:effectRef>
+          <a:fontRef idx="minor">
+            <a:schemeClr val="tx1"/>
+          </a:fontRef>
+        </p:style>
+      </p:cxnSp>
+      <p:sp>
+        <p:nvSpPr>
+          <p:cNvPr id="15" name="TextBox 14">
+            <a:extLst>
+              <a:ext uri="{FF2B5EF4-FFF2-40B4-BE49-F238E27FC236}">
+                <a16:creationId xmlns:a16="http://schemas.microsoft.com/office/drawing/2014/main" id="{A2C52187-A5C9-854C-F83D-7C4F7631E8F2}"/>
+              </a:ext>
+            </a:extLst>
+          </p:cNvPr>
+          <p:cNvSpPr txBox="1"/>
+          <p:nvPr/>
+        </p:nvSpPr>
+        <p:spPr>
+          <a:xfrm>
+            <a:off x="961691" y="3439511"/>
+            <a:ext cx="496615" cy="369332"/>
+          </a:xfrm>
+          <a:prstGeom prst="rect">
+            <a:avLst/>
+          </a:prstGeom>
+          <a:noFill/>
+        </p:spPr>
+        <p:txBody>
+          <a:bodyPr wrap="square" rtlCol="0">
+            <a:spAutoFit/>
+          </a:bodyPr>
+          <a:lstStyle/>
+          <a:p>
+            <a:r>
+              <a:rPr lang="en-US" b="1" dirty="0"/>
+              <a:t>G1</a:t>
+            </a:r>
+          </a:p>
+        </p:txBody>
+      </p:sp>
+      <p:sp>
+        <p:nvSpPr>
+          <p:cNvPr id="16" name="TextBox 15">
+            <a:extLst>
+              <a:ext uri="{FF2B5EF4-FFF2-40B4-BE49-F238E27FC236}">
+                <a16:creationId xmlns:a16="http://schemas.microsoft.com/office/drawing/2014/main" id="{BECDF36E-0288-608F-A6BB-17E35AE86911}"/>
+              </a:ext>
+            </a:extLst>
+          </p:cNvPr>
+          <p:cNvSpPr txBox="1"/>
+          <p:nvPr/>
+        </p:nvSpPr>
+        <p:spPr>
+          <a:xfrm>
+            <a:off x="3683872" y="3436109"/>
+            <a:ext cx="496615" cy="369332"/>
+          </a:xfrm>
+          <a:prstGeom prst="rect">
+            <a:avLst/>
+          </a:prstGeom>
+          <a:noFill/>
+        </p:spPr>
+        <p:txBody>
+          <a:bodyPr wrap="square" rtlCol="0">
+            <a:spAutoFit/>
+          </a:bodyPr>
+          <a:lstStyle/>
+          <a:p>
+            <a:r>
+              <a:rPr lang="en-US" b="1" dirty="0">
+                <a:solidFill>
+                  <a:schemeClr val="bg1"/>
+                </a:solidFill>
+              </a:rPr>
+              <a:t>G2</a:t>
+            </a:r>
+          </a:p>
+        </p:txBody>
+      </p:sp>
+      <p:sp>
+        <p:nvSpPr>
+          <p:cNvPr id="17" name="TextBox 16">
+            <a:extLst>
+              <a:ext uri="{FF2B5EF4-FFF2-40B4-BE49-F238E27FC236}">
+                <a16:creationId xmlns:a16="http://schemas.microsoft.com/office/drawing/2014/main" id="{0569D360-E143-804C-6DB4-F49239F4586C}"/>
+              </a:ext>
+            </a:extLst>
+          </p:cNvPr>
+          <p:cNvSpPr txBox="1"/>
+          <p:nvPr/>
+        </p:nvSpPr>
+        <p:spPr>
+          <a:xfrm>
+            <a:off x="6406053" y="3432707"/>
+            <a:ext cx="496615" cy="369332"/>
+          </a:xfrm>
+          <a:prstGeom prst="rect">
+            <a:avLst/>
+          </a:prstGeom>
+          <a:noFill/>
+        </p:spPr>
+        <p:txBody>
+          <a:bodyPr wrap="square" rtlCol="0">
+            <a:spAutoFit/>
+          </a:bodyPr>
+          <a:lstStyle/>
+          <a:p>
+            <a:r>
+              <a:rPr lang="en-US" b="1" dirty="0"/>
+              <a:t>G3</a:t>
+            </a:r>
+          </a:p>
+        </p:txBody>
+      </p:sp>
+      <p:sp>
+        <p:nvSpPr>
+          <p:cNvPr id="18" name="TextBox 17">
+            <a:extLst>
+              <a:ext uri="{FF2B5EF4-FFF2-40B4-BE49-F238E27FC236}">
+                <a16:creationId xmlns:a16="http://schemas.microsoft.com/office/drawing/2014/main" id="{BE57A534-511C-3C09-E990-12C94F7000A0}"/>
+              </a:ext>
+            </a:extLst>
+          </p:cNvPr>
+          <p:cNvSpPr txBox="1"/>
+          <p:nvPr/>
+        </p:nvSpPr>
+        <p:spPr>
+          <a:xfrm>
+            <a:off x="9128234" y="3429305"/>
+            <a:ext cx="496615" cy="369332"/>
+          </a:xfrm>
+          <a:prstGeom prst="rect">
+            <a:avLst/>
+          </a:prstGeom>
+          <a:noFill/>
+        </p:spPr>
+        <p:txBody>
+          <a:bodyPr wrap="square" rtlCol="0">
+            <a:spAutoFit/>
+          </a:bodyPr>
+          <a:lstStyle/>
+          <a:p>
+            <a:r>
+              <a:rPr lang="en-US" b="1" dirty="0">
+                <a:solidFill>
+                  <a:schemeClr val="bg1"/>
+                </a:solidFill>
+              </a:rPr>
+              <a:t>G4</a:t>
+            </a:r>
+          </a:p>
+        </p:txBody>
+      </p:sp>
+      <p:graphicFrame>
+        <p:nvGraphicFramePr>
+          <p:cNvPr id="19" name="Table 31">
+            <a:extLst>
+              <a:ext uri="{FF2B5EF4-FFF2-40B4-BE49-F238E27FC236}">
+                <a16:creationId xmlns:a16="http://schemas.microsoft.com/office/drawing/2014/main" id="{C4EE4143-95D1-E116-6A24-6764B0EB2A1A}"/>
+              </a:ext>
+            </a:extLst>
+          </p:cNvPr>
+          <p:cNvGraphicFramePr>
+            <a:graphicFrameLocks noGrp="1"/>
+          </p:cNvGraphicFramePr>
+          <p:nvPr>
+            <p:extLst>
+              <p:ext uri="{D42A27DB-BD31-4B8C-83A1-F6EECF244321}">
+                <p14:modId xmlns:p14="http://schemas.microsoft.com/office/powerpoint/2010/main" val="3889367195"/>
+              </p:ext>
+            </p:extLst>
+          </p:nvPr>
+        </p:nvGraphicFramePr>
+        <p:xfrm>
+          <a:off x="2031999" y="4961386"/>
+          <a:ext cx="8128002" cy="741680"/>
+        </p:xfrm>
+        <a:graphic>
+          <a:graphicData uri="http://schemas.openxmlformats.org/drawingml/2006/table">
+            <a:tbl>
+              <a:tblPr firstRow="1" bandRow="1">
+                <a:tableStyleId>{F5AB1C69-6EDB-4FF4-983F-18BD219EF322}</a:tableStyleId>
+              </a:tblPr>
+              <a:tblGrid>
+                <a:gridCol w="1354667">
+                  <a:extLst>
+                    <a:ext uri="{9D8B030D-6E8A-4147-A177-3AD203B41FA5}">
+                      <a16:colId xmlns:a16="http://schemas.microsoft.com/office/drawing/2014/main" val="2439474539"/>
+                    </a:ext>
+                  </a:extLst>
+                </a:gridCol>
+                <a:gridCol w="1354667">
+                  <a:extLst>
+                    <a:ext uri="{9D8B030D-6E8A-4147-A177-3AD203B41FA5}">
+                      <a16:colId xmlns:a16="http://schemas.microsoft.com/office/drawing/2014/main" val="1301125640"/>
+                    </a:ext>
+                  </a:extLst>
+                </a:gridCol>
+                <a:gridCol w="1354667">
+                  <a:extLst>
+                    <a:ext uri="{9D8B030D-6E8A-4147-A177-3AD203B41FA5}">
+                      <a16:colId xmlns:a16="http://schemas.microsoft.com/office/drawing/2014/main" val="3480179052"/>
+                    </a:ext>
+                  </a:extLst>
+                </a:gridCol>
+                <a:gridCol w="1354667">
+                  <a:extLst>
+                    <a:ext uri="{9D8B030D-6E8A-4147-A177-3AD203B41FA5}">
+                      <a16:colId xmlns:a16="http://schemas.microsoft.com/office/drawing/2014/main" val="2678239239"/>
+                    </a:ext>
+                  </a:extLst>
+                </a:gridCol>
+                <a:gridCol w="1354667">
+                  <a:extLst>
+                    <a:ext uri="{9D8B030D-6E8A-4147-A177-3AD203B41FA5}">
+                      <a16:colId xmlns:a16="http://schemas.microsoft.com/office/drawing/2014/main" val="69290392"/>
+                    </a:ext>
+                  </a:extLst>
+                </a:gridCol>
+                <a:gridCol w="1354667">
+                  <a:extLst>
+                    <a:ext uri="{9D8B030D-6E8A-4147-A177-3AD203B41FA5}">
+                      <a16:colId xmlns:a16="http://schemas.microsoft.com/office/drawing/2014/main" val="451300200"/>
+                    </a:ext>
+                  </a:extLst>
+                </a:gridCol>
+              </a:tblGrid>
+              <a:tr h="370840">
+                <a:tc>
+                  <a:txBody>
+                    <a:bodyPr/>
+                    <a:lstStyle/>
+                    <a:p>
+                      <a:r>
+                        <a:rPr lang="en-US" dirty="0"/>
+                        <a:t>C1</a:t>
+                      </a:r>
+                    </a:p>
+                  </a:txBody>
+                  <a:tcPr/>
+                </a:tc>
+                <a:tc>
+                  <a:txBody>
+                    <a:bodyPr/>
+                    <a:lstStyle/>
+                    <a:p>
+                      <a:r>
+                        <a:rPr lang="en-US" dirty="0"/>
+                        <a:t>C2</a:t>
+                      </a:r>
+                    </a:p>
+                  </a:txBody>
+                  <a:tcPr/>
+                </a:tc>
+                <a:tc>
+                  <a:txBody>
+                    <a:bodyPr/>
+                    <a:lstStyle/>
+                    <a:p>
+                      <a:r>
+                        <a:rPr lang="en-US" dirty="0"/>
+                        <a:t>C3</a:t>
+                      </a:r>
+                    </a:p>
+                  </a:txBody>
+                  <a:tcPr/>
+                </a:tc>
+                <a:tc>
+                  <a:txBody>
+                    <a:bodyPr/>
+                    <a:lstStyle/>
+                    <a:p>
+                      <a:r>
+                        <a:rPr lang="en-US" dirty="0"/>
+                        <a:t>C4</a:t>
+                      </a:r>
+                    </a:p>
+                  </a:txBody>
+                  <a:tcPr/>
+                </a:tc>
+                <a:tc>
+                  <a:txBody>
+                    <a:bodyPr/>
+                    <a:lstStyle/>
+                    <a:p>
+                      <a:r>
+                        <a:rPr lang="en-US" dirty="0"/>
+                        <a:t>C5</a:t>
+                      </a:r>
+                    </a:p>
+                  </a:txBody>
+                  <a:tcPr/>
+                </a:tc>
+                <a:tc>
+                  <a:txBody>
+                    <a:bodyPr/>
+                    <a:lstStyle/>
+                    <a:p>
+                      <a:r>
+                        <a:rPr lang="en-US" dirty="0"/>
+                        <a:t>C6</a:t>
+                      </a:r>
+                    </a:p>
+                  </a:txBody>
+                  <a:tcPr/>
+                </a:tc>
+                <a:extLst>
+                  <a:ext uri="{0D108BD9-81ED-4DB2-BD59-A6C34878D82A}">
+                    <a16:rowId xmlns:a16="http://schemas.microsoft.com/office/drawing/2014/main" val="1826944969"/>
+                  </a:ext>
+                </a:extLst>
+              </a:tr>
+              <a:tr h="370840">
+                <a:tc>
+                  <a:txBody>
+                    <a:bodyPr/>
+                    <a:lstStyle/>
+                    <a:p>
+                      <a:r>
+                        <a:rPr lang="en-US" dirty="0"/>
+                        <a:t>E1</a:t>
+                      </a:r>
+                    </a:p>
+                  </a:txBody>
+                  <a:tcPr/>
+                </a:tc>
+                <a:tc>
+                  <a:txBody>
+                    <a:bodyPr/>
+                    <a:lstStyle/>
+                    <a:p>
+                      <a:r>
+                        <a:rPr lang="en-US" dirty="0"/>
+                        <a:t>E2</a:t>
+                      </a:r>
+                    </a:p>
+                  </a:txBody>
+                  <a:tcPr/>
+                </a:tc>
+                <a:tc>
+                  <a:txBody>
+                    <a:bodyPr/>
+                    <a:lstStyle/>
+                    <a:p>
+                      <a:r>
+                        <a:rPr lang="en-US" dirty="0"/>
+                        <a:t>E3</a:t>
+                      </a:r>
+                    </a:p>
+                  </a:txBody>
+                  <a:tcPr/>
+                </a:tc>
+                <a:tc>
+                  <a:txBody>
+                    <a:bodyPr/>
+                    <a:lstStyle/>
+                    <a:p>
+                      <a:r>
+                        <a:rPr lang="en-US" b="1" i="1" dirty="0"/>
+                        <a:t>E8</a:t>
+                      </a:r>
+                    </a:p>
+                  </a:txBody>
+                  <a:tcPr/>
+                </a:tc>
+                <a:tc>
+                  <a:txBody>
+                    <a:bodyPr/>
+                    <a:lstStyle/>
+                    <a:p>
+                      <a:r>
+                        <a:rPr lang="en-US" b="1" i="1" dirty="0"/>
+                        <a:t>E9</a:t>
+                      </a:r>
+                    </a:p>
+                  </a:txBody>
+                  <a:tcPr/>
+                </a:tc>
+                <a:tc>
+                  <a:txBody>
+                    <a:bodyPr/>
+                    <a:lstStyle/>
+                    <a:p>
+                      <a:r>
+                        <a:rPr lang="en-US" b="1" i="1" dirty="0"/>
+                        <a:t>E10</a:t>
+                      </a:r>
+                    </a:p>
+                  </a:txBody>
+                  <a:tcPr/>
+                </a:tc>
+                <a:extLst>
+                  <a:ext uri="{0D108BD9-81ED-4DB2-BD59-A6C34878D82A}">
+                    <a16:rowId xmlns:a16="http://schemas.microsoft.com/office/drawing/2014/main" val="3761861412"/>
+                  </a:ext>
+                </a:extLst>
+              </a:tr>
+            </a:tbl>
+          </a:graphicData>
+        </a:graphic>
+      </p:graphicFrame>
+      <p:pic>
+        <p:nvPicPr>
+          <p:cNvPr id="20" name="Graphic 19" descr="Checkmark with solid fill">
+            <a:extLst>
+              <a:ext uri="{FF2B5EF4-FFF2-40B4-BE49-F238E27FC236}">
+                <a16:creationId xmlns:a16="http://schemas.microsoft.com/office/drawing/2014/main" id="{A3A2DF84-B5DC-3ABD-0DE4-A6276D030E38}"/>
+              </a:ext>
+            </a:extLst>
+          </p:cNvPr>
+          <p:cNvPicPr>
+            <a:picLocks noChangeAspect="1"/>
+          </p:cNvPicPr>
+          <p:nvPr/>
+        </p:nvPicPr>
+        <p:blipFill>
+          <a:blip r:embed="rId3">
+            <a:extLst>
+              <a:ext uri="{96DAC541-7B7A-43D3-8B79-37D633B846F1}">
+                <asvg:svgBlip xmlns:asvg="http://schemas.microsoft.com/office/drawing/2016/SVG/main" r:embed="rId4"/>
+              </a:ext>
+            </a:extLst>
+          </a:blip>
+          <a:stretch>
+            <a:fillRect/>
+          </a:stretch>
+        </p:blipFill>
+        <p:spPr>
+          <a:xfrm>
+            <a:off x="2811518" y="3050626"/>
+            <a:ext cx="914400" cy="914400"/>
+          </a:xfrm>
+          <a:prstGeom prst="rect">
+            <a:avLst/>
+          </a:prstGeom>
+        </p:spPr>
+      </p:pic>
+      <p:pic>
+        <p:nvPicPr>
+          <p:cNvPr id="21" name="Graphic 20" descr="Badge Cross with solid fill">
+            <a:extLst>
+              <a:ext uri="{FF2B5EF4-FFF2-40B4-BE49-F238E27FC236}">
+                <a16:creationId xmlns:a16="http://schemas.microsoft.com/office/drawing/2014/main" id="{8D2A977A-3964-A7CE-5708-790E89E1893F}"/>
+              </a:ext>
+            </a:extLst>
+          </p:cNvPr>
+          <p:cNvPicPr>
+            <a:picLocks noChangeAspect="1"/>
+          </p:cNvPicPr>
+          <p:nvPr/>
+        </p:nvPicPr>
+        <p:blipFill>
+          <a:blip r:embed="rId5">
+            <a:extLst>
+              <a:ext uri="{96DAC541-7B7A-43D3-8B79-37D633B846F1}">
+                <asvg:svgBlip xmlns:asvg="http://schemas.microsoft.com/office/drawing/2016/SVG/main" r:embed="rId6"/>
+              </a:ext>
+            </a:extLst>
+          </a:blip>
+          <a:stretch>
+            <a:fillRect/>
+          </a:stretch>
+        </p:blipFill>
+        <p:spPr>
+          <a:xfrm>
+            <a:off x="5533699" y="3050626"/>
+            <a:ext cx="914400" cy="914400"/>
+          </a:xfrm>
+          <a:prstGeom prst="rect">
+            <a:avLst/>
+          </a:prstGeom>
+        </p:spPr>
+      </p:pic>
+      <p:pic>
+        <p:nvPicPr>
+          <p:cNvPr id="23" name="Graphic 22" descr="Badge Question Mark with solid fill">
+            <a:extLst>
+              <a:ext uri="{FF2B5EF4-FFF2-40B4-BE49-F238E27FC236}">
+                <a16:creationId xmlns:a16="http://schemas.microsoft.com/office/drawing/2014/main" id="{DE4ED4B6-9C92-02A3-771E-C0C8D9971F36}"/>
+              </a:ext>
+            </a:extLst>
+          </p:cNvPr>
+          <p:cNvPicPr>
+            <a:picLocks noChangeAspect="1"/>
+          </p:cNvPicPr>
+          <p:nvPr/>
+        </p:nvPicPr>
+        <p:blipFill>
+          <a:blip r:embed="rId7">
+            <a:extLst>
+              <a:ext uri="{96DAC541-7B7A-43D3-8B79-37D633B846F1}">
+                <asvg:svgBlip xmlns:asvg="http://schemas.microsoft.com/office/drawing/2016/SVG/main" r:embed="rId8"/>
+              </a:ext>
+            </a:extLst>
+          </a:blip>
+          <a:stretch>
+            <a:fillRect/>
+          </a:stretch>
+        </p:blipFill>
+        <p:spPr>
+          <a:xfrm>
+            <a:off x="8213834" y="3050626"/>
+            <a:ext cx="914400" cy="914400"/>
+          </a:xfrm>
+          <a:prstGeom prst="rect">
+            <a:avLst/>
+          </a:prstGeom>
+        </p:spPr>
+      </p:pic>
+    </p:spTree>
+    <p:extLst>
+      <p:ext uri="{BB962C8B-B14F-4D97-AF65-F5344CB8AC3E}">
+        <p14:creationId xmlns:p14="http://schemas.microsoft.com/office/powerpoint/2010/main" val="1579563712"/>
+      </p:ext>
+    </p:extLst>
+  </p:cSld>
+  <p:clrMapOvr>
+    <a:masterClrMapping/>
+  </p:clrMapOvr>
+</p:sld>
+</file>
+
+<file path=ppt/slides/slide12.xml><?xml version="1.0" encoding="utf-8"?>
+<p:sld xmlns:a="http://schemas.openxmlformats.org/drawingml/2006/main" xmlns:r="http://schemas.openxmlformats.org/officeDocument/2006/relationships" xmlns:p="http://schemas.openxmlformats.org/presentationml/2006/main">
+  <p:cSld>
+    <p:spTree>
+      <p:nvGrpSpPr>
+        <p:cNvPr id="1" name=""/>
+        <p:cNvGrpSpPr/>
+        <p:nvPr/>
+      </p:nvGrpSpPr>
+      <p:grpSpPr>
+        <a:xfrm>
+          <a:off x="0" y="0"/>
+          <a:ext cx="0" cy="0"/>
+          <a:chOff x="0" y="0"/>
+          <a:chExt cx="0" cy="0"/>
+        </a:xfrm>
+      </p:grpSpPr>
+      <p:sp>
+        <p:nvSpPr>
+          <p:cNvPr id="2" name="Title 1">
+            <a:extLst>
+              <a:ext uri="{FF2B5EF4-FFF2-40B4-BE49-F238E27FC236}">
+                <a16:creationId xmlns:a16="http://schemas.microsoft.com/office/drawing/2014/main" id="{BAD032FE-E98F-786F-D528-66C3B5213A9F}"/>
+              </a:ext>
+            </a:extLst>
+          </p:cNvPr>
+          <p:cNvSpPr>
+            <a:spLocks noGrp="1"/>
+          </p:cNvSpPr>
+          <p:nvPr>
+            <p:ph type="title"/>
+          </p:nvPr>
+        </p:nvSpPr>
+        <p:spPr/>
+        <p:txBody>
+          <a:bodyPr/>
+          <a:lstStyle/>
+          <a:p>
+            <a:r>
+              <a:rPr lang="en-US" dirty="0"/>
+              <a:t>Key Insight: Not every event is significant</a:t>
+            </a:r>
+          </a:p>
+        </p:txBody>
+      </p:sp>
+      <p:sp>
+        <p:nvSpPr>
+          <p:cNvPr id="3" name="Content Placeholder 2">
+            <a:extLst>
+              <a:ext uri="{FF2B5EF4-FFF2-40B4-BE49-F238E27FC236}">
+                <a16:creationId xmlns:a16="http://schemas.microsoft.com/office/drawing/2014/main" id="{D91E098F-3B4F-F200-33ED-8731C31B143F}"/>
+              </a:ext>
+            </a:extLst>
+          </p:cNvPr>
+          <p:cNvSpPr>
+            <a:spLocks noGrp="1"/>
+          </p:cNvSpPr>
+          <p:nvPr>
+            <p:ph idx="1"/>
+          </p:nvPr>
+        </p:nvSpPr>
+        <p:spPr>
+          <a:xfrm>
+            <a:off x="838200" y="1825625"/>
+            <a:ext cx="10515600" cy="2672803"/>
+          </a:xfrm>
+        </p:spPr>
+        <p:txBody>
+          <a:bodyPr/>
+          <a:lstStyle/>
+          <a:p>
+            <a:r>
+              <a:rPr lang="en-US" dirty="0"/>
+              <a:t>Reducing need for </a:t>
+            </a:r>
+            <a:r>
+              <a:rPr lang="en-US" i="1" dirty="0"/>
+              <a:t>multiplexing</a:t>
+            </a:r>
+            <a:r>
+              <a:rPr lang="en-US" dirty="0"/>
+              <a:t> would improve accuracy of event counts</a:t>
+            </a:r>
+          </a:p>
+          <a:p>
+            <a:r>
+              <a:rPr lang="en-US" dirty="0"/>
+              <a:t>Sensitivity analysis can </a:t>
+            </a:r>
+          </a:p>
+          <a:p>
+            <a:pPr lvl="1"/>
+            <a:r>
+              <a:rPr lang="en-US" i="1" dirty="0"/>
+              <a:t>inform</a:t>
+            </a:r>
+            <a:r>
+              <a:rPr lang="en-US" dirty="0"/>
+              <a:t> users of </a:t>
+            </a:r>
+            <a:r>
+              <a:rPr lang="en-US" dirty="0">
+                <a:latin typeface="Consolas" panose="020B0609020204030204" pitchFamily="49" charset="0"/>
+                <a:cs typeface="Consolas" panose="020B0609020204030204" pitchFamily="49" charset="0"/>
+              </a:rPr>
+              <a:t>perf</a:t>
+            </a:r>
+            <a:r>
+              <a:rPr lang="en-US" dirty="0"/>
+              <a:t> user space tool</a:t>
+            </a:r>
+          </a:p>
+          <a:p>
+            <a:pPr lvl="1"/>
+            <a:r>
+              <a:rPr lang="en-US" i="1" dirty="0"/>
+              <a:t>reduce</a:t>
+            </a:r>
+            <a:r>
+              <a:rPr lang="en-US" dirty="0"/>
+              <a:t> extrapolation error</a:t>
+            </a:r>
+            <a:endParaRPr lang="en-US" i="1" dirty="0"/>
+          </a:p>
+          <a:p>
+            <a:pPr marL="0" indent="0">
+              <a:buNone/>
+            </a:pPr>
+            <a:endParaRPr lang="en-US" dirty="0"/>
+          </a:p>
+          <a:p>
+            <a:pPr marL="0" indent="0">
+              <a:buNone/>
+            </a:pPr>
+            <a:endParaRPr lang="en-US" dirty="0"/>
+          </a:p>
+        </p:txBody>
+      </p:sp>
+    </p:spTree>
+    <p:extLst>
+      <p:ext uri="{BB962C8B-B14F-4D97-AF65-F5344CB8AC3E}">
+        <p14:creationId xmlns:p14="http://schemas.microsoft.com/office/powerpoint/2010/main" val="2572996831"/>
       </p:ext>
     </p:extLst>
   </p:cSld>
@@ -6403,7 +9056,7 @@
           <p:cNvPr id="2" name="Title 1">
             <a:extLst>
               <a:ext uri="{FF2B5EF4-FFF2-40B4-BE49-F238E27FC236}">
-                <a16:creationId xmlns:a16="http://schemas.microsoft.com/office/drawing/2014/main" id="{D6C973FF-7EA2-677C-4666-9A765C6A2528}"/>
+                <a16:creationId xmlns:a16="http://schemas.microsoft.com/office/drawing/2014/main" id="{6A980990-AF08-1AFA-226B-E7C1AFB29047}"/>
               </a:ext>
             </a:extLst>
           </p:cNvPr>
@@ -6441,10 +9094,10 @@
       </p:sp>
       <p:pic>
         <p:nvPicPr>
-          <p:cNvPr id="4" name="Picture 3" descr="Text&#10;&#10;Description automatically generated">
-            <a:extLst>
-              <a:ext uri="{FF2B5EF4-FFF2-40B4-BE49-F238E27FC236}">
-                <a16:creationId xmlns:a16="http://schemas.microsoft.com/office/drawing/2014/main" id="{951EF5A9-AB54-7CCA-9DFB-B93F27F0F363}"/>
+          <p:cNvPr id="3" name="Picture 2" descr="Text&#10;&#10;Description automatically generated">
+            <a:extLst>
+              <a:ext uri="{FF2B5EF4-FFF2-40B4-BE49-F238E27FC236}">
+                <a16:creationId xmlns:a16="http://schemas.microsoft.com/office/drawing/2014/main" id="{4F81006A-E619-813A-5968-0A76DDCE0EEF}"/>
               </a:ext>
             </a:extLst>
           </p:cNvPr>
@@ -6472,7 +9125,7 @@
     </p:spTree>
     <p:extLst>
       <p:ext uri="{BB962C8B-B14F-4D97-AF65-F5344CB8AC3E}">
-        <p14:creationId xmlns:p14="http://schemas.microsoft.com/office/powerpoint/2010/main" val="1913920636"/>
+        <p14:creationId xmlns:p14="http://schemas.microsoft.com/office/powerpoint/2010/main" val="2482293467"/>
       </p:ext>
     </p:extLst>
   </p:cSld>
@@ -6504,7 +9157,7 @@
           <p:cNvPr id="2" name="Title 1">
             <a:extLst>
               <a:ext uri="{FF2B5EF4-FFF2-40B4-BE49-F238E27FC236}">
-                <a16:creationId xmlns:a16="http://schemas.microsoft.com/office/drawing/2014/main" id="{6A980990-AF08-1AFA-226B-E7C1AFB29047}"/>
+                <a16:creationId xmlns:a16="http://schemas.microsoft.com/office/drawing/2014/main" id="{D6C973FF-7EA2-677C-4666-9A765C6A2528}"/>
               </a:ext>
             </a:extLst>
           </p:cNvPr>
@@ -6517,22 +9170,35 @@
         </p:nvSpPr>
         <p:spPr/>
         <p:txBody>
-          <a:bodyPr/>
+          <a:bodyPr>
+            <a:normAutofit fontScale="90000"/>
+          </a:bodyPr>
           <a:lstStyle/>
           <a:p>
             <a:r>
               <a:rPr lang="en-US" dirty="0"/>
-              <a:t>Supported events are architecture dependent</a:t>
+              <a:t>The </a:t>
+            </a:r>
+            <a:r>
+              <a:rPr lang="en-US" dirty="0">
+                <a:latin typeface="Consolas" panose="020B0609020204030204" pitchFamily="49" charset="0"/>
+                <a:cs typeface="Consolas" panose="020B0609020204030204" pitchFamily="49" charset="0"/>
+              </a:rPr>
+              <a:t>perf</a:t>
+            </a:r>
+            <a:r>
+              <a:rPr lang="en-US" dirty="0"/>
+              <a:t> user space tool provides a command line interface for interacting with the kernel</a:t>
             </a:r>
           </a:p>
         </p:txBody>
       </p:sp>
       <p:pic>
         <p:nvPicPr>
-          <p:cNvPr id="3" name="Picture 2" descr="Text&#10;&#10;Description automatically generated">
-            <a:extLst>
-              <a:ext uri="{FF2B5EF4-FFF2-40B4-BE49-F238E27FC236}">
-                <a16:creationId xmlns:a16="http://schemas.microsoft.com/office/drawing/2014/main" id="{4F81006A-E619-813A-5968-0A76DDCE0EEF}"/>
+          <p:cNvPr id="4" name="Picture 3" descr="Text&#10;&#10;Description automatically generated">
+            <a:extLst>
+              <a:ext uri="{FF2B5EF4-FFF2-40B4-BE49-F238E27FC236}">
+                <a16:creationId xmlns:a16="http://schemas.microsoft.com/office/drawing/2014/main" id="{951EF5A9-AB54-7CCA-9DFB-B93F27F0F363}"/>
               </a:ext>
             </a:extLst>
           </p:cNvPr>
@@ -6560,7 +9226,7 @@
     </p:spTree>
     <p:extLst>
       <p:ext uri="{BB962C8B-B14F-4D97-AF65-F5344CB8AC3E}">
-        <p14:creationId xmlns:p14="http://schemas.microsoft.com/office/powerpoint/2010/main" val="2482293467"/>
+        <p14:creationId xmlns:p14="http://schemas.microsoft.com/office/powerpoint/2010/main" val="1913920636"/>
       </p:ext>
     </p:extLst>
   </p:cSld>
@@ -6902,7 +9568,7 @@
           <a:p>
             <a:r>
               <a:rPr lang="en-US" dirty="0"/>
-              <a:t>The Event Scheduler Algorithm</a:t>
+              <a:t>The vanilla Event Scheduler algorithm Background</a:t>
             </a:r>
           </a:p>
         </p:txBody>
@@ -6923,36 +9589,584 @@
             <p:ph idx="1"/>
           </p:nvPr>
         </p:nvSpPr>
-        <p:spPr/>
-        <p:txBody>
-          <a:bodyPr/>
+        <p:spPr>
+          <a:xfrm>
+            <a:off x="838200" y="1825625"/>
+            <a:ext cx="10515600" cy="2578204"/>
+          </a:xfrm>
+        </p:spPr>
+        <p:txBody>
+          <a:bodyPr>
+            <a:normAutofit/>
+          </a:bodyPr>
           <a:lstStyle/>
           <a:p>
             <a:r>
               <a:rPr lang="en-US" dirty="0"/>
-              <a:t>Linked list of event groups is traversed</a:t>
-            </a:r>
+              <a:t>Primitive unit of scheduling is </a:t>
+            </a:r>
+            <a:r>
+              <a:rPr lang="en-US" i="1" dirty="0"/>
+              <a:t>event group</a:t>
+            </a:r>
+            <a:endParaRPr lang="en-US" dirty="0"/>
           </a:p>
           <a:p>
             <a:r>
               <a:rPr lang="en-US" dirty="0"/>
-              <a:t>TODO: explain group attributes, event constraints</a:t>
-            </a:r>
-          </a:p>
-          <a:p>
+              <a:t>All events in a group must have certain attributes in common</a:t>
+            </a:r>
+          </a:p>
+          <a:p>
+            <a:pPr lvl="1"/>
+            <a:r>
+              <a:rPr lang="en-US" i="1" dirty="0"/>
+              <a:t>Pinned</a:t>
+            </a:r>
             <a:r>
               <a:rPr lang="en-US" dirty="0"/>
-              <a:t>Failed group results in activation of counters, rest of groups wait for next iteration</a:t>
-            </a:r>
-          </a:p>
-          <a:p>
-            <a:pPr marL="0" indent="0">
-              <a:buNone/>
-            </a:pPr>
-            <a:endParaRPr lang="en-US" dirty="0"/>
-          </a:p>
-          <a:p>
-            <a:endParaRPr lang="en-US" dirty="0"/>
+              <a:t> vs </a:t>
+            </a:r>
+            <a:r>
+              <a:rPr lang="en-US" i="1" dirty="0"/>
+              <a:t>Flexible</a:t>
+            </a:r>
+          </a:p>
+          <a:p>
+            <a:r>
+              <a:rPr lang="en-US" i="1" dirty="0"/>
+              <a:t>All or None</a:t>
+            </a:r>
+            <a:r>
+              <a:rPr lang="en-US" dirty="0"/>
+              <a:t> in an event group for success</a:t>
+            </a:r>
+          </a:p>
+          <a:p>
+            <a:r>
+              <a:rPr lang="en-US" dirty="0"/>
+              <a:t>Event groups are added into a linked list</a:t>
+            </a:r>
+          </a:p>
+        </p:txBody>
+      </p:sp>
+      <p:sp>
+        <p:nvSpPr>
+          <p:cNvPr id="22" name="Rounded Rectangle 21">
+            <a:extLst>
+              <a:ext uri="{FF2B5EF4-FFF2-40B4-BE49-F238E27FC236}">
+                <a16:creationId xmlns:a16="http://schemas.microsoft.com/office/drawing/2014/main" id="{B4490300-9AAC-F24E-9A78-C7AEAE71F55F}"/>
+              </a:ext>
+            </a:extLst>
+          </p:cNvPr>
+          <p:cNvSpPr/>
+          <p:nvPr/>
+        </p:nvSpPr>
+        <p:spPr>
+          <a:xfrm>
+            <a:off x="838200" y="4822545"/>
+            <a:ext cx="2225566" cy="1051034"/>
+          </a:xfrm>
+          <a:prstGeom prst="roundRect">
+            <a:avLst/>
+          </a:prstGeom>
+          <a:solidFill>
+            <a:srgbClr val="FF817F"/>
+          </a:solidFill>
+          <a:ln>
+            <a:noFill/>
+          </a:ln>
+        </p:spPr>
+        <p:style>
+          <a:lnRef idx="2">
+            <a:schemeClr val="accent1">
+              <a:shade val="50000"/>
+            </a:schemeClr>
+          </a:lnRef>
+          <a:fillRef idx="1">
+            <a:schemeClr val="accent1"/>
+          </a:fillRef>
+          <a:effectRef idx="0">
+            <a:schemeClr val="accent1"/>
+          </a:effectRef>
+          <a:fontRef idx="minor">
+            <a:schemeClr val="lt1"/>
+          </a:fontRef>
+        </p:style>
+        <p:txBody>
+          <a:bodyPr rtlCol="0" anchor="ctr"/>
+          <a:lstStyle/>
+          <a:p>
+            <a:pPr algn="ctr"/>
+            <a:r>
+              <a:rPr lang="en-US" b="1" dirty="0">
+                <a:solidFill>
+                  <a:schemeClr val="tx1"/>
+                </a:solidFill>
+              </a:rPr>
+              <a:t>E1, E2, E3</a:t>
+            </a:r>
+          </a:p>
+        </p:txBody>
+      </p:sp>
+      <p:cxnSp>
+        <p:nvCxnSpPr>
+          <p:cNvPr id="23" name="Straight Arrow Connector 22">
+            <a:extLst>
+              <a:ext uri="{FF2B5EF4-FFF2-40B4-BE49-F238E27FC236}">
+                <a16:creationId xmlns:a16="http://schemas.microsoft.com/office/drawing/2014/main" id="{37B85D8D-901F-52DF-3BB8-84ED0629F281}"/>
+              </a:ext>
+            </a:extLst>
+          </p:cNvPr>
+          <p:cNvCxnSpPr>
+            <a:cxnSpLocks/>
+            <a:stCxn id="22" idx="3"/>
+            <a:endCxn id="24" idx="1"/>
+          </p:cNvCxnSpPr>
+          <p:nvPr/>
+        </p:nvCxnSpPr>
+        <p:spPr>
+          <a:xfrm>
+            <a:off x="3063766" y="5348062"/>
+            <a:ext cx="496615" cy="0"/>
+          </a:xfrm>
+          <a:prstGeom prst="straightConnector1">
+            <a:avLst/>
+          </a:prstGeom>
+          <a:ln w="25400">
+            <a:solidFill>
+              <a:schemeClr val="tx1"/>
+            </a:solidFill>
+            <a:tailEnd type="triangle"/>
+          </a:ln>
+        </p:spPr>
+        <p:style>
+          <a:lnRef idx="1">
+            <a:schemeClr val="accent2"/>
+          </a:lnRef>
+          <a:fillRef idx="0">
+            <a:schemeClr val="accent2"/>
+          </a:fillRef>
+          <a:effectRef idx="0">
+            <a:schemeClr val="accent2"/>
+          </a:effectRef>
+          <a:fontRef idx="minor">
+            <a:schemeClr val="tx1"/>
+          </a:fontRef>
+        </p:style>
+      </p:cxnSp>
+      <p:sp>
+        <p:nvSpPr>
+          <p:cNvPr id="24" name="Rounded Rectangle 23">
+            <a:extLst>
+              <a:ext uri="{FF2B5EF4-FFF2-40B4-BE49-F238E27FC236}">
+                <a16:creationId xmlns:a16="http://schemas.microsoft.com/office/drawing/2014/main" id="{E5C69E92-4239-EB22-2A01-CE43CCB99A2A}"/>
+              </a:ext>
+            </a:extLst>
+          </p:cNvPr>
+          <p:cNvSpPr/>
+          <p:nvPr/>
+        </p:nvSpPr>
+        <p:spPr>
+          <a:xfrm>
+            <a:off x="3560381" y="4822545"/>
+            <a:ext cx="2225566" cy="1051034"/>
+          </a:xfrm>
+          <a:prstGeom prst="roundRect">
+            <a:avLst/>
+          </a:prstGeom>
+          <a:solidFill>
+            <a:srgbClr val="FF0000"/>
+          </a:solidFill>
+          <a:ln>
+            <a:noFill/>
+          </a:ln>
+        </p:spPr>
+        <p:style>
+          <a:lnRef idx="2">
+            <a:schemeClr val="accent1">
+              <a:shade val="50000"/>
+            </a:schemeClr>
+          </a:lnRef>
+          <a:fillRef idx="1">
+            <a:schemeClr val="accent1"/>
+          </a:fillRef>
+          <a:effectRef idx="0">
+            <a:schemeClr val="accent1"/>
+          </a:effectRef>
+          <a:fontRef idx="minor">
+            <a:schemeClr val="lt1"/>
+          </a:fontRef>
+        </p:style>
+        <p:txBody>
+          <a:bodyPr rtlCol="0" anchor="ctr"/>
+          <a:lstStyle/>
+          <a:p>
+            <a:pPr algn="ctr"/>
+            <a:r>
+              <a:rPr lang="en-US" b="1" dirty="0">
+                <a:solidFill>
+                  <a:schemeClr val="bg1"/>
+                </a:solidFill>
+              </a:rPr>
+              <a:t>E4, E5, E6, E7</a:t>
+            </a:r>
+          </a:p>
+        </p:txBody>
+      </p:sp>
+      <p:sp>
+        <p:nvSpPr>
+          <p:cNvPr id="25" name="Rounded Rectangle 24">
+            <a:extLst>
+              <a:ext uri="{FF2B5EF4-FFF2-40B4-BE49-F238E27FC236}">
+                <a16:creationId xmlns:a16="http://schemas.microsoft.com/office/drawing/2014/main" id="{468A99B3-D3BE-F321-23BB-8AE29BE38D04}"/>
+              </a:ext>
+            </a:extLst>
+          </p:cNvPr>
+          <p:cNvSpPr/>
+          <p:nvPr/>
+        </p:nvSpPr>
+        <p:spPr>
+          <a:xfrm>
+            <a:off x="6282562" y="4822545"/>
+            <a:ext cx="2225566" cy="1051034"/>
+          </a:xfrm>
+          <a:prstGeom prst="roundRect">
+            <a:avLst/>
+          </a:prstGeom>
+          <a:solidFill>
+            <a:srgbClr val="C473FF"/>
+          </a:solidFill>
+          <a:ln>
+            <a:noFill/>
+          </a:ln>
+        </p:spPr>
+        <p:style>
+          <a:lnRef idx="2">
+            <a:schemeClr val="accent1">
+              <a:shade val="50000"/>
+            </a:schemeClr>
+          </a:lnRef>
+          <a:fillRef idx="1">
+            <a:schemeClr val="accent1"/>
+          </a:fillRef>
+          <a:effectRef idx="0">
+            <a:schemeClr val="accent1"/>
+          </a:effectRef>
+          <a:fontRef idx="minor">
+            <a:schemeClr val="lt1"/>
+          </a:fontRef>
+        </p:style>
+        <p:txBody>
+          <a:bodyPr rtlCol="0" anchor="ctr"/>
+          <a:lstStyle/>
+          <a:p>
+            <a:pPr algn="ctr"/>
+            <a:r>
+              <a:rPr lang="en-US" b="1" dirty="0">
+                <a:solidFill>
+                  <a:schemeClr val="tx1"/>
+                </a:solidFill>
+              </a:rPr>
+              <a:t>E8, E9, E10</a:t>
+            </a:r>
+          </a:p>
+        </p:txBody>
+      </p:sp>
+      <p:cxnSp>
+        <p:nvCxnSpPr>
+          <p:cNvPr id="26" name="Straight Arrow Connector 25">
+            <a:extLst>
+              <a:ext uri="{FF2B5EF4-FFF2-40B4-BE49-F238E27FC236}">
+                <a16:creationId xmlns:a16="http://schemas.microsoft.com/office/drawing/2014/main" id="{4A47FDC5-92D7-A809-9154-DBDD06F0BEFE}"/>
+              </a:ext>
+            </a:extLst>
+          </p:cNvPr>
+          <p:cNvCxnSpPr>
+            <a:cxnSpLocks/>
+            <a:stCxn id="25" idx="3"/>
+            <a:endCxn id="27" idx="1"/>
+          </p:cNvCxnSpPr>
+          <p:nvPr/>
+        </p:nvCxnSpPr>
+        <p:spPr>
+          <a:xfrm>
+            <a:off x="8508128" y="5348062"/>
+            <a:ext cx="496615" cy="0"/>
+          </a:xfrm>
+          <a:prstGeom prst="straightConnector1">
+            <a:avLst/>
+          </a:prstGeom>
+          <a:ln w="25400">
+            <a:solidFill>
+              <a:schemeClr val="tx1"/>
+            </a:solidFill>
+            <a:tailEnd type="triangle"/>
+          </a:ln>
+        </p:spPr>
+        <p:style>
+          <a:lnRef idx="1">
+            <a:schemeClr val="accent2"/>
+          </a:lnRef>
+          <a:fillRef idx="0">
+            <a:schemeClr val="accent2"/>
+          </a:fillRef>
+          <a:effectRef idx="0">
+            <a:schemeClr val="accent2"/>
+          </a:effectRef>
+          <a:fontRef idx="minor">
+            <a:schemeClr val="tx1"/>
+          </a:fontRef>
+        </p:style>
+      </p:cxnSp>
+      <p:sp>
+        <p:nvSpPr>
+          <p:cNvPr id="27" name="Rounded Rectangle 26">
+            <a:extLst>
+              <a:ext uri="{FF2B5EF4-FFF2-40B4-BE49-F238E27FC236}">
+                <a16:creationId xmlns:a16="http://schemas.microsoft.com/office/drawing/2014/main" id="{76FDE02F-41DE-CE9F-86A1-D8B0B20CF4EB}"/>
+              </a:ext>
+            </a:extLst>
+          </p:cNvPr>
+          <p:cNvSpPr/>
+          <p:nvPr/>
+        </p:nvSpPr>
+        <p:spPr>
+          <a:xfrm>
+            <a:off x="9004743" y="4822545"/>
+            <a:ext cx="2225566" cy="1051034"/>
+          </a:xfrm>
+          <a:prstGeom prst="roundRect">
+            <a:avLst/>
+          </a:prstGeom>
+          <a:solidFill>
+            <a:srgbClr val="0040FF"/>
+          </a:solidFill>
+          <a:ln>
+            <a:noFill/>
+          </a:ln>
+        </p:spPr>
+        <p:style>
+          <a:lnRef idx="2">
+            <a:schemeClr val="accent1">
+              <a:shade val="50000"/>
+            </a:schemeClr>
+          </a:lnRef>
+          <a:fillRef idx="1">
+            <a:schemeClr val="accent1"/>
+          </a:fillRef>
+          <a:effectRef idx="0">
+            <a:schemeClr val="accent1"/>
+          </a:effectRef>
+          <a:fontRef idx="minor">
+            <a:schemeClr val="lt1"/>
+          </a:fontRef>
+        </p:style>
+        <p:txBody>
+          <a:bodyPr rtlCol="0" anchor="ctr"/>
+          <a:lstStyle/>
+          <a:p>
+            <a:pPr algn="ctr"/>
+            <a:r>
+              <a:rPr lang="en-US" b="1" dirty="0">
+                <a:solidFill>
+                  <a:schemeClr val="bg1"/>
+                </a:solidFill>
+              </a:rPr>
+              <a:t>E11, 12</a:t>
+            </a:r>
+          </a:p>
+        </p:txBody>
+      </p:sp>
+      <p:cxnSp>
+        <p:nvCxnSpPr>
+          <p:cNvPr id="28" name="Straight Arrow Connector 27">
+            <a:extLst>
+              <a:ext uri="{FF2B5EF4-FFF2-40B4-BE49-F238E27FC236}">
+                <a16:creationId xmlns:a16="http://schemas.microsoft.com/office/drawing/2014/main" id="{5176CD1C-6ED8-E928-12FA-71946A249269}"/>
+              </a:ext>
+            </a:extLst>
+          </p:cNvPr>
+          <p:cNvCxnSpPr>
+            <a:cxnSpLocks/>
+          </p:cNvCxnSpPr>
+          <p:nvPr/>
+        </p:nvCxnSpPr>
+        <p:spPr>
+          <a:xfrm>
+            <a:off x="5785947" y="5358571"/>
+            <a:ext cx="496615" cy="0"/>
+          </a:xfrm>
+          <a:prstGeom prst="straightConnector1">
+            <a:avLst/>
+          </a:prstGeom>
+          <a:ln w="25400">
+            <a:solidFill>
+              <a:schemeClr val="tx1"/>
+            </a:solidFill>
+            <a:tailEnd type="triangle"/>
+          </a:ln>
+        </p:spPr>
+        <p:style>
+          <a:lnRef idx="1">
+            <a:schemeClr val="accent2"/>
+          </a:lnRef>
+          <a:fillRef idx="0">
+            <a:schemeClr val="accent2"/>
+          </a:fillRef>
+          <a:effectRef idx="0">
+            <a:schemeClr val="accent2"/>
+          </a:effectRef>
+          <a:fontRef idx="minor">
+            <a:schemeClr val="tx1"/>
+          </a:fontRef>
+        </p:style>
+      </p:cxnSp>
+      <p:sp>
+        <p:nvSpPr>
+          <p:cNvPr id="29" name="TextBox 28">
+            <a:extLst>
+              <a:ext uri="{FF2B5EF4-FFF2-40B4-BE49-F238E27FC236}">
+                <a16:creationId xmlns:a16="http://schemas.microsoft.com/office/drawing/2014/main" id="{23724AD8-6F8A-8160-6A12-248888BEC607}"/>
+              </a:ext>
+            </a:extLst>
+          </p:cNvPr>
+          <p:cNvSpPr txBox="1"/>
+          <p:nvPr/>
+        </p:nvSpPr>
+        <p:spPr>
+          <a:xfrm>
+            <a:off x="838200" y="4833056"/>
+            <a:ext cx="496615" cy="369332"/>
+          </a:xfrm>
+          <a:prstGeom prst="rect">
+            <a:avLst/>
+          </a:prstGeom>
+          <a:noFill/>
+        </p:spPr>
+        <p:txBody>
+          <a:bodyPr wrap="square" rtlCol="0">
+            <a:spAutoFit/>
+          </a:bodyPr>
+          <a:lstStyle/>
+          <a:p>
+            <a:r>
+              <a:rPr lang="en-US" b="1" dirty="0"/>
+              <a:t>G1</a:t>
+            </a:r>
+          </a:p>
+        </p:txBody>
+      </p:sp>
+      <p:sp>
+        <p:nvSpPr>
+          <p:cNvPr id="30" name="TextBox 29">
+            <a:extLst>
+              <a:ext uri="{FF2B5EF4-FFF2-40B4-BE49-F238E27FC236}">
+                <a16:creationId xmlns:a16="http://schemas.microsoft.com/office/drawing/2014/main" id="{F49EEB82-E913-F37C-EE53-FD16754C0BBF}"/>
+              </a:ext>
+            </a:extLst>
+          </p:cNvPr>
+          <p:cNvSpPr txBox="1"/>
+          <p:nvPr/>
+        </p:nvSpPr>
+        <p:spPr>
+          <a:xfrm>
+            <a:off x="3560381" y="4829654"/>
+            <a:ext cx="496615" cy="369332"/>
+          </a:xfrm>
+          <a:prstGeom prst="rect">
+            <a:avLst/>
+          </a:prstGeom>
+          <a:noFill/>
+        </p:spPr>
+        <p:txBody>
+          <a:bodyPr wrap="square" rtlCol="0">
+            <a:spAutoFit/>
+          </a:bodyPr>
+          <a:lstStyle/>
+          <a:p>
+            <a:r>
+              <a:rPr lang="en-US" b="1" dirty="0">
+                <a:solidFill>
+                  <a:schemeClr val="bg1"/>
+                </a:solidFill>
+              </a:rPr>
+              <a:t>G2</a:t>
+            </a:r>
+          </a:p>
+        </p:txBody>
+      </p:sp>
+      <p:sp>
+        <p:nvSpPr>
+          <p:cNvPr id="31" name="TextBox 30">
+            <a:extLst>
+              <a:ext uri="{FF2B5EF4-FFF2-40B4-BE49-F238E27FC236}">
+                <a16:creationId xmlns:a16="http://schemas.microsoft.com/office/drawing/2014/main" id="{4B073FF1-E05E-698F-0A1D-B89164E800BB}"/>
+              </a:ext>
+            </a:extLst>
+          </p:cNvPr>
+          <p:cNvSpPr txBox="1"/>
+          <p:nvPr/>
+        </p:nvSpPr>
+        <p:spPr>
+          <a:xfrm>
+            <a:off x="6282562" y="4826252"/>
+            <a:ext cx="496615" cy="369332"/>
+          </a:xfrm>
+          <a:prstGeom prst="rect">
+            <a:avLst/>
+          </a:prstGeom>
+          <a:noFill/>
+        </p:spPr>
+        <p:txBody>
+          <a:bodyPr wrap="square" rtlCol="0">
+            <a:spAutoFit/>
+          </a:bodyPr>
+          <a:lstStyle/>
+          <a:p>
+            <a:r>
+              <a:rPr lang="en-US" b="1" dirty="0"/>
+              <a:t>G3</a:t>
+            </a:r>
+          </a:p>
+        </p:txBody>
+      </p:sp>
+      <p:sp>
+        <p:nvSpPr>
+          <p:cNvPr id="32" name="TextBox 31">
+            <a:extLst>
+              <a:ext uri="{FF2B5EF4-FFF2-40B4-BE49-F238E27FC236}">
+                <a16:creationId xmlns:a16="http://schemas.microsoft.com/office/drawing/2014/main" id="{9041AE38-1108-418D-9575-416330AAF057}"/>
+              </a:ext>
+            </a:extLst>
+          </p:cNvPr>
+          <p:cNvSpPr txBox="1"/>
+          <p:nvPr/>
+        </p:nvSpPr>
+        <p:spPr>
+          <a:xfrm>
+            <a:off x="9004743" y="4822850"/>
+            <a:ext cx="496615" cy="369332"/>
+          </a:xfrm>
+          <a:prstGeom prst="rect">
+            <a:avLst/>
+          </a:prstGeom>
+          <a:noFill/>
+        </p:spPr>
+        <p:txBody>
+          <a:bodyPr wrap="square" rtlCol="0">
+            <a:spAutoFit/>
+          </a:bodyPr>
+          <a:lstStyle/>
+          <a:p>
+            <a:r>
+              <a:rPr lang="en-US" b="1" dirty="0">
+                <a:solidFill>
+                  <a:schemeClr val="bg1"/>
+                </a:solidFill>
+              </a:rPr>
+              <a:t>G4</a:t>
+            </a:r>
           </a:p>
         </p:txBody>
       </p:sp>
@@ -6991,7 +10205,7 @@
           <p:cNvPr id="2" name="Title 1">
             <a:extLst>
               <a:ext uri="{FF2B5EF4-FFF2-40B4-BE49-F238E27FC236}">
-                <a16:creationId xmlns:a16="http://schemas.microsoft.com/office/drawing/2014/main" id="{61DB3BD7-1A15-6B75-3BC7-4813867BC3B5}"/>
+                <a16:creationId xmlns:a16="http://schemas.microsoft.com/office/drawing/2014/main" id="{D0C68011-41C2-2645-E240-30FA9548DD5A}"/>
               </a:ext>
             </a:extLst>
           </p:cNvPr>
@@ -7009,99 +10223,862 @@
           <a:p>
             <a:r>
               <a:rPr lang="en-US" dirty="0"/>
-              <a:t>Observations</a:t>
-            </a:r>
-          </a:p>
-        </p:txBody>
-      </p:sp>
-      <p:sp>
-        <p:nvSpPr>
-          <p:cNvPr id="3" name="Content Placeholder 2">
-            <a:extLst>
-              <a:ext uri="{FF2B5EF4-FFF2-40B4-BE49-F238E27FC236}">
-                <a16:creationId xmlns:a16="http://schemas.microsoft.com/office/drawing/2014/main" id="{3C0983C5-19F5-29C5-39CA-995EC49D4BBC}"/>
-              </a:ext>
-            </a:extLst>
-          </p:cNvPr>
-          <p:cNvSpPr>
-            <a:spLocks noGrp="1"/>
-          </p:cNvSpPr>
+              <a:t>The vanilla Event Scheduler algorithm </a:t>
+            </a:r>
+            <a:br>
+              <a:rPr lang="en-US" dirty="0"/>
+            </a:br>
+            <a:r>
+              <a:rPr lang="en-US" dirty="0"/>
+              <a:t>Example</a:t>
+            </a:r>
+          </a:p>
+        </p:txBody>
+      </p:sp>
+      <p:sp>
+        <p:nvSpPr>
+          <p:cNvPr id="4" name="Rounded Rectangle 3">
+            <a:extLst>
+              <a:ext uri="{FF2B5EF4-FFF2-40B4-BE49-F238E27FC236}">
+                <a16:creationId xmlns:a16="http://schemas.microsoft.com/office/drawing/2014/main" id="{D2BF02E5-11FD-A766-C7EA-DBD087C6587E}"/>
+              </a:ext>
+            </a:extLst>
+          </p:cNvPr>
+          <p:cNvSpPr/>
+          <p:nvPr/>
+        </p:nvSpPr>
+        <p:spPr>
+          <a:xfrm>
+            <a:off x="838200" y="2377966"/>
+            <a:ext cx="2225566" cy="1051034"/>
+          </a:xfrm>
+          <a:prstGeom prst="roundRect">
+            <a:avLst/>
+          </a:prstGeom>
+          <a:solidFill>
+            <a:srgbClr val="FF817F"/>
+          </a:solidFill>
+          <a:ln>
+            <a:noFill/>
+          </a:ln>
+        </p:spPr>
+        <p:style>
+          <a:lnRef idx="2">
+            <a:schemeClr val="accent1">
+              <a:shade val="50000"/>
+            </a:schemeClr>
+          </a:lnRef>
+          <a:fillRef idx="1">
+            <a:schemeClr val="accent1"/>
+          </a:fillRef>
+          <a:effectRef idx="0">
+            <a:schemeClr val="accent1"/>
+          </a:effectRef>
+          <a:fontRef idx="minor">
+            <a:schemeClr val="lt1"/>
+          </a:fontRef>
+        </p:style>
+        <p:txBody>
+          <a:bodyPr rtlCol="0" anchor="ctr"/>
+          <a:lstStyle/>
+          <a:p>
+            <a:pPr algn="ctr"/>
+            <a:r>
+              <a:rPr lang="en-US" b="1" dirty="0">
+                <a:solidFill>
+                  <a:schemeClr val="tx1"/>
+                </a:solidFill>
+              </a:rPr>
+              <a:t>E1, E2, E3</a:t>
+            </a:r>
+          </a:p>
+        </p:txBody>
+      </p:sp>
+      <p:cxnSp>
+        <p:nvCxnSpPr>
+          <p:cNvPr id="5" name="Straight Arrow Connector 4">
+            <a:extLst>
+              <a:ext uri="{FF2B5EF4-FFF2-40B4-BE49-F238E27FC236}">
+                <a16:creationId xmlns:a16="http://schemas.microsoft.com/office/drawing/2014/main" id="{5B9585E8-333B-9E88-45F9-029E02406E72}"/>
+              </a:ext>
+            </a:extLst>
+          </p:cNvPr>
+          <p:cNvCxnSpPr>
+            <a:cxnSpLocks/>
+            <a:stCxn id="4" idx="3"/>
+            <a:endCxn id="6" idx="1"/>
+          </p:cNvCxnSpPr>
+          <p:nvPr/>
+        </p:nvCxnSpPr>
+        <p:spPr>
+          <a:xfrm>
+            <a:off x="3063766" y="2903483"/>
+            <a:ext cx="496615" cy="0"/>
+          </a:xfrm>
+          <a:prstGeom prst="straightConnector1">
+            <a:avLst/>
+          </a:prstGeom>
+          <a:ln w="25400">
+            <a:solidFill>
+              <a:schemeClr val="tx1"/>
+            </a:solidFill>
+            <a:tailEnd type="triangle"/>
+          </a:ln>
+        </p:spPr>
+        <p:style>
+          <a:lnRef idx="1">
+            <a:schemeClr val="accent2"/>
+          </a:lnRef>
+          <a:fillRef idx="0">
+            <a:schemeClr val="accent2"/>
+          </a:fillRef>
+          <a:effectRef idx="0">
+            <a:schemeClr val="accent2"/>
+          </a:effectRef>
+          <a:fontRef idx="minor">
+            <a:schemeClr val="tx1"/>
+          </a:fontRef>
+        </p:style>
+      </p:cxnSp>
+      <p:sp>
+        <p:nvSpPr>
+          <p:cNvPr id="6" name="Rounded Rectangle 5">
+            <a:extLst>
+              <a:ext uri="{FF2B5EF4-FFF2-40B4-BE49-F238E27FC236}">
+                <a16:creationId xmlns:a16="http://schemas.microsoft.com/office/drawing/2014/main" id="{3941DA7F-0F6E-76E5-A21A-449A949CB392}"/>
+              </a:ext>
+            </a:extLst>
+          </p:cNvPr>
+          <p:cNvSpPr/>
+          <p:nvPr/>
+        </p:nvSpPr>
+        <p:spPr>
+          <a:xfrm>
+            <a:off x="3560381" y="2377966"/>
+            <a:ext cx="2225566" cy="1051034"/>
+          </a:xfrm>
+          <a:prstGeom prst="roundRect">
+            <a:avLst/>
+          </a:prstGeom>
+          <a:solidFill>
+            <a:srgbClr val="FF0000"/>
+          </a:solidFill>
+          <a:ln>
+            <a:noFill/>
+          </a:ln>
+        </p:spPr>
+        <p:style>
+          <a:lnRef idx="2">
+            <a:schemeClr val="accent1">
+              <a:shade val="50000"/>
+            </a:schemeClr>
+          </a:lnRef>
+          <a:fillRef idx="1">
+            <a:schemeClr val="accent1"/>
+          </a:fillRef>
+          <a:effectRef idx="0">
+            <a:schemeClr val="accent1"/>
+          </a:effectRef>
+          <a:fontRef idx="minor">
+            <a:schemeClr val="lt1"/>
+          </a:fontRef>
+        </p:style>
+        <p:txBody>
+          <a:bodyPr rtlCol="0" anchor="ctr"/>
+          <a:lstStyle/>
+          <a:p>
+            <a:pPr algn="ctr"/>
+            <a:r>
+              <a:rPr lang="en-US" b="1" dirty="0">
+                <a:solidFill>
+                  <a:schemeClr val="bg1"/>
+                </a:solidFill>
+              </a:rPr>
+              <a:t>E4, E5, E6, E7</a:t>
+            </a:r>
+          </a:p>
+        </p:txBody>
+      </p:sp>
+      <p:sp>
+        <p:nvSpPr>
+          <p:cNvPr id="7" name="Rounded Rectangle 6">
+            <a:extLst>
+              <a:ext uri="{FF2B5EF4-FFF2-40B4-BE49-F238E27FC236}">
+                <a16:creationId xmlns:a16="http://schemas.microsoft.com/office/drawing/2014/main" id="{244C1AEF-0494-C1FB-DA13-D3BEB5A97850}"/>
+              </a:ext>
+            </a:extLst>
+          </p:cNvPr>
+          <p:cNvSpPr/>
+          <p:nvPr/>
+        </p:nvSpPr>
+        <p:spPr>
+          <a:xfrm>
+            <a:off x="6282562" y="2377966"/>
+            <a:ext cx="2225566" cy="1051034"/>
+          </a:xfrm>
+          <a:prstGeom prst="roundRect">
+            <a:avLst/>
+          </a:prstGeom>
+          <a:solidFill>
+            <a:srgbClr val="C473FF"/>
+          </a:solidFill>
+          <a:ln>
+            <a:noFill/>
+          </a:ln>
+        </p:spPr>
+        <p:style>
+          <a:lnRef idx="2">
+            <a:schemeClr val="accent1">
+              <a:shade val="50000"/>
+            </a:schemeClr>
+          </a:lnRef>
+          <a:fillRef idx="1">
+            <a:schemeClr val="accent1"/>
+          </a:fillRef>
+          <a:effectRef idx="0">
+            <a:schemeClr val="accent1"/>
+          </a:effectRef>
+          <a:fontRef idx="minor">
+            <a:schemeClr val="lt1"/>
+          </a:fontRef>
+        </p:style>
+        <p:txBody>
+          <a:bodyPr rtlCol="0" anchor="ctr"/>
+          <a:lstStyle/>
+          <a:p>
+            <a:pPr algn="ctr"/>
+            <a:r>
+              <a:rPr lang="en-US" b="1" dirty="0">
+                <a:solidFill>
+                  <a:schemeClr val="tx1"/>
+                </a:solidFill>
+              </a:rPr>
+              <a:t>E8, E9, E10</a:t>
+            </a:r>
+          </a:p>
+        </p:txBody>
+      </p:sp>
+      <p:cxnSp>
+        <p:nvCxnSpPr>
+          <p:cNvPr id="8" name="Straight Arrow Connector 7">
+            <a:extLst>
+              <a:ext uri="{FF2B5EF4-FFF2-40B4-BE49-F238E27FC236}">
+                <a16:creationId xmlns:a16="http://schemas.microsoft.com/office/drawing/2014/main" id="{0F2E2CFD-CF07-ADC1-32E7-99080B697F1E}"/>
+              </a:ext>
+            </a:extLst>
+          </p:cNvPr>
+          <p:cNvCxnSpPr>
+            <a:cxnSpLocks/>
+            <a:stCxn id="7" idx="3"/>
+            <a:endCxn id="9" idx="1"/>
+          </p:cNvCxnSpPr>
+          <p:nvPr/>
+        </p:nvCxnSpPr>
+        <p:spPr>
+          <a:xfrm>
+            <a:off x="8508128" y="2903483"/>
+            <a:ext cx="496615" cy="0"/>
+          </a:xfrm>
+          <a:prstGeom prst="straightConnector1">
+            <a:avLst/>
+          </a:prstGeom>
+          <a:ln w="25400">
+            <a:solidFill>
+              <a:schemeClr val="tx1"/>
+            </a:solidFill>
+            <a:tailEnd type="triangle"/>
+          </a:ln>
+        </p:spPr>
+        <p:style>
+          <a:lnRef idx="1">
+            <a:schemeClr val="accent2"/>
+          </a:lnRef>
+          <a:fillRef idx="0">
+            <a:schemeClr val="accent2"/>
+          </a:fillRef>
+          <a:effectRef idx="0">
+            <a:schemeClr val="accent2"/>
+          </a:effectRef>
+          <a:fontRef idx="minor">
+            <a:schemeClr val="tx1"/>
+          </a:fontRef>
+        </p:style>
+      </p:cxnSp>
+      <p:sp>
+        <p:nvSpPr>
+          <p:cNvPr id="9" name="Rounded Rectangle 8">
+            <a:extLst>
+              <a:ext uri="{FF2B5EF4-FFF2-40B4-BE49-F238E27FC236}">
+                <a16:creationId xmlns:a16="http://schemas.microsoft.com/office/drawing/2014/main" id="{6197DD73-C2E6-584A-4DB2-D57C826F4B3B}"/>
+              </a:ext>
+            </a:extLst>
+          </p:cNvPr>
+          <p:cNvSpPr/>
+          <p:nvPr/>
+        </p:nvSpPr>
+        <p:spPr>
+          <a:xfrm>
+            <a:off x="9004743" y="2377966"/>
+            <a:ext cx="2225566" cy="1051034"/>
+          </a:xfrm>
+          <a:prstGeom prst="roundRect">
+            <a:avLst/>
+          </a:prstGeom>
+          <a:solidFill>
+            <a:srgbClr val="0040FF"/>
+          </a:solidFill>
+          <a:ln>
+            <a:noFill/>
+          </a:ln>
+        </p:spPr>
+        <p:style>
+          <a:lnRef idx="2">
+            <a:schemeClr val="accent1">
+              <a:shade val="50000"/>
+            </a:schemeClr>
+          </a:lnRef>
+          <a:fillRef idx="1">
+            <a:schemeClr val="accent1"/>
+          </a:fillRef>
+          <a:effectRef idx="0">
+            <a:schemeClr val="accent1"/>
+          </a:effectRef>
+          <a:fontRef idx="minor">
+            <a:schemeClr val="lt1"/>
+          </a:fontRef>
+        </p:style>
+        <p:txBody>
+          <a:bodyPr rtlCol="0" anchor="ctr"/>
+          <a:lstStyle/>
+          <a:p>
+            <a:pPr algn="ctr"/>
+            <a:r>
+              <a:rPr lang="en-US" b="1" dirty="0">
+                <a:solidFill>
+                  <a:schemeClr val="bg1"/>
+                </a:solidFill>
+              </a:rPr>
+              <a:t>E11, E12</a:t>
+            </a:r>
+          </a:p>
+        </p:txBody>
+      </p:sp>
+      <p:cxnSp>
+        <p:nvCxnSpPr>
+          <p:cNvPr id="10" name="Straight Arrow Connector 9">
+            <a:extLst>
+              <a:ext uri="{FF2B5EF4-FFF2-40B4-BE49-F238E27FC236}">
+                <a16:creationId xmlns:a16="http://schemas.microsoft.com/office/drawing/2014/main" id="{1DCB7FEC-B89E-51DF-7E56-E643F44911AF}"/>
+              </a:ext>
+            </a:extLst>
+          </p:cNvPr>
+          <p:cNvCxnSpPr>
+            <a:cxnSpLocks/>
+          </p:cNvCxnSpPr>
+          <p:nvPr/>
+        </p:nvCxnSpPr>
+        <p:spPr>
+          <a:xfrm>
+            <a:off x="5785947" y="2913992"/>
+            <a:ext cx="496615" cy="0"/>
+          </a:xfrm>
+          <a:prstGeom prst="straightConnector1">
+            <a:avLst/>
+          </a:prstGeom>
+          <a:ln w="25400">
+            <a:solidFill>
+              <a:schemeClr val="tx1"/>
+            </a:solidFill>
+            <a:tailEnd type="triangle"/>
+          </a:ln>
+        </p:spPr>
+        <p:style>
+          <a:lnRef idx="1">
+            <a:schemeClr val="accent2"/>
+          </a:lnRef>
+          <a:fillRef idx="0">
+            <a:schemeClr val="accent2"/>
+          </a:fillRef>
+          <a:effectRef idx="0">
+            <a:schemeClr val="accent2"/>
+          </a:effectRef>
+          <a:fontRef idx="minor">
+            <a:schemeClr val="tx1"/>
+          </a:fontRef>
+        </p:style>
+      </p:cxnSp>
+      <p:sp>
+        <p:nvSpPr>
+          <p:cNvPr id="25" name="TextBox 24">
+            <a:extLst>
+              <a:ext uri="{FF2B5EF4-FFF2-40B4-BE49-F238E27FC236}">
+                <a16:creationId xmlns:a16="http://schemas.microsoft.com/office/drawing/2014/main" id="{5597EDFE-343F-62BD-C43E-E8C60231EB57}"/>
+              </a:ext>
+            </a:extLst>
+          </p:cNvPr>
+          <p:cNvSpPr txBox="1"/>
+          <p:nvPr/>
+        </p:nvSpPr>
+        <p:spPr>
+          <a:xfrm>
+            <a:off x="838200" y="2388477"/>
+            <a:ext cx="496615" cy="369332"/>
+          </a:xfrm>
+          <a:prstGeom prst="rect">
+            <a:avLst/>
+          </a:prstGeom>
+          <a:noFill/>
+        </p:spPr>
+        <p:txBody>
+          <a:bodyPr wrap="square" rtlCol="0">
+            <a:spAutoFit/>
+          </a:bodyPr>
+          <a:lstStyle/>
+          <a:p>
+            <a:r>
+              <a:rPr lang="en-US" b="1" dirty="0"/>
+              <a:t>G1</a:t>
+            </a:r>
+          </a:p>
+        </p:txBody>
+      </p:sp>
+      <p:sp>
+        <p:nvSpPr>
+          <p:cNvPr id="26" name="TextBox 25">
+            <a:extLst>
+              <a:ext uri="{FF2B5EF4-FFF2-40B4-BE49-F238E27FC236}">
+                <a16:creationId xmlns:a16="http://schemas.microsoft.com/office/drawing/2014/main" id="{3B53E386-8777-4A7A-CF6B-5EBA473BE8AB}"/>
+              </a:ext>
+            </a:extLst>
+          </p:cNvPr>
+          <p:cNvSpPr txBox="1"/>
+          <p:nvPr/>
+        </p:nvSpPr>
+        <p:spPr>
+          <a:xfrm>
+            <a:off x="3560381" y="2385075"/>
+            <a:ext cx="496615" cy="369332"/>
+          </a:xfrm>
+          <a:prstGeom prst="rect">
+            <a:avLst/>
+          </a:prstGeom>
+          <a:noFill/>
+        </p:spPr>
+        <p:txBody>
+          <a:bodyPr wrap="square" rtlCol="0">
+            <a:spAutoFit/>
+          </a:bodyPr>
+          <a:lstStyle/>
+          <a:p>
+            <a:r>
+              <a:rPr lang="en-US" b="1" dirty="0">
+                <a:solidFill>
+                  <a:schemeClr val="bg1"/>
+                </a:solidFill>
+              </a:rPr>
+              <a:t>G2</a:t>
+            </a:r>
+          </a:p>
+        </p:txBody>
+      </p:sp>
+      <p:sp>
+        <p:nvSpPr>
+          <p:cNvPr id="27" name="TextBox 26">
+            <a:extLst>
+              <a:ext uri="{FF2B5EF4-FFF2-40B4-BE49-F238E27FC236}">
+                <a16:creationId xmlns:a16="http://schemas.microsoft.com/office/drawing/2014/main" id="{B9CDBC98-F8EC-7E4E-FBBD-148749538031}"/>
+              </a:ext>
+            </a:extLst>
+          </p:cNvPr>
+          <p:cNvSpPr txBox="1"/>
+          <p:nvPr/>
+        </p:nvSpPr>
+        <p:spPr>
+          <a:xfrm>
+            <a:off x="6282562" y="2381673"/>
+            <a:ext cx="496615" cy="369332"/>
+          </a:xfrm>
+          <a:prstGeom prst="rect">
+            <a:avLst/>
+          </a:prstGeom>
+          <a:noFill/>
+        </p:spPr>
+        <p:txBody>
+          <a:bodyPr wrap="square" rtlCol="0">
+            <a:spAutoFit/>
+          </a:bodyPr>
+          <a:lstStyle/>
+          <a:p>
+            <a:r>
+              <a:rPr lang="en-US" b="1" dirty="0"/>
+              <a:t>G3</a:t>
+            </a:r>
+          </a:p>
+        </p:txBody>
+      </p:sp>
+      <p:sp>
+        <p:nvSpPr>
+          <p:cNvPr id="28" name="TextBox 27">
+            <a:extLst>
+              <a:ext uri="{FF2B5EF4-FFF2-40B4-BE49-F238E27FC236}">
+                <a16:creationId xmlns:a16="http://schemas.microsoft.com/office/drawing/2014/main" id="{36EC8021-F9E8-2E5B-5352-1F4CF9D1937B}"/>
+              </a:ext>
+            </a:extLst>
+          </p:cNvPr>
+          <p:cNvSpPr txBox="1"/>
+          <p:nvPr/>
+        </p:nvSpPr>
+        <p:spPr>
+          <a:xfrm>
+            <a:off x="9004743" y="2378271"/>
+            <a:ext cx="496615" cy="369332"/>
+          </a:xfrm>
+          <a:prstGeom prst="rect">
+            <a:avLst/>
+          </a:prstGeom>
+          <a:noFill/>
+        </p:spPr>
+        <p:txBody>
+          <a:bodyPr wrap="square" rtlCol="0">
+            <a:spAutoFit/>
+          </a:bodyPr>
+          <a:lstStyle/>
+          <a:p>
+            <a:r>
+              <a:rPr lang="en-US" b="1" dirty="0">
+                <a:solidFill>
+                  <a:schemeClr val="bg1"/>
+                </a:solidFill>
+              </a:rPr>
+              <a:t>G4</a:t>
+            </a:r>
+          </a:p>
+        </p:txBody>
+      </p:sp>
+      <p:graphicFrame>
+        <p:nvGraphicFramePr>
+          <p:cNvPr id="31" name="Table 31">
+            <a:extLst>
+              <a:ext uri="{FF2B5EF4-FFF2-40B4-BE49-F238E27FC236}">
+                <a16:creationId xmlns:a16="http://schemas.microsoft.com/office/drawing/2014/main" id="{454928A9-0975-D0FB-0116-4C31D199FE83}"/>
+              </a:ext>
+            </a:extLst>
+          </p:cNvPr>
+          <p:cNvGraphicFramePr>
+            <a:graphicFrameLocks noGrp="1"/>
+          </p:cNvGraphicFramePr>
           <p:nvPr>
-            <p:ph idx="1"/>
+            <p:extLst>
+              <p:ext uri="{D42A27DB-BD31-4B8C-83A1-F6EECF244321}">
+                <p14:modId xmlns:p14="http://schemas.microsoft.com/office/powerpoint/2010/main" val="2330772607"/>
+              </p:ext>
+            </p:extLst>
           </p:nvPr>
-        </p:nvSpPr>
-        <p:spPr/>
-        <p:txBody>
-          <a:bodyPr/>
-          <a:lstStyle/>
-          <a:p>
-            <a:r>
-              <a:rPr lang="en-US" dirty="0"/>
-              <a:t>Linux </a:t>
-            </a:r>
-            <a:r>
-              <a:rPr lang="en-US" dirty="0">
-                <a:latin typeface="Consolas" panose="020B0609020204030204" pitchFamily="49" charset="0"/>
-                <a:cs typeface="Consolas" panose="020B0609020204030204" pitchFamily="49" charset="0"/>
-              </a:rPr>
-              <a:t>hrtimer</a:t>
-            </a:r>
-            <a:r>
-              <a:rPr lang="en-US" dirty="0"/>
-              <a:t> sends multiplexing interrupt for interval</a:t>
-            </a:r>
-          </a:p>
-          <a:p>
-            <a:pPr marL="0" indent="0">
-              <a:buNone/>
-            </a:pPr>
-            <a:endParaRPr lang="en-US" dirty="0"/>
-          </a:p>
-          <a:p>
-            <a:r>
-              <a:rPr lang="en-US" dirty="0"/>
-              <a:t>Inefficient!!</a:t>
-            </a:r>
-          </a:p>
-          <a:p>
-            <a:pPr lvl="1"/>
-            <a:r>
-              <a:rPr lang="en-US" dirty="0"/>
-              <a:t>Counters are activated as soon as a group fails, which does not consider schedulability of later event groups</a:t>
-            </a:r>
-          </a:p>
-          <a:p>
-            <a:pPr marL="457200" lvl="1" indent="0">
-              <a:buNone/>
-            </a:pPr>
-            <a:endParaRPr lang="en-US" dirty="0"/>
-          </a:p>
-          <a:p>
-            <a:r>
-              <a:rPr lang="en-US" dirty="0"/>
-              <a:t>Reducing need for </a:t>
-            </a:r>
-            <a:r>
-              <a:rPr lang="en-US" i="1" dirty="0"/>
-              <a:t>multiplexing</a:t>
-            </a:r>
-            <a:r>
-              <a:rPr lang="en-US" dirty="0"/>
-              <a:t> would improve accuracy of event counts</a:t>
-            </a:r>
-          </a:p>
-          <a:p>
-            <a:pPr marL="457200" lvl="1" indent="0">
-              <a:buNone/>
-            </a:pPr>
-            <a:endParaRPr lang="en-US" dirty="0"/>
-          </a:p>
-        </p:txBody>
-      </p:sp>
+        </p:nvGraphicFramePr>
+        <p:xfrm>
+          <a:off x="2031999" y="4376461"/>
+          <a:ext cx="8128002" cy="741680"/>
+        </p:xfrm>
+        <a:graphic>
+          <a:graphicData uri="http://schemas.openxmlformats.org/drawingml/2006/table">
+            <a:tbl>
+              <a:tblPr firstRow="1" bandRow="1">
+                <a:tableStyleId>{F5AB1C69-6EDB-4FF4-983F-18BD219EF322}</a:tableStyleId>
+              </a:tblPr>
+              <a:tblGrid>
+                <a:gridCol w="1354667">
+                  <a:extLst>
+                    <a:ext uri="{9D8B030D-6E8A-4147-A177-3AD203B41FA5}">
+                      <a16:colId xmlns:a16="http://schemas.microsoft.com/office/drawing/2014/main" val="2439474539"/>
+                    </a:ext>
+                  </a:extLst>
+                </a:gridCol>
+                <a:gridCol w="1354667">
+                  <a:extLst>
+                    <a:ext uri="{9D8B030D-6E8A-4147-A177-3AD203B41FA5}">
+                      <a16:colId xmlns:a16="http://schemas.microsoft.com/office/drawing/2014/main" val="1301125640"/>
+                    </a:ext>
+                  </a:extLst>
+                </a:gridCol>
+                <a:gridCol w="1354667">
+                  <a:extLst>
+                    <a:ext uri="{9D8B030D-6E8A-4147-A177-3AD203B41FA5}">
+                      <a16:colId xmlns:a16="http://schemas.microsoft.com/office/drawing/2014/main" val="3480179052"/>
+                    </a:ext>
+                  </a:extLst>
+                </a:gridCol>
+                <a:gridCol w="1354667">
+                  <a:extLst>
+                    <a:ext uri="{9D8B030D-6E8A-4147-A177-3AD203B41FA5}">
+                      <a16:colId xmlns:a16="http://schemas.microsoft.com/office/drawing/2014/main" val="2678239239"/>
+                    </a:ext>
+                  </a:extLst>
+                </a:gridCol>
+                <a:gridCol w="1354667">
+                  <a:extLst>
+                    <a:ext uri="{9D8B030D-6E8A-4147-A177-3AD203B41FA5}">
+                      <a16:colId xmlns:a16="http://schemas.microsoft.com/office/drawing/2014/main" val="69290392"/>
+                    </a:ext>
+                  </a:extLst>
+                </a:gridCol>
+                <a:gridCol w="1354667">
+                  <a:extLst>
+                    <a:ext uri="{9D8B030D-6E8A-4147-A177-3AD203B41FA5}">
+                      <a16:colId xmlns:a16="http://schemas.microsoft.com/office/drawing/2014/main" val="451300200"/>
+                    </a:ext>
+                  </a:extLst>
+                </a:gridCol>
+              </a:tblGrid>
+              <a:tr h="370840">
+                <a:tc>
+                  <a:txBody>
+                    <a:bodyPr/>
+                    <a:lstStyle/>
+                    <a:p>
+                      <a:r>
+                        <a:rPr lang="en-US" dirty="0"/>
+                        <a:t>C1</a:t>
+                      </a:r>
+                    </a:p>
+                  </a:txBody>
+                  <a:tcPr/>
+                </a:tc>
+                <a:tc>
+                  <a:txBody>
+                    <a:bodyPr/>
+                    <a:lstStyle/>
+                    <a:p>
+                      <a:r>
+                        <a:rPr lang="en-US" dirty="0"/>
+                        <a:t>C2</a:t>
+                      </a:r>
+                    </a:p>
+                  </a:txBody>
+                  <a:tcPr/>
+                </a:tc>
+                <a:tc>
+                  <a:txBody>
+                    <a:bodyPr/>
+                    <a:lstStyle/>
+                    <a:p>
+                      <a:r>
+                        <a:rPr lang="en-US" dirty="0"/>
+                        <a:t>C3</a:t>
+                      </a:r>
+                    </a:p>
+                  </a:txBody>
+                  <a:tcPr/>
+                </a:tc>
+                <a:tc>
+                  <a:txBody>
+                    <a:bodyPr/>
+                    <a:lstStyle/>
+                    <a:p>
+                      <a:r>
+                        <a:rPr lang="en-US" dirty="0"/>
+                        <a:t>C4</a:t>
+                      </a:r>
+                    </a:p>
+                  </a:txBody>
+                  <a:tcPr/>
+                </a:tc>
+                <a:tc>
+                  <a:txBody>
+                    <a:bodyPr/>
+                    <a:lstStyle/>
+                    <a:p>
+                      <a:r>
+                        <a:rPr lang="en-US" dirty="0"/>
+                        <a:t>C5</a:t>
+                      </a:r>
+                    </a:p>
+                  </a:txBody>
+                  <a:tcPr/>
+                </a:tc>
+                <a:tc>
+                  <a:txBody>
+                    <a:bodyPr/>
+                    <a:lstStyle/>
+                    <a:p>
+                      <a:r>
+                        <a:rPr lang="en-US" dirty="0"/>
+                        <a:t>C6</a:t>
+                      </a:r>
+                    </a:p>
+                  </a:txBody>
+                  <a:tcPr/>
+                </a:tc>
+                <a:extLst>
+                  <a:ext uri="{0D108BD9-81ED-4DB2-BD59-A6C34878D82A}">
+                    <a16:rowId xmlns:a16="http://schemas.microsoft.com/office/drawing/2014/main" val="1826944969"/>
+                  </a:ext>
+                </a:extLst>
+              </a:tr>
+              <a:tr h="370840">
+                <a:tc>
+                  <a:txBody>
+                    <a:bodyPr/>
+                    <a:lstStyle/>
+                    <a:p>
+                      <a:r>
+                        <a:rPr lang="en-US" dirty="0"/>
+                        <a:t>E1</a:t>
+                      </a:r>
+                    </a:p>
+                  </a:txBody>
+                  <a:tcPr/>
+                </a:tc>
+                <a:tc>
+                  <a:txBody>
+                    <a:bodyPr/>
+                    <a:lstStyle/>
+                    <a:p>
+                      <a:r>
+                        <a:rPr lang="en-US" dirty="0"/>
+                        <a:t>E2</a:t>
+                      </a:r>
+                    </a:p>
+                  </a:txBody>
+                  <a:tcPr/>
+                </a:tc>
+                <a:tc>
+                  <a:txBody>
+                    <a:bodyPr/>
+                    <a:lstStyle/>
+                    <a:p>
+                      <a:r>
+                        <a:rPr lang="en-US" dirty="0"/>
+                        <a:t>E3</a:t>
+                      </a:r>
+                    </a:p>
+                  </a:txBody>
+                  <a:tcPr/>
+                </a:tc>
+                <a:tc>
+                  <a:txBody>
+                    <a:bodyPr/>
+                    <a:lstStyle/>
+                    <a:p>
+                      <a:r>
+                        <a:rPr lang="en-US" dirty="0"/>
+                        <a:t>x</a:t>
+                      </a:r>
+                    </a:p>
+                  </a:txBody>
+                  <a:tcPr/>
+                </a:tc>
+                <a:tc>
+                  <a:txBody>
+                    <a:bodyPr/>
+                    <a:lstStyle/>
+                    <a:p>
+                      <a:r>
+                        <a:rPr lang="en-US" dirty="0"/>
+                        <a:t>x</a:t>
+                      </a:r>
+                    </a:p>
+                  </a:txBody>
+                  <a:tcPr/>
+                </a:tc>
+                <a:tc>
+                  <a:txBody>
+                    <a:bodyPr/>
+                    <a:lstStyle/>
+                    <a:p>
+                      <a:r>
+                        <a:rPr lang="en-US" dirty="0"/>
+                        <a:t>x</a:t>
+                      </a:r>
+                    </a:p>
+                  </a:txBody>
+                  <a:tcPr/>
+                </a:tc>
+                <a:extLst>
+                  <a:ext uri="{0D108BD9-81ED-4DB2-BD59-A6C34878D82A}">
+                    <a16:rowId xmlns:a16="http://schemas.microsoft.com/office/drawing/2014/main" val="3761861412"/>
+                  </a:ext>
+                </a:extLst>
+              </a:tr>
+            </a:tbl>
+          </a:graphicData>
+        </a:graphic>
+      </p:graphicFrame>
+      <p:pic>
+        <p:nvPicPr>
+          <p:cNvPr id="33" name="Graphic 32" descr="Checkmark with solid fill">
+            <a:extLst>
+              <a:ext uri="{FF2B5EF4-FFF2-40B4-BE49-F238E27FC236}">
+                <a16:creationId xmlns:a16="http://schemas.microsoft.com/office/drawing/2014/main" id="{9DE34486-85E8-3AB4-A771-614086F77771}"/>
+              </a:ext>
+            </a:extLst>
+          </p:cNvPr>
+          <p:cNvPicPr>
+            <a:picLocks noChangeAspect="1"/>
+          </p:cNvPicPr>
+          <p:nvPr/>
+        </p:nvPicPr>
+        <p:blipFill>
+          <a:blip r:embed="rId3">
+            <a:extLst>
+              <a:ext uri="{96DAC541-7B7A-43D3-8B79-37D633B846F1}">
+                <asvg:svgBlip xmlns:asvg="http://schemas.microsoft.com/office/drawing/2016/SVG/main" r:embed="rId4"/>
+              </a:ext>
+            </a:extLst>
+          </a:blip>
+          <a:stretch>
+            <a:fillRect/>
+          </a:stretch>
+        </p:blipFill>
+        <p:spPr>
+          <a:xfrm>
+            <a:off x="2459420" y="1878833"/>
+            <a:ext cx="914400" cy="914400"/>
+          </a:xfrm>
+          <a:prstGeom prst="rect">
+            <a:avLst/>
+          </a:prstGeom>
+        </p:spPr>
+      </p:pic>
+      <p:pic>
+        <p:nvPicPr>
+          <p:cNvPr id="35" name="Graphic 34" descr="Badge Cross with solid fill">
+            <a:extLst>
+              <a:ext uri="{FF2B5EF4-FFF2-40B4-BE49-F238E27FC236}">
+                <a16:creationId xmlns:a16="http://schemas.microsoft.com/office/drawing/2014/main" id="{35F4B7EA-14CC-B241-C346-DE5F2F719C1C}"/>
+              </a:ext>
+            </a:extLst>
+          </p:cNvPr>
+          <p:cNvPicPr>
+            <a:picLocks noChangeAspect="1"/>
+          </p:cNvPicPr>
+          <p:nvPr/>
+        </p:nvPicPr>
+        <p:blipFill>
+          <a:blip r:embed="rId5">
+            <a:extLst>
+              <a:ext uri="{96DAC541-7B7A-43D3-8B79-37D633B846F1}">
+                <asvg:svgBlip xmlns:asvg="http://schemas.microsoft.com/office/drawing/2016/SVG/main" r:embed="rId6"/>
+              </a:ext>
+            </a:extLst>
+          </a:blip>
+          <a:stretch>
+            <a:fillRect/>
+          </a:stretch>
+        </p:blipFill>
+        <p:spPr>
+          <a:xfrm>
+            <a:off x="5181600" y="1878833"/>
+            <a:ext cx="914400" cy="914400"/>
+          </a:xfrm>
+          <a:prstGeom prst="rect">
+            <a:avLst/>
+          </a:prstGeom>
+        </p:spPr>
+      </p:pic>
     </p:spTree>
     <p:extLst>
       <p:ext uri="{BB962C8B-B14F-4D97-AF65-F5344CB8AC3E}">
-        <p14:creationId xmlns:p14="http://schemas.microsoft.com/office/powerpoint/2010/main" val="1579563712"/>
+        <p14:creationId xmlns:p14="http://schemas.microsoft.com/office/powerpoint/2010/main" val="3110409315"/>
       </p:ext>
     </p:extLst>
   </p:cSld>

</xml_diff>

<commit_message>
"add note to pptx"
</commit_message>
<xml_diff>
--- a/midterm.pptx
+++ b/midterm.pptx
@@ -211,7 +211,7 @@
           <a:p>
             <a:fld id="{5BBDA22D-9256-1545-963C-F40A629BF286}" type="datetimeFigureOut">
               <a:rPr lang="en-US" smtClean="0"/>
-              <a:t>4/3/23</a:t>
+              <a:t>4/4/2023</a:t>
             </a:fld>
             <a:endParaRPr lang="en-US"/>
           </a:p>
@@ -522,7 +522,32 @@
           <a:bodyPr/>
           <a:lstStyle/>
           <a:p>
-            <a:endParaRPr lang="en-US" dirty="0"/>
+            <a:r>
+              <a:rPr lang="en-US" dirty="0"/>
+              <a:t>HPC special registers in </a:t>
+            </a:r>
+            <a:r>
+              <a:rPr lang="en-US" dirty="0" err="1"/>
+              <a:t>cpu</a:t>
+            </a:r>
+            <a:r>
+              <a:rPr lang="en-US" dirty="0"/>
+              <a:t> </a:t>
+            </a:r>
+          </a:p>
+          <a:p>
+            <a:r>
+              <a:rPr lang="en-US" dirty="0"/>
+              <a:t>Monitor and measure events, cache miss, </a:t>
+            </a:r>
+            <a:r>
+              <a:rPr lang="en-US" dirty="0" err="1"/>
+              <a:t>cpu</a:t>
+            </a:r>
+            <a:r>
+              <a:rPr lang="en-US" dirty="0"/>
+              <a:t> cycles, and bus access.</a:t>
+            </a:r>
           </a:p>
         </p:txBody>
       </p:sp>
@@ -543,7 +568,7 @@
           <a:p>
             <a:fld id="{20E657E1-BE6E-F343-8593-856120E10085}" type="slidenum">
               <a:rPr lang="en-US" smtClean="0"/>
-              <a:t>4</a:t>
+              <a:t>3</a:t>
             </a:fld>
             <a:endParaRPr lang="en-US"/>
           </a:p>
@@ -552,7 +577,103 @@
     </p:spTree>
     <p:extLst>
       <p:ext uri="{BB962C8B-B14F-4D97-AF65-F5344CB8AC3E}">
-        <p14:creationId xmlns:p14="http://schemas.microsoft.com/office/powerpoint/2010/main" val="2539276460"/>
+        <p14:creationId xmlns:p14="http://schemas.microsoft.com/office/powerpoint/2010/main" val="3341093942"/>
+      </p:ext>
+    </p:extLst>
+  </p:cSld>
+  <p:clrMapOvr>
+    <a:masterClrMapping/>
+  </p:clrMapOvr>
+</p:notes>
+</file>
+
+<file path=ppt/notesSlides/notesSlide10.xml><?xml version="1.0" encoding="utf-8"?>
+<p:notes xmlns:a="http://schemas.openxmlformats.org/drawingml/2006/main" xmlns:r="http://schemas.openxmlformats.org/officeDocument/2006/relationships" xmlns:p="http://schemas.openxmlformats.org/presentationml/2006/main">
+  <p:cSld>
+    <p:spTree>
+      <p:nvGrpSpPr>
+        <p:cNvPr id="1" name=""/>
+        <p:cNvGrpSpPr/>
+        <p:nvPr/>
+      </p:nvGrpSpPr>
+      <p:grpSpPr>
+        <a:xfrm>
+          <a:off x="0" y="0"/>
+          <a:ext cx="0" cy="0"/>
+          <a:chOff x="0" y="0"/>
+          <a:chExt cx="0" cy="0"/>
+        </a:xfrm>
+      </p:grpSpPr>
+      <p:sp>
+        <p:nvSpPr>
+          <p:cNvPr id="2" name="Slide Image Placeholder 1"/>
+          <p:cNvSpPr>
+            <a:spLocks noGrp="1" noRot="1" noChangeAspect="1"/>
+          </p:cNvSpPr>
+          <p:nvPr>
+            <p:ph type="sldImg"/>
+          </p:nvPr>
+        </p:nvSpPr>
+        <p:spPr/>
+      </p:sp>
+      <p:sp>
+        <p:nvSpPr>
+          <p:cNvPr id="3" name="Notes Placeholder 2"/>
+          <p:cNvSpPr>
+            <a:spLocks noGrp="1"/>
+          </p:cNvSpPr>
+          <p:nvPr>
+            <p:ph type="body" idx="1"/>
+          </p:nvPr>
+        </p:nvSpPr>
+        <p:spPr/>
+        <p:txBody>
+          <a:bodyPr/>
+          <a:lstStyle/>
+          <a:p>
+            <a:r>
+              <a:rPr lang="en-US" dirty="0"/>
+              <a:t>We can reduce the need to multiplex in the first place by reducing the events that are traced</a:t>
+            </a:r>
+          </a:p>
+          <a:p>
+            <a:endParaRPr lang="en-US" dirty="0"/>
+          </a:p>
+          <a:p>
+            <a:r>
+              <a:rPr lang="en-US" dirty="0"/>
+              <a:t>Transition to Tomson</a:t>
+            </a:r>
+          </a:p>
+        </p:txBody>
+      </p:sp>
+      <p:sp>
+        <p:nvSpPr>
+          <p:cNvPr id="4" name="Slide Number Placeholder 3"/>
+          <p:cNvSpPr>
+            <a:spLocks noGrp="1"/>
+          </p:cNvSpPr>
+          <p:nvPr>
+            <p:ph type="sldNum" sz="quarter" idx="5"/>
+          </p:nvPr>
+        </p:nvSpPr>
+        <p:spPr/>
+        <p:txBody>
+          <a:bodyPr/>
+          <a:lstStyle/>
+          <a:p>
+            <a:fld id="{20E657E1-BE6E-F343-8593-856120E10085}" type="slidenum">
+              <a:rPr lang="en-US" smtClean="0"/>
+              <a:t>13</a:t>
+            </a:fld>
+            <a:endParaRPr lang="en-US"/>
+          </a:p>
+        </p:txBody>
+      </p:sp>
+    </p:spTree>
+    <p:extLst>
+      <p:ext uri="{BB962C8B-B14F-4D97-AF65-F5344CB8AC3E}">
+        <p14:creationId xmlns:p14="http://schemas.microsoft.com/office/powerpoint/2010/main" val="2527501957"/>
       </p:ext>
     </p:extLst>
   </p:cSld>
@@ -608,8 +729,19 @@
           <a:p>
             <a:r>
               <a:rPr lang="en-US" dirty="0"/>
-              <a:t>Draw attention to LLC-load-misses</a:t>
-            </a:r>
+              <a:t>Overview of PMU from slides. </a:t>
+            </a:r>
+          </a:p>
+          <a:p>
+            <a:r>
+              <a:rPr lang="en-US" dirty="0"/>
+              <a:t>This is the HPC used in our project to help analyze the performance of </a:t>
+            </a:r>
+            <a:r>
+              <a:rPr lang="en-US"/>
+              <a:t>event schedular.</a:t>
+            </a:r>
+            <a:endParaRPr lang="en-US" dirty="0"/>
           </a:p>
         </p:txBody>
       </p:sp>
@@ -630,7 +762,7 @@
           <a:p>
             <a:fld id="{20E657E1-BE6E-F343-8593-856120E10085}" type="slidenum">
               <a:rPr lang="en-US" smtClean="0"/>
-              <a:t>6</a:t>
+              <a:t>4</a:t>
             </a:fld>
             <a:endParaRPr lang="en-US"/>
           </a:p>
@@ -639,7 +771,7 @@
     </p:spTree>
     <p:extLst>
       <p:ext uri="{BB962C8B-B14F-4D97-AF65-F5344CB8AC3E}">
-        <p14:creationId xmlns:p14="http://schemas.microsoft.com/office/powerpoint/2010/main" val="55506833"/>
+        <p14:creationId xmlns:p14="http://schemas.microsoft.com/office/powerpoint/2010/main" val="2539276460"/>
       </p:ext>
     </p:extLst>
   </p:cSld>
@@ -695,7 +827,7 @@
           <a:p>
             <a:r>
               <a:rPr lang="en-US" dirty="0"/>
-              <a:t>Still, the subsystem is riddled with error</a:t>
+              <a:t>Draw attention to LLC-load-misses</a:t>
             </a:r>
           </a:p>
         </p:txBody>
@@ -717,7 +849,7 @@
           <a:p>
             <a:fld id="{20E657E1-BE6E-F343-8593-856120E10085}" type="slidenum">
               <a:rPr lang="en-US" smtClean="0"/>
-              <a:t>7</a:t>
+              <a:t>6</a:t>
             </a:fld>
             <a:endParaRPr lang="en-US"/>
           </a:p>
@@ -726,7 +858,7 @@
     </p:spTree>
     <p:extLst>
       <p:ext uri="{BB962C8B-B14F-4D97-AF65-F5344CB8AC3E}">
-        <p14:creationId xmlns:p14="http://schemas.microsoft.com/office/powerpoint/2010/main" val="3001585224"/>
+        <p14:creationId xmlns:p14="http://schemas.microsoft.com/office/powerpoint/2010/main" val="55506833"/>
       </p:ext>
     </p:extLst>
   </p:cSld>
@@ -782,76 +914,7 @@
           <a:p>
             <a:r>
               <a:rPr lang="en-US" dirty="0"/>
-              <a:t>A significant source of error is due to multiplexing</a:t>
-            </a:r>
-          </a:p>
-          <a:p>
-            <a:endParaRPr lang="en-US" dirty="0"/>
-          </a:p>
-          <a:p>
-            <a:r>
-              <a:rPr lang="en-US" dirty="0"/>
-              <a:t>Raspberry Pi has 6 general purpose counters [1]</a:t>
-            </a:r>
-          </a:p>
-          <a:p>
-            <a:endParaRPr lang="en-US" dirty="0"/>
-          </a:p>
-          <a:p>
-            <a:pPr marL="171450" indent="-171450">
-              <a:buFontTx/>
-              <a:buChar char="-"/>
-            </a:pPr>
-            <a:r>
-              <a:rPr lang="en-US" dirty="0"/>
-              <a:t>Ran 1-6, 12, and 24 events in perf stat –e &lt;events&gt; on stress-ng</a:t>
-            </a:r>
-          </a:p>
-          <a:p>
-            <a:pPr marL="171450" indent="-171450">
-              <a:buFontTx/>
-              <a:buChar char="-"/>
-            </a:pPr>
-            <a:r>
-              <a:rPr lang="en-US" dirty="0"/>
-              <a:t>LLC-load-misses was the pre-selected event</a:t>
-            </a:r>
-          </a:p>
-          <a:p>
-            <a:pPr marL="171450" indent="-171450">
-              <a:buFontTx/>
-              <a:buChar char="-"/>
-            </a:pPr>
-            <a:endParaRPr lang="en-US" dirty="0"/>
-          </a:p>
-          <a:p>
-            <a:pPr marL="171450" indent="-171450">
-              <a:buFontTx/>
-              <a:buChar char="-"/>
-            </a:pPr>
-            <a:endParaRPr lang="en-US" dirty="0"/>
-          </a:p>
-          <a:p>
-            <a:pPr marL="171450" marR="0" lvl="0" indent="-171450" algn="l" defTabSz="914400" rtl="0" eaLnBrk="1" fontAlgn="auto" latinLnBrk="0" hangingPunct="1">
-              <a:lnSpc>
-                <a:spcPct val="100000"/>
-              </a:lnSpc>
-              <a:spcBef>
-                <a:spcPts val="0"/>
-              </a:spcBef>
-              <a:spcAft>
-                <a:spcPts val="0"/>
-              </a:spcAft>
-              <a:buClrTx/>
-              <a:buSzTx/>
-              <a:buFontTx/>
-              <a:buChar char="-"/>
-              <a:tabLst/>
-              <a:defRPr/>
-            </a:pPr>
-            <a:r>
-              <a:rPr lang="en-US" dirty="0"/>
-              <a:t>So multiplexing is quite impactful and how events are assigned to counters is solved by event scheduling algorithms</a:t>
+              <a:t>Still, the subsystem is riddled with error</a:t>
             </a:r>
           </a:p>
         </p:txBody>
@@ -873,7 +936,7 @@
           <a:p>
             <a:fld id="{20E657E1-BE6E-F343-8593-856120E10085}" type="slidenum">
               <a:rPr lang="en-US" smtClean="0"/>
-              <a:t>8</a:t>
+              <a:t>7</a:t>
             </a:fld>
             <a:endParaRPr lang="en-US"/>
           </a:p>
@@ -882,7 +945,7 @@
     </p:spTree>
     <p:extLst>
       <p:ext uri="{BB962C8B-B14F-4D97-AF65-F5344CB8AC3E}">
-        <p14:creationId xmlns:p14="http://schemas.microsoft.com/office/powerpoint/2010/main" val="4032821406"/>
+        <p14:creationId xmlns:p14="http://schemas.microsoft.com/office/powerpoint/2010/main" val="3001585224"/>
       </p:ext>
     </p:extLst>
   </p:cSld>
@@ -936,7 +999,79 @@
           <a:bodyPr/>
           <a:lstStyle/>
           <a:p>
+            <a:r>
+              <a:rPr lang="en-US" dirty="0"/>
+              <a:t>A significant source of error is due to multiplexing</a:t>
+            </a:r>
+          </a:p>
+          <a:p>
             <a:endParaRPr lang="en-US" dirty="0"/>
+          </a:p>
+          <a:p>
+            <a:r>
+              <a:rPr lang="en-US" dirty="0"/>
+              <a:t>Raspberry Pi has 6 general purpose counters [1]</a:t>
+            </a:r>
+          </a:p>
+          <a:p>
+            <a:endParaRPr lang="en-US" dirty="0"/>
+          </a:p>
+          <a:p>
+            <a:pPr marL="171450" indent="-171450">
+              <a:buFontTx/>
+              <a:buChar char="-"/>
+            </a:pPr>
+            <a:r>
+              <a:rPr lang="en-US" dirty="0"/>
+              <a:t>Ran 1-6, 12, and 24 events in perf stat –e &lt;events&gt; on stress-ng</a:t>
+            </a:r>
+          </a:p>
+          <a:p>
+            <a:pPr marL="171450" indent="-171450">
+              <a:buFontTx/>
+              <a:buChar char="-"/>
+            </a:pPr>
+            <a:r>
+              <a:rPr lang="en-US" dirty="0"/>
+              <a:t>LLC-load-misses was the pre-selected event</a:t>
+            </a:r>
+          </a:p>
+          <a:p>
+            <a:pPr marL="171450" indent="-171450">
+              <a:buFontTx/>
+              <a:buChar char="-"/>
+            </a:pPr>
+            <a:endParaRPr lang="en-US" dirty="0"/>
+          </a:p>
+          <a:p>
+            <a:pPr marL="171450" indent="-171450">
+              <a:buFontTx/>
+              <a:buChar char="-"/>
+            </a:pPr>
+            <a:endParaRPr lang="en-US" dirty="0"/>
+          </a:p>
+          <a:p>
+            <a:pPr marL="171450" marR="0" lvl="0" indent="-171450" algn="l" defTabSz="914400" rtl="0" eaLnBrk="1" fontAlgn="auto" latinLnBrk="0" hangingPunct="1">
+              <a:lnSpc>
+                <a:spcPct val="100000"/>
+              </a:lnSpc>
+              <a:spcBef>
+                <a:spcPts val="0"/>
+              </a:spcBef>
+              <a:spcAft>
+                <a:spcPts val="0"/>
+              </a:spcAft>
+              <a:buClrTx/>
+              <a:buSzTx/>
+              <a:buFontTx/>
+              <a:buChar char="-"/>
+              <a:tabLst/>
+              <a:defRPr/>
+            </a:pPr>
+            <a:r>
+              <a:rPr lang="en-US" dirty="0"/>
+              <a:t>So multiplexing is quite impactful and how events are assigned to counters is solved by event scheduling algorithms</a:t>
+            </a:r>
           </a:p>
         </p:txBody>
       </p:sp>
@@ -957,7 +1092,7 @@
           <a:p>
             <a:fld id="{20E657E1-BE6E-F343-8593-856120E10085}" type="slidenum">
               <a:rPr lang="en-US" smtClean="0"/>
-              <a:t>9</a:t>
+              <a:t>8</a:t>
             </a:fld>
             <a:endParaRPr lang="en-US"/>
           </a:p>
@@ -966,7 +1101,7 @@
     </p:spTree>
     <p:extLst>
       <p:ext uri="{BB962C8B-B14F-4D97-AF65-F5344CB8AC3E}">
-        <p14:creationId xmlns:p14="http://schemas.microsoft.com/office/powerpoint/2010/main" val="1908276148"/>
+        <p14:creationId xmlns:p14="http://schemas.microsoft.com/office/powerpoint/2010/main" val="4032821406"/>
       </p:ext>
     </p:extLst>
   </p:cSld>
@@ -1020,212 +1155,6 @@
           <a:bodyPr/>
           <a:lstStyle/>
           <a:p>
-            <a:pPr marL="171450" marR="0" lvl="0" indent="-171450" algn="l" defTabSz="914400" rtl="0" eaLnBrk="1" fontAlgn="auto" latinLnBrk="0" hangingPunct="1">
-              <a:lnSpc>
-                <a:spcPct val="100000"/>
-              </a:lnSpc>
-              <a:spcBef>
-                <a:spcPts val="0"/>
-              </a:spcBef>
-              <a:spcAft>
-                <a:spcPts val="0"/>
-              </a:spcAft>
-              <a:buClrTx/>
-              <a:buSzTx/>
-              <a:buFontTx/>
-              <a:buChar char="-"/>
-              <a:tabLst/>
-              <a:defRPr/>
-            </a:pPr>
-            <a:r>
-              <a:rPr lang="en-US" dirty="0"/>
-              <a:t>List is traversed head to tail</a:t>
-            </a:r>
-          </a:p>
-          <a:p>
-            <a:pPr marL="171450" marR="0" lvl="0" indent="-171450" algn="l" defTabSz="914400" rtl="0" eaLnBrk="1" fontAlgn="auto" latinLnBrk="0" hangingPunct="1">
-              <a:lnSpc>
-                <a:spcPct val="100000"/>
-              </a:lnSpc>
-              <a:spcBef>
-                <a:spcPts val="0"/>
-              </a:spcBef>
-              <a:spcAft>
-                <a:spcPts val="0"/>
-              </a:spcAft>
-              <a:buClrTx/>
-              <a:buSzTx/>
-              <a:buFontTx/>
-              <a:buChar char="-"/>
-              <a:tabLst/>
-              <a:defRPr/>
-            </a:pPr>
-            <a:endParaRPr lang="en-US" dirty="0"/>
-          </a:p>
-          <a:p>
-            <a:pPr marL="171450" marR="0" lvl="0" indent="-171450" algn="l" defTabSz="914400" rtl="0" eaLnBrk="1" fontAlgn="auto" latinLnBrk="0" hangingPunct="1">
-              <a:lnSpc>
-                <a:spcPct val="100000"/>
-              </a:lnSpc>
-              <a:spcBef>
-                <a:spcPts val="0"/>
-              </a:spcBef>
-              <a:spcAft>
-                <a:spcPts val="0"/>
-              </a:spcAft>
-              <a:buClrTx/>
-              <a:buSzTx/>
-              <a:buFontTx/>
-              <a:buChar char="-"/>
-              <a:tabLst/>
-              <a:defRPr/>
-            </a:pPr>
-            <a:r>
-              <a:rPr lang="en-US" dirty="0"/>
-              <a:t>G2 fails to schedule</a:t>
-            </a:r>
-          </a:p>
-          <a:p>
-            <a:pPr marL="171450" marR="0" lvl="0" indent="-171450" algn="l" defTabSz="914400" rtl="0" eaLnBrk="1" fontAlgn="auto" latinLnBrk="0" hangingPunct="1">
-              <a:lnSpc>
-                <a:spcPct val="100000"/>
-              </a:lnSpc>
-              <a:spcBef>
-                <a:spcPts val="0"/>
-              </a:spcBef>
-              <a:spcAft>
-                <a:spcPts val="0"/>
-              </a:spcAft>
-              <a:buClrTx/>
-              <a:buSzTx/>
-              <a:buFontTx/>
-              <a:buChar char="-"/>
-              <a:tabLst/>
-              <a:defRPr/>
-            </a:pPr>
-            <a:endParaRPr lang="en-US" dirty="0"/>
-          </a:p>
-          <a:p>
-            <a:pPr marL="171450" marR="0" lvl="0" indent="-171450" algn="l" defTabSz="914400" rtl="0" eaLnBrk="1" fontAlgn="auto" latinLnBrk="0" hangingPunct="1">
-              <a:lnSpc>
-                <a:spcPct val="100000"/>
-              </a:lnSpc>
-              <a:spcBef>
-                <a:spcPts val="0"/>
-              </a:spcBef>
-              <a:spcAft>
-                <a:spcPts val="0"/>
-              </a:spcAft>
-              <a:buClrTx/>
-              <a:buSzTx/>
-              <a:buFontTx/>
-              <a:buChar char="-"/>
-              <a:tabLst/>
-              <a:defRPr/>
-            </a:pPr>
-            <a:r>
-              <a:rPr lang="en-US" dirty="0"/>
-              <a:t>Upon failure, the algorithm activates counters for counting and iteration proceeds</a:t>
-            </a:r>
-          </a:p>
-          <a:p>
-            <a:pPr marL="171450" marR="0" lvl="0" indent="-171450" algn="l" defTabSz="914400" rtl="0" eaLnBrk="1" fontAlgn="auto" latinLnBrk="0" hangingPunct="1">
-              <a:lnSpc>
-                <a:spcPct val="100000"/>
-              </a:lnSpc>
-              <a:spcBef>
-                <a:spcPts val="0"/>
-              </a:spcBef>
-              <a:spcAft>
-                <a:spcPts val="0"/>
-              </a:spcAft>
-              <a:buClrTx/>
-              <a:buSzTx/>
-              <a:buFontTx/>
-              <a:buChar char="-"/>
-              <a:tabLst/>
-              <a:defRPr/>
-            </a:pPr>
-            <a:endParaRPr lang="en-US" dirty="0"/>
-          </a:p>
-          <a:p>
-            <a:pPr marL="171450" marR="0" lvl="0" indent="-171450" algn="l" defTabSz="914400" rtl="0" eaLnBrk="1" fontAlgn="auto" latinLnBrk="0" hangingPunct="1">
-              <a:lnSpc>
-                <a:spcPct val="100000"/>
-              </a:lnSpc>
-              <a:spcBef>
-                <a:spcPts val="0"/>
-              </a:spcBef>
-              <a:spcAft>
-                <a:spcPts val="0"/>
-              </a:spcAft>
-              <a:buClrTx/>
-              <a:buSzTx/>
-              <a:buFontTx/>
-              <a:buChar char="-"/>
-              <a:tabLst/>
-              <a:defRPr/>
-            </a:pPr>
-            <a:r>
-              <a:rPr lang="en-US" dirty="0"/>
-              <a:t>Software events fill the rest of counters, but error in hardware event counts is exacerbated</a:t>
-            </a:r>
-          </a:p>
-          <a:p>
-            <a:pPr marL="0" marR="0" lvl="0" indent="0" algn="l" defTabSz="914400" rtl="0" eaLnBrk="1" fontAlgn="auto" latinLnBrk="0" hangingPunct="1">
-              <a:lnSpc>
-                <a:spcPct val="100000"/>
-              </a:lnSpc>
-              <a:spcBef>
-                <a:spcPts val="0"/>
-              </a:spcBef>
-              <a:spcAft>
-                <a:spcPts val="0"/>
-              </a:spcAft>
-              <a:buClrTx/>
-              <a:buSzTx/>
-              <a:buFontTx/>
-              <a:buNone/>
-              <a:tabLst/>
-              <a:defRPr/>
-            </a:pPr>
-            <a:endParaRPr lang="en-US" dirty="0"/>
-          </a:p>
-          <a:p>
-            <a:pPr marL="0" marR="0" lvl="0" indent="0" algn="l" defTabSz="914400" rtl="0" eaLnBrk="1" fontAlgn="auto" latinLnBrk="0" hangingPunct="1">
-              <a:lnSpc>
-                <a:spcPct val="100000"/>
-              </a:lnSpc>
-              <a:spcBef>
-                <a:spcPts val="0"/>
-              </a:spcBef>
-              <a:spcAft>
-                <a:spcPts val="0"/>
-              </a:spcAft>
-              <a:buClrTx/>
-              <a:buSzTx/>
-              <a:buFontTx/>
-              <a:buNone/>
-              <a:tabLst/>
-              <a:defRPr/>
-            </a:pPr>
-            <a:r>
-              <a:rPr lang="en-US" dirty="0"/>
-              <a:t>- Linux </a:t>
-            </a:r>
-            <a:r>
-              <a:rPr lang="en-US" dirty="0">
-                <a:latin typeface="Consolas" panose="020B0609020204030204" pitchFamily="49" charset="0"/>
-                <a:cs typeface="Consolas" panose="020B0609020204030204" pitchFamily="49" charset="0"/>
-              </a:rPr>
-              <a:t>hrtimer</a:t>
-            </a:r>
-            <a:r>
-              <a:rPr lang="en-US" dirty="0"/>
-              <a:t> sends multiplexing interrupt for interval</a:t>
-            </a:r>
-          </a:p>
-          <a:p>
             <a:endParaRPr lang="en-US" dirty="0"/>
           </a:p>
         </p:txBody>
@@ -1247,7 +1176,7 @@
           <a:p>
             <a:fld id="{20E657E1-BE6E-F343-8593-856120E10085}" type="slidenum">
               <a:rPr lang="en-US" smtClean="0"/>
-              <a:t>10</a:t>
+              <a:t>9</a:t>
             </a:fld>
             <a:endParaRPr lang="en-US"/>
           </a:p>
@@ -1256,7 +1185,7 @@
     </p:spTree>
     <p:extLst>
       <p:ext uri="{BB962C8B-B14F-4D97-AF65-F5344CB8AC3E}">
-        <p14:creationId xmlns:p14="http://schemas.microsoft.com/office/powerpoint/2010/main" val="3094749063"/>
+        <p14:creationId xmlns:p14="http://schemas.microsoft.com/office/powerpoint/2010/main" val="1908276148"/>
       </p:ext>
     </p:extLst>
   </p:cSld>
@@ -1310,6 +1239,158 @@
           <a:bodyPr/>
           <a:lstStyle/>
           <a:p>
+            <a:pPr marL="171450" marR="0" lvl="0" indent="-171450" algn="l" defTabSz="914400" rtl="0" eaLnBrk="1" fontAlgn="auto" latinLnBrk="0" hangingPunct="1">
+              <a:lnSpc>
+                <a:spcPct val="100000"/>
+              </a:lnSpc>
+              <a:spcBef>
+                <a:spcPts val="0"/>
+              </a:spcBef>
+              <a:spcAft>
+                <a:spcPts val="0"/>
+              </a:spcAft>
+              <a:buClrTx/>
+              <a:buSzTx/>
+              <a:buFontTx/>
+              <a:buChar char="-"/>
+              <a:tabLst/>
+              <a:defRPr/>
+            </a:pPr>
+            <a:r>
+              <a:rPr lang="en-US" dirty="0"/>
+              <a:t>List is traversed head to tail</a:t>
+            </a:r>
+          </a:p>
+          <a:p>
+            <a:pPr marL="171450" marR="0" lvl="0" indent="-171450" algn="l" defTabSz="914400" rtl="0" eaLnBrk="1" fontAlgn="auto" latinLnBrk="0" hangingPunct="1">
+              <a:lnSpc>
+                <a:spcPct val="100000"/>
+              </a:lnSpc>
+              <a:spcBef>
+                <a:spcPts val="0"/>
+              </a:spcBef>
+              <a:spcAft>
+                <a:spcPts val="0"/>
+              </a:spcAft>
+              <a:buClrTx/>
+              <a:buSzTx/>
+              <a:buFontTx/>
+              <a:buChar char="-"/>
+              <a:tabLst/>
+              <a:defRPr/>
+            </a:pPr>
+            <a:endParaRPr lang="en-US" dirty="0"/>
+          </a:p>
+          <a:p>
+            <a:pPr marL="171450" marR="0" lvl="0" indent="-171450" algn="l" defTabSz="914400" rtl="0" eaLnBrk="1" fontAlgn="auto" latinLnBrk="0" hangingPunct="1">
+              <a:lnSpc>
+                <a:spcPct val="100000"/>
+              </a:lnSpc>
+              <a:spcBef>
+                <a:spcPts val="0"/>
+              </a:spcBef>
+              <a:spcAft>
+                <a:spcPts val="0"/>
+              </a:spcAft>
+              <a:buClrTx/>
+              <a:buSzTx/>
+              <a:buFontTx/>
+              <a:buChar char="-"/>
+              <a:tabLst/>
+              <a:defRPr/>
+            </a:pPr>
+            <a:r>
+              <a:rPr lang="en-US" dirty="0"/>
+              <a:t>G2 fails to schedule</a:t>
+            </a:r>
+          </a:p>
+          <a:p>
+            <a:pPr marL="171450" marR="0" lvl="0" indent="-171450" algn="l" defTabSz="914400" rtl="0" eaLnBrk="1" fontAlgn="auto" latinLnBrk="0" hangingPunct="1">
+              <a:lnSpc>
+                <a:spcPct val="100000"/>
+              </a:lnSpc>
+              <a:spcBef>
+                <a:spcPts val="0"/>
+              </a:spcBef>
+              <a:spcAft>
+                <a:spcPts val="0"/>
+              </a:spcAft>
+              <a:buClrTx/>
+              <a:buSzTx/>
+              <a:buFontTx/>
+              <a:buChar char="-"/>
+              <a:tabLst/>
+              <a:defRPr/>
+            </a:pPr>
+            <a:endParaRPr lang="en-US" dirty="0"/>
+          </a:p>
+          <a:p>
+            <a:pPr marL="171450" marR="0" lvl="0" indent="-171450" algn="l" defTabSz="914400" rtl="0" eaLnBrk="1" fontAlgn="auto" latinLnBrk="0" hangingPunct="1">
+              <a:lnSpc>
+                <a:spcPct val="100000"/>
+              </a:lnSpc>
+              <a:spcBef>
+                <a:spcPts val="0"/>
+              </a:spcBef>
+              <a:spcAft>
+                <a:spcPts val="0"/>
+              </a:spcAft>
+              <a:buClrTx/>
+              <a:buSzTx/>
+              <a:buFontTx/>
+              <a:buChar char="-"/>
+              <a:tabLst/>
+              <a:defRPr/>
+            </a:pPr>
+            <a:r>
+              <a:rPr lang="en-US" dirty="0"/>
+              <a:t>Upon failure, the algorithm activates counters for counting and iteration proceeds</a:t>
+            </a:r>
+          </a:p>
+          <a:p>
+            <a:pPr marL="171450" marR="0" lvl="0" indent="-171450" algn="l" defTabSz="914400" rtl="0" eaLnBrk="1" fontAlgn="auto" latinLnBrk="0" hangingPunct="1">
+              <a:lnSpc>
+                <a:spcPct val="100000"/>
+              </a:lnSpc>
+              <a:spcBef>
+                <a:spcPts val="0"/>
+              </a:spcBef>
+              <a:spcAft>
+                <a:spcPts val="0"/>
+              </a:spcAft>
+              <a:buClrTx/>
+              <a:buSzTx/>
+              <a:buFontTx/>
+              <a:buChar char="-"/>
+              <a:tabLst/>
+              <a:defRPr/>
+            </a:pPr>
+            <a:endParaRPr lang="en-US" dirty="0"/>
+          </a:p>
+          <a:p>
+            <a:pPr marL="171450" marR="0" lvl="0" indent="-171450" algn="l" defTabSz="914400" rtl="0" eaLnBrk="1" fontAlgn="auto" latinLnBrk="0" hangingPunct="1">
+              <a:lnSpc>
+                <a:spcPct val="100000"/>
+              </a:lnSpc>
+              <a:spcBef>
+                <a:spcPts val="0"/>
+              </a:spcBef>
+              <a:spcAft>
+                <a:spcPts val="0"/>
+              </a:spcAft>
+              <a:buClrTx/>
+              <a:buSzTx/>
+              <a:buFontTx/>
+              <a:buChar char="-"/>
+              <a:tabLst/>
+              <a:defRPr/>
+            </a:pPr>
+            <a:r>
+              <a:rPr lang="en-US" dirty="0"/>
+              <a:t>Software events fill the rest of counters, but error in hardware event counts is exacerbated</a:t>
+            </a:r>
+          </a:p>
+          <a:p>
             <a:pPr marL="0" marR="0" lvl="0" indent="0" algn="l" defTabSz="914400" rtl="0" eaLnBrk="1" fontAlgn="auto" latinLnBrk="0" hangingPunct="1">
               <a:lnSpc>
                 <a:spcPct val="100000"/>
@@ -1327,16 +1408,44 @@
               <a:tabLst/>
               <a:defRPr/>
             </a:pPr>
+            <a:endParaRPr lang="en-US" dirty="0"/>
+          </a:p>
+          <a:p>
+            <a:pPr marL="0" marR="0" lvl="0" indent="0" algn="l" defTabSz="914400" rtl="0" eaLnBrk="1" fontAlgn="auto" latinLnBrk="0" hangingPunct="1">
+              <a:lnSpc>
+                <a:spcPct val="100000"/>
+              </a:lnSpc>
+              <a:spcBef>
+                <a:spcPts val="0"/>
+              </a:spcBef>
+              <a:spcAft>
+                <a:spcPts val="0"/>
+              </a:spcAft>
+              <a:buClrTx/>
+              <a:buSzTx/>
+              <a:buFontTx/>
+              <a:buNone/>
+              <a:tabLst/>
+              <a:defRPr/>
+            </a:pPr>
             <a:r>
               <a:rPr lang="en-US" dirty="0"/>
-              <a:t>- Tail rotates to head</a:t>
-            </a:r>
-          </a:p>
-          <a:p>
+              <a:t>- Linux </a:t>
+            </a:r>
+            <a:r>
+              <a:rPr lang="en-US" dirty="0">
+                <a:latin typeface="Consolas" panose="020B0609020204030204" pitchFamily="49" charset="0"/>
+                <a:cs typeface="Consolas" panose="020B0609020204030204" pitchFamily="49" charset="0"/>
+              </a:rPr>
+              <a:t>hrtimer</a:t>
+            </a:r>
             <a:r>
               <a:rPr lang="en-US" dirty="0"/>
-              <a:t>- This time all counters are utilized</a:t>
-            </a:r>
+              <a:t> sends multiplexing interrupt for interval</a:t>
+            </a:r>
+          </a:p>
+          <a:p>
+            <a:endParaRPr lang="en-US" dirty="0"/>
           </a:p>
         </p:txBody>
       </p:sp>
@@ -1357,7 +1466,7 @@
           <a:p>
             <a:fld id="{20E657E1-BE6E-F343-8593-856120E10085}" type="slidenum">
               <a:rPr lang="en-US" smtClean="0"/>
-              <a:t>11</a:t>
+              <a:t>10</a:t>
             </a:fld>
             <a:endParaRPr lang="en-US"/>
           </a:p>
@@ -1366,7 +1475,7 @@
     </p:spTree>
     <p:extLst>
       <p:ext uri="{BB962C8B-B14F-4D97-AF65-F5344CB8AC3E}">
-        <p14:creationId xmlns:p14="http://schemas.microsoft.com/office/powerpoint/2010/main" val="3015628923"/>
+        <p14:creationId xmlns:p14="http://schemas.microsoft.com/office/powerpoint/2010/main" val="3094749063"/>
       </p:ext>
     </p:extLst>
   </p:cSld>
@@ -1420,35 +1529,32 @@
           <a:bodyPr/>
           <a:lstStyle/>
           <a:p>
-            <a:r>
-              <a:rPr lang="en-US" sz="1200" dirty="0"/>
-              <a:t>Once a hardware event group fails to be scheduled, software events are scheduled onto the remaining counters.</a:t>
-            </a:r>
-          </a:p>
-          <a:p>
-            <a:endParaRPr lang="en-US" dirty="0"/>
-          </a:p>
-          <a:p>
-            <a:r>
-              <a:rPr lang="en-US" sz="1200" dirty="0"/>
-              <a:t>This reduces time on PMU for hardware events which exacerbates error from extrapolation</a:t>
-            </a:r>
-          </a:p>
-          <a:p>
-            <a:endParaRPr lang="en-US" sz="1200" dirty="0"/>
-          </a:p>
-          <a:p>
-            <a:r>
-              <a:rPr lang="en-US" sz="1200" dirty="0"/>
-              <a:t>Modifying the event scheduler </a:t>
-            </a:r>
-            <a:r>
-              <a:rPr lang="en-US" sz="1200"/>
-              <a:t>is difficult, but may </a:t>
-            </a:r>
-            <a:r>
-              <a:rPr lang="en-US" sz="1200" dirty="0"/>
-              <a:t>not be necessary to see significant improvements</a:t>
+            <a:pPr marL="0" marR="0" lvl="0" indent="0" algn="l" defTabSz="914400" rtl="0" eaLnBrk="1" fontAlgn="auto" latinLnBrk="0" hangingPunct="1">
+              <a:lnSpc>
+                <a:spcPct val="100000"/>
+              </a:lnSpc>
+              <a:spcBef>
+                <a:spcPts val="0"/>
+              </a:spcBef>
+              <a:spcAft>
+                <a:spcPts val="0"/>
+              </a:spcAft>
+              <a:buClrTx/>
+              <a:buSzTx/>
+              <a:buFontTx/>
+              <a:buNone/>
+              <a:tabLst/>
+              <a:defRPr/>
+            </a:pPr>
+            <a:r>
+              <a:rPr lang="en-US" dirty="0"/>
+              <a:t>- Tail rotates to head</a:t>
+            </a:r>
+          </a:p>
+          <a:p>
+            <a:r>
+              <a:rPr lang="en-US" dirty="0"/>
+              <a:t>- This time all counters are utilized</a:t>
             </a:r>
           </a:p>
         </p:txBody>
@@ -1470,7 +1576,7 @@
           <a:p>
             <a:fld id="{20E657E1-BE6E-F343-8593-856120E10085}" type="slidenum">
               <a:rPr lang="en-US" smtClean="0"/>
-              <a:t>12</a:t>
+              <a:t>11</a:t>
             </a:fld>
             <a:endParaRPr lang="en-US"/>
           </a:p>
@@ -1479,7 +1585,7 @@
     </p:spTree>
     <p:extLst>
       <p:ext uri="{BB962C8B-B14F-4D97-AF65-F5344CB8AC3E}">
-        <p14:creationId xmlns:p14="http://schemas.microsoft.com/office/powerpoint/2010/main" val="1375549576"/>
+        <p14:creationId xmlns:p14="http://schemas.microsoft.com/office/powerpoint/2010/main" val="3015628923"/>
       </p:ext>
     </p:extLst>
   </p:cSld>
@@ -1534,8 +1640,8 @@
           <a:lstStyle/>
           <a:p>
             <a:r>
-              <a:rPr lang="en-US" dirty="0"/>
-              <a:t>We can reduce the need to multiplex in the first place by reducing the events that are traced</a:t>
+              <a:rPr lang="en-US" sz="1200" dirty="0"/>
+              <a:t>Once a hardware event group fails to be scheduled, software events are scheduled onto the remaining counters.</a:t>
             </a:r>
           </a:p>
           <a:p>
@@ -1543,8 +1649,25 @@
           </a:p>
           <a:p>
             <a:r>
-              <a:rPr lang="en-US" dirty="0"/>
-              <a:t>Transition to Tomson</a:t>
+              <a:rPr lang="en-US" sz="1200" dirty="0"/>
+              <a:t>This reduces time on PMU for hardware events which exacerbates error from extrapolation</a:t>
+            </a:r>
+          </a:p>
+          <a:p>
+            <a:endParaRPr lang="en-US" sz="1200" dirty="0"/>
+          </a:p>
+          <a:p>
+            <a:r>
+              <a:rPr lang="en-US" sz="1200" dirty="0"/>
+              <a:t>Modifying the event scheduler </a:t>
+            </a:r>
+            <a:r>
+              <a:rPr lang="en-US" sz="1200"/>
+              <a:t>is difficult, but may </a:t>
+            </a:r>
+            <a:r>
+              <a:rPr lang="en-US" sz="1200" dirty="0"/>
+              <a:t>not be necessary to see significant improvements</a:t>
             </a:r>
           </a:p>
         </p:txBody>
@@ -1566,7 +1689,7 @@
           <a:p>
             <a:fld id="{20E657E1-BE6E-F343-8593-856120E10085}" type="slidenum">
               <a:rPr lang="en-US" smtClean="0"/>
-              <a:t>13</a:t>
+              <a:t>12</a:t>
             </a:fld>
             <a:endParaRPr lang="en-US"/>
           </a:p>
@@ -1575,7 +1698,7 @@
     </p:spTree>
     <p:extLst>
       <p:ext uri="{BB962C8B-B14F-4D97-AF65-F5344CB8AC3E}">
-        <p14:creationId xmlns:p14="http://schemas.microsoft.com/office/powerpoint/2010/main" val="2527501957"/>
+        <p14:creationId xmlns:p14="http://schemas.microsoft.com/office/powerpoint/2010/main" val="1375549576"/>
       </p:ext>
     </p:extLst>
   </p:cSld>
@@ -1732,7 +1855,7 @@
           <a:p>
             <a:fld id="{73D3FF47-2591-1F46-9009-B1A03C8BD516}" type="datetimeFigureOut">
               <a:rPr lang="en-US" smtClean="0"/>
-              <a:t>4/3/23</a:t>
+              <a:t>4/4/2023</a:t>
             </a:fld>
             <a:endParaRPr lang="en-US"/>
           </a:p>
@@ -1930,7 +2053,7 @@
           <a:p>
             <a:fld id="{73D3FF47-2591-1F46-9009-B1A03C8BD516}" type="datetimeFigureOut">
               <a:rPr lang="en-US" smtClean="0"/>
-              <a:t>4/3/23</a:t>
+              <a:t>4/4/2023</a:t>
             </a:fld>
             <a:endParaRPr lang="en-US"/>
           </a:p>
@@ -2138,7 +2261,7 @@
           <a:p>
             <a:fld id="{73D3FF47-2591-1F46-9009-B1A03C8BD516}" type="datetimeFigureOut">
               <a:rPr lang="en-US" smtClean="0"/>
-              <a:t>4/3/23</a:t>
+              <a:t>4/4/2023</a:t>
             </a:fld>
             <a:endParaRPr lang="en-US"/>
           </a:p>
@@ -2336,7 +2459,7 @@
           <a:p>
             <a:fld id="{73D3FF47-2591-1F46-9009-B1A03C8BD516}" type="datetimeFigureOut">
               <a:rPr lang="en-US" smtClean="0"/>
-              <a:t>4/3/23</a:t>
+              <a:t>4/4/2023</a:t>
             </a:fld>
             <a:endParaRPr lang="en-US"/>
           </a:p>
@@ -2611,7 +2734,7 @@
           <a:p>
             <a:fld id="{73D3FF47-2591-1F46-9009-B1A03C8BD516}" type="datetimeFigureOut">
               <a:rPr lang="en-US" smtClean="0"/>
-              <a:t>4/3/23</a:t>
+              <a:t>4/4/2023</a:t>
             </a:fld>
             <a:endParaRPr lang="en-US"/>
           </a:p>
@@ -2876,7 +2999,7 @@
           <a:p>
             <a:fld id="{73D3FF47-2591-1F46-9009-B1A03C8BD516}" type="datetimeFigureOut">
               <a:rPr lang="en-US" smtClean="0"/>
-              <a:t>4/3/23</a:t>
+              <a:t>4/4/2023</a:t>
             </a:fld>
             <a:endParaRPr lang="en-US"/>
           </a:p>
@@ -3288,7 +3411,7 @@
           <a:p>
             <a:fld id="{73D3FF47-2591-1F46-9009-B1A03C8BD516}" type="datetimeFigureOut">
               <a:rPr lang="en-US" smtClean="0"/>
-              <a:t>4/3/23</a:t>
+              <a:t>4/4/2023</a:t>
             </a:fld>
             <a:endParaRPr lang="en-US"/>
           </a:p>
@@ -3429,7 +3552,7 @@
           <a:p>
             <a:fld id="{73D3FF47-2591-1F46-9009-B1A03C8BD516}" type="datetimeFigureOut">
               <a:rPr lang="en-US" smtClean="0"/>
-              <a:t>4/3/23</a:t>
+              <a:t>4/4/2023</a:t>
             </a:fld>
             <a:endParaRPr lang="en-US"/>
           </a:p>
@@ -3542,7 +3665,7 @@
           <a:p>
             <a:fld id="{73D3FF47-2591-1F46-9009-B1A03C8BD516}" type="datetimeFigureOut">
               <a:rPr lang="en-US" smtClean="0"/>
-              <a:t>4/3/23</a:t>
+              <a:t>4/4/2023</a:t>
             </a:fld>
             <a:endParaRPr lang="en-US"/>
           </a:p>
@@ -3853,7 +3976,7 @@
           <a:p>
             <a:fld id="{73D3FF47-2591-1F46-9009-B1A03C8BD516}" type="datetimeFigureOut">
               <a:rPr lang="en-US" smtClean="0"/>
-              <a:t>4/3/23</a:t>
+              <a:t>4/4/2023</a:t>
             </a:fld>
             <a:endParaRPr lang="en-US"/>
           </a:p>
@@ -4141,7 +4264,7 @@
           <a:p>
             <a:fld id="{73D3FF47-2591-1F46-9009-B1A03C8BD516}" type="datetimeFigureOut">
               <a:rPr lang="en-US" smtClean="0"/>
-              <a:t>4/3/23</a:t>
+              <a:t>4/4/2023</a:t>
             </a:fld>
             <a:endParaRPr lang="en-US"/>
           </a:p>
@@ -4382,7 +4505,7 @@
           <a:p>
             <a:fld id="{73D3FF47-2591-1F46-9009-B1A03C8BD516}" type="datetimeFigureOut">
               <a:rPr lang="en-US" smtClean="0"/>
-              <a:t>4/3/23</a:t>
+              <a:t>4/4/2023</a:t>
             </a:fld>
             <a:endParaRPr lang="en-US"/>
           </a:p>

</xml_diff>